<commit_message>
Finished Level design & Updated Presentatio
</commit_message>
<xml_diff>
--- a/Presentatie GTRacingPro.pptx
+++ b/Presentatie GTRacingPro.pptx
@@ -10,7 +10,8 @@
     <p:sldId id="256" r:id="rId4"/>
     <p:sldId id="259" r:id="rId5"/>
     <p:sldId id="261" r:id="rId6"/>
-    <p:sldId id="262" r:id="rId7"/>
+    <p:sldId id="263" r:id="rId7"/>
+    <p:sldId id="262" r:id="rId8"/>
   </p:sldIdLst>
   <p:sldSz cx="12192000" cy="6858000"/>
   <p:notesSz cx="6858000" cy="9144000"/>
@@ -109,6 +110,11 @@
       </a:defRPr>
     </a:lvl9pPr>
   </p:defaultTextStyle>
+  <p:extLst>
+    <p:ext uri="{EFAFB233-063F-42B5-8137-9DF3F51BA10A}">
+      <p15:sldGuideLst xmlns:p15="http://schemas.microsoft.com/office/powerpoint/2012/main"/>
+    </p:ext>
+  </p:extLst>
 </p:presentation>
 </file>
 
@@ -7984,10 +7990,14 @@
           <a:lstStyle/>
           <a:p>
             <a:r>
-              <a:rPr lang="en-US" sz="4400" dirty="0" err="1"/>
+              <a:rPr lang="en-US" sz="4400" dirty="0" err="1">
+                <a:latin typeface="Adobe Clean" panose="020B0503020404020204" pitchFamily="34" charset="0"/>
+              </a:rPr>
               <a:t>Inhoudsopagave</a:t>
             </a:r>
-            <a:endParaRPr lang="en-US" sz="4400" dirty="0"/>
+            <a:endParaRPr lang="en-US" sz="4400" dirty="0">
+              <a:latin typeface="Adobe Clean" panose="020B0503020404020204" pitchFamily="34" charset="0"/>
+            </a:endParaRPr>
           </a:p>
         </p:txBody>
       </p:sp>
@@ -8020,38 +8030,59 @@
           <a:lstStyle/>
           <a:p>
             <a:r>
-              <a:rPr lang="en-US" sz="2400" dirty="0"/>
+              <a:rPr lang="en-US" sz="2400" dirty="0">
+                <a:latin typeface="Adobe Clean" panose="020B0503020404020204" pitchFamily="34" charset="0"/>
+              </a:rPr>
               <a:t>1. </a:t>
             </a:r>
             <a:r>
               <a:rPr lang="en-US" sz="2400" dirty="0">
                 <a:effectLst/>
+                <a:latin typeface="Adobe Clean" panose="020B0503020404020204" pitchFamily="34" charset="0"/>
                 <a:ea typeface="Calibri" panose="020F0502020204030204" pitchFamily="34" charset="0"/>
               </a:rPr>
               <a:t>Project description</a:t>
             </a:r>
-            <a:endParaRPr lang="en-US" sz="2400" dirty="0"/>
+            <a:endParaRPr lang="en-US" sz="2400" dirty="0">
+              <a:latin typeface="Adobe Clean" panose="020B0503020404020204" pitchFamily="34" charset="0"/>
+            </a:endParaRPr>
           </a:p>
           <a:p>
             <a:r>
-              <a:rPr lang="en-US" sz="2400" dirty="0"/>
+              <a:rPr lang="en-US" sz="2400" dirty="0">
+                <a:latin typeface="Adobe Clean" panose="020B0503020404020204" pitchFamily="34" charset="0"/>
+              </a:rPr>
               <a:t>2. Game design </a:t>
             </a:r>
           </a:p>
           <a:p>
             <a:r>
-              <a:rPr lang="en-US" sz="2400" dirty="0"/>
+              <a:rPr lang="en-US" sz="2400" dirty="0">
+                <a:latin typeface="Adobe Clean" panose="020B0503020404020204" pitchFamily="34" charset="0"/>
+              </a:rPr>
               <a:t>3. Obstacles</a:t>
             </a:r>
           </a:p>
           <a:p>
             <a:r>
-              <a:rPr lang="en-US" sz="2400" dirty="0"/>
-              <a:t>4. The game</a:t>
+              <a:rPr lang="en-US" sz="2400" dirty="0">
+                <a:latin typeface="Adobe Clean" panose="020B0503020404020204" pitchFamily="34" charset="0"/>
+              </a:rPr>
+              <a:t>4. The Car</a:t>
             </a:r>
           </a:p>
           <a:p>
-            <a:endParaRPr lang="en-US" sz="1600" dirty="0"/>
+            <a:r>
+              <a:rPr lang="en-US" sz="2400" dirty="0">
+                <a:latin typeface="Adobe Clean" panose="020B0503020404020204" pitchFamily="34" charset="0"/>
+              </a:rPr>
+              <a:t>5. The game</a:t>
+            </a:r>
+          </a:p>
+          <a:p>
+            <a:endParaRPr lang="en-US" sz="1600" dirty="0">
+              <a:latin typeface="Adobe Clean" panose="020B0503020404020204" pitchFamily="34" charset="0"/>
+            </a:endParaRPr>
           </a:p>
         </p:txBody>
       </p:sp>
@@ -8325,20 +8356,31 @@
           <a:p>
             <a:pPr algn="ctr"/>
             <a:r>
-              <a:rPr lang="en-US" sz="4800" dirty="0"/>
+              <a:rPr lang="en-US" sz="4800" dirty="0">
+                <a:latin typeface="Adobe Clean" panose="020B0503020404020204" pitchFamily="34" charset="0"/>
+                <a:cs typeface="Aharoni" panose="020B0604020202020204" pitchFamily="2" charset="-79"/>
+              </a:rPr>
               <a:t>1. </a:t>
             </a:r>
             <a:r>
               <a:rPr lang="en-US" sz="4800" dirty="0">
                 <a:effectLst/>
+                <a:latin typeface="Adobe Clean" panose="020B0503020404020204" pitchFamily="34" charset="0"/>
                 <a:ea typeface="Calibri" panose="020F0502020204030204" pitchFamily="34" charset="0"/>
+                <a:cs typeface="Aharoni" panose="020B0604020202020204" pitchFamily="2" charset="-79"/>
               </a:rPr>
               <a:t>Project description</a:t>
             </a:r>
             <a:br>
-              <a:rPr lang="en-US" sz="4800" dirty="0"/>
+              <a:rPr lang="en-US" sz="4800" dirty="0">
+                <a:latin typeface="Adobe Clean" panose="020B0503020404020204" pitchFamily="34" charset="0"/>
+                <a:cs typeface="Aharoni" panose="020B0604020202020204" pitchFamily="2" charset="-79"/>
+              </a:rPr>
             </a:br>
-            <a:endParaRPr lang="en-US" sz="4800" dirty="0"/>
+            <a:endParaRPr lang="en-US" sz="4800" dirty="0">
+              <a:latin typeface="Adobe Clean" panose="020B0503020404020204" pitchFamily="34" charset="0"/>
+              <a:cs typeface="Aharoni" panose="020B0604020202020204" pitchFamily="2" charset="-79"/>
+            </a:endParaRPr>
           </a:p>
         </p:txBody>
       </p:sp>
@@ -8526,7 +8568,7 @@
             </a:pPr>
             <a:endParaRPr lang="en-US" sz="1800" dirty="0">
               <a:effectLst/>
-              <a:latin typeface="Calibri" panose="020F0502020204030204" pitchFamily="34" charset="0"/>
+              <a:latin typeface="Adobe Clean" panose="020B0503020404020204" pitchFamily="34" charset="0"/>
               <a:ea typeface="Calibri" panose="020F0502020204030204" pitchFamily="34" charset="0"/>
               <a:cs typeface="Calibri" panose="020F0502020204030204" pitchFamily="34" charset="0"/>
             </a:endParaRPr>
@@ -8539,7 +8581,7 @@
             <a:r>
               <a:rPr lang="en-US" sz="1800" dirty="0">
                 <a:effectLst/>
-                <a:latin typeface="Calibri" panose="020F0502020204030204" pitchFamily="34" charset="0"/>
+                <a:latin typeface="Adobe Clean" panose="020B0503020404020204" pitchFamily="34" charset="0"/>
                 <a:ea typeface="Calibri" panose="020F0502020204030204" pitchFamily="34" charset="0"/>
                 <a:cs typeface="Calibri" panose="020F0502020204030204" pitchFamily="34" charset="0"/>
               </a:rPr>
@@ -8553,7 +8595,7 @@
             </a:pPr>
             <a:r>
               <a:rPr lang="en-US" sz="1800" dirty="0">
-                <a:latin typeface="Calibri" panose="020F0502020204030204" pitchFamily="34" charset="0"/>
+                <a:latin typeface="Adobe Clean" panose="020B0503020404020204" pitchFamily="34" charset="0"/>
                 <a:ea typeface="Calibri" panose="020F0502020204030204" pitchFamily="34" charset="0"/>
                 <a:cs typeface="Calibri" panose="020F0502020204030204" pitchFamily="34" charset="0"/>
               </a:rPr>
@@ -8562,7 +8604,7 @@
             <a:r>
               <a:rPr lang="en-US" sz="1800" dirty="0">
                 <a:effectLst/>
-                <a:latin typeface="Calibri" panose="020F0502020204030204" pitchFamily="34" charset="0"/>
+                <a:latin typeface="Adobe Clean" panose="020B0503020404020204" pitchFamily="34" charset="0"/>
                 <a:ea typeface="Calibri" panose="020F0502020204030204" pitchFamily="34" charset="0"/>
                 <a:cs typeface="Calibri" panose="020F0502020204030204" pitchFamily="34" charset="0"/>
               </a:rPr>
@@ -8576,7 +8618,7 @@
             </a:pPr>
             <a:r>
               <a:rPr lang="en-US" sz="1800" dirty="0">
-                <a:latin typeface="Calibri" panose="020F0502020204030204" pitchFamily="34" charset="0"/>
+                <a:latin typeface="Adobe Clean" panose="020B0503020404020204" pitchFamily="34" charset="0"/>
                 <a:ea typeface="Calibri" panose="020F0502020204030204" pitchFamily="34" charset="0"/>
                 <a:cs typeface="Calibri" panose="020F0502020204030204" pitchFamily="34" charset="0"/>
               </a:rPr>
@@ -8585,7 +8627,7 @@
             <a:r>
               <a:rPr lang="en-US" sz="1800" dirty="0">
                 <a:effectLst/>
-                <a:latin typeface="Calibri" panose="020F0502020204030204" pitchFamily="34" charset="0"/>
+                <a:latin typeface="Adobe Clean" panose="020B0503020404020204" pitchFamily="34" charset="0"/>
                 <a:ea typeface="Calibri" panose="020F0502020204030204" pitchFamily="34" charset="0"/>
                 <a:cs typeface="Calibri" panose="020F0502020204030204" pitchFamily="34" charset="0"/>
               </a:rPr>
@@ -8600,7 +8642,7 @@
             <a:r>
               <a:rPr lang="en-US" sz="1800" dirty="0">
                 <a:effectLst/>
-                <a:latin typeface="Calibri" panose="020F0502020204030204" pitchFamily="34" charset="0"/>
+                <a:latin typeface="Adobe Clean" panose="020B0503020404020204" pitchFamily="34" charset="0"/>
                 <a:ea typeface="Calibri" panose="020F0502020204030204" pitchFamily="34" charset="0"/>
                 <a:cs typeface="Calibri" panose="020F0502020204030204" pitchFamily="34" charset="0"/>
               </a:rPr>
@@ -8612,6 +8654,7 @@
                   <a:alpha val="60000"/>
                 </a:schemeClr>
               </a:solidFill>
+              <a:latin typeface="Adobe Clean" panose="020B0503020404020204" pitchFamily="34" charset="0"/>
             </a:endParaRPr>
           </a:p>
         </p:txBody>
@@ -8754,18 +8797,24 @@
         </p:spPr>
         <p:txBody>
           <a:bodyPr wrap="square" anchor="b">
-            <a:normAutofit/>
+            <a:normAutofit fontScale="90000"/>
           </a:bodyPr>
           <a:lstStyle/>
           <a:p>
             <a:r>
-              <a:rPr lang="en-US" sz="4800" dirty="0"/>
+              <a:rPr lang="en-US" sz="4800" dirty="0">
+                <a:latin typeface="Adobe Clean" panose="020B0503020404020204" pitchFamily="34" charset="0"/>
+              </a:rPr>
               <a:t>2. Game design </a:t>
             </a:r>
             <a:br>
-              <a:rPr lang="en-US" sz="4800" dirty="0"/>
+              <a:rPr lang="en-US" sz="4800" dirty="0">
+                <a:latin typeface="Adobe Clean" panose="020B0503020404020204" pitchFamily="34" charset="0"/>
+              </a:rPr>
             </a:br>
-            <a:endParaRPr lang="en-US" dirty="0"/>
+            <a:endParaRPr lang="en-US" dirty="0">
+              <a:latin typeface="Adobe Clean" panose="020B0503020404020204" pitchFamily="34" charset="0"/>
+            </a:endParaRPr>
           </a:p>
         </p:txBody>
       </p:sp>
@@ -9393,7 +9442,7 @@
             <a:r>
               <a:rPr lang="en-US" sz="1800" dirty="0">
                 <a:effectLst/>
-                <a:latin typeface="Calibri" panose="020F0502020204030204" pitchFamily="34" charset="0"/>
+                <a:latin typeface="Adobe Clean" panose="020B0503020404020204" pitchFamily="34" charset="0"/>
                 <a:ea typeface="Calibri" panose="020F0502020204030204" pitchFamily="34" charset="0"/>
                 <a:cs typeface="Calibri" panose="020F0502020204030204" pitchFamily="34" charset="0"/>
               </a:rPr>
@@ -9408,7 +9457,7 @@
             <a:r>
               <a:rPr lang="en-US" sz="1800" dirty="0">
                 <a:effectLst/>
-                <a:latin typeface="Calibri" panose="020F0502020204030204" pitchFamily="34" charset="0"/>
+                <a:latin typeface="Adobe Clean" panose="020B0503020404020204" pitchFamily="34" charset="0"/>
                 <a:ea typeface="Calibri" panose="020F0502020204030204" pitchFamily="34" charset="0"/>
                 <a:cs typeface="Calibri" panose="020F0502020204030204" pitchFamily="34" charset="0"/>
               </a:rPr>
@@ -9422,7 +9471,7 @@
             </a:pPr>
             <a:r>
               <a:rPr lang="en-US" sz="1800" dirty="0">
-                <a:latin typeface="Calibri" panose="020F0502020204030204" pitchFamily="34" charset="0"/>
+                <a:latin typeface="Adobe Clean" panose="020B0503020404020204" pitchFamily="34" charset="0"/>
                 <a:ea typeface="Calibri" panose="020F0502020204030204" pitchFamily="34" charset="0"/>
                 <a:cs typeface="Calibri" panose="020F0502020204030204" pitchFamily="34" charset="0"/>
               </a:rPr>
@@ -9430,7 +9479,7 @@
             </a:r>
             <a:endParaRPr lang="en-US" sz="1800" dirty="0">
               <a:effectLst/>
-              <a:latin typeface="Calibri" panose="020F0502020204030204" pitchFamily="34" charset="0"/>
+              <a:latin typeface="Adobe Clean" panose="020B0503020404020204" pitchFamily="34" charset="0"/>
               <a:ea typeface="Calibri" panose="020F0502020204030204" pitchFamily="34" charset="0"/>
               <a:cs typeface="Calibri" panose="020F0502020204030204" pitchFamily="34" charset="0"/>
             </a:endParaRPr>
@@ -9442,7 +9491,7 @@
             </a:pPr>
             <a:endParaRPr lang="en-US" sz="1600" dirty="0">
               <a:effectLst/>
-              <a:latin typeface="Calibri" panose="020F0502020204030204" pitchFamily="34" charset="0"/>
+              <a:latin typeface="Adobe Clean" panose="020B0503020404020204" pitchFamily="34" charset="0"/>
               <a:ea typeface="Calibri" panose="020F0502020204030204" pitchFamily="34" charset="0"/>
               <a:cs typeface="Calibri" panose="020F0502020204030204" pitchFamily="34" charset="0"/>
             </a:endParaRPr>
@@ -9654,13 +9703,19 @@
               </a:lnSpc>
             </a:pPr>
             <a:r>
-              <a:rPr lang="en-US" dirty="0"/>
+              <a:rPr lang="en-US" dirty="0">
+                <a:latin typeface="Adobe Clean" panose="020B0503020404020204" pitchFamily="34" charset="0"/>
+              </a:rPr>
               <a:t>3. Obstacles</a:t>
             </a:r>
             <a:br>
-              <a:rPr lang="en-US" dirty="0"/>
+              <a:rPr lang="en-US" dirty="0">
+                <a:latin typeface="Adobe Clean" panose="020B0503020404020204" pitchFamily="34" charset="0"/>
+              </a:rPr>
             </a:br>
-            <a:endParaRPr lang="en-US" dirty="0"/>
+            <a:endParaRPr lang="en-US" dirty="0">
+              <a:latin typeface="Adobe Clean" panose="020B0503020404020204" pitchFamily="34" charset="0"/>
+            </a:endParaRPr>
           </a:p>
         </p:txBody>
       </p:sp>
@@ -10271,18 +10326,32 @@
           <a:lstStyle/>
           <a:p>
             <a:r>
-              <a:rPr lang="en-US" sz="1600" dirty="0" err="1"/>
+              <a:rPr lang="en-US" sz="1600" dirty="0" err="1">
+                <a:latin typeface="Adobe Clean" panose="020B0503020404020204" pitchFamily="34" charset="0"/>
+              </a:rPr>
               <a:t>Github</a:t>
             </a:r>
             <a:r>
-              <a:rPr lang="en-US" sz="1600" dirty="0"/>
+              <a:rPr lang="en-US" sz="1600" dirty="0">
+                <a:latin typeface="Adobe Clean" panose="020B0503020404020204" pitchFamily="34" charset="0"/>
+              </a:rPr>
               <a:t> desktop</a:t>
             </a:r>
           </a:p>
           <a:p>
             <a:r>
-              <a:rPr lang="en-US" sz="1600" dirty="0"/>
-              <a:t>Communication error </a:t>
+              <a:rPr lang="en-US" sz="1600" dirty="0">
+                <a:latin typeface="Adobe Clean" panose="020B0503020404020204" pitchFamily="34" charset="0"/>
+              </a:rPr>
+              <a:t>Communication error</a:t>
+            </a:r>
+          </a:p>
+          <a:p>
+            <a:r>
+              <a:rPr lang="en-US" sz="1600" dirty="0">
+                <a:latin typeface="Adobe Clean" panose="020B0503020404020204" pitchFamily="34" charset="0"/>
+              </a:rPr>
+              <a:t>Unreal engine </a:t>
             </a:r>
           </a:p>
         </p:txBody>
@@ -10643,6 +10712,885 @@
 <file path=ppt/slides/slide6.xml><?xml version="1.0" encoding="utf-8"?>
 <p:sld xmlns:a="http://schemas.openxmlformats.org/drawingml/2006/main" xmlns:r="http://schemas.openxmlformats.org/officeDocument/2006/relationships" xmlns:p="http://schemas.openxmlformats.org/presentationml/2006/main">
   <p:cSld>
+    <p:bg>
+      <p:bgPr>
+        <a:solidFill>
+          <a:schemeClr val="bg2"/>
+        </a:solidFill>
+        <a:effectLst/>
+      </p:bgPr>
+    </p:bg>
+    <p:spTree>
+      <p:nvGrpSpPr>
+        <p:cNvPr id="1" name=""/>
+        <p:cNvGrpSpPr/>
+        <p:nvPr/>
+      </p:nvGrpSpPr>
+      <p:grpSpPr>
+        <a:xfrm>
+          <a:off x="0" y="0"/>
+          <a:ext cx="0" cy="0"/>
+          <a:chOff x="0" y="0"/>
+          <a:chExt cx="0" cy="0"/>
+        </a:xfrm>
+      </p:grpSpPr>
+      <p:sp useBgFill="1">
+        <p:nvSpPr>
+          <p:cNvPr id="59" name="Rectangle 52">
+            <a:extLst>
+              <a:ext uri="{FF2B5EF4-FFF2-40B4-BE49-F238E27FC236}">
+                <a16:creationId xmlns:a16="http://schemas.microsoft.com/office/drawing/2014/main" id="{A5931BE0-4B93-4D6C-878E-ACC59D6B4587}"/>
+              </a:ext>
+              <a:ext uri="{C183D7F6-B498-43B3-948B-1728B52AA6E4}">
+                <adec:decorative xmlns:adec="http://schemas.microsoft.com/office/drawing/2017/decorative" val="1"/>
+              </a:ext>
+            </a:extLst>
+          </p:cNvPr>
+          <p:cNvSpPr>
+            <a:spLocks noGrp="1" noRot="1" noChangeAspect="1" noMove="1" noResize="1" noEditPoints="1" noAdjustHandles="1" noChangeArrowheads="1" noChangeShapeType="1" noTextEdit="1"/>
+          </p:cNvSpPr>
+          <p:nvPr>
+            <p:extLst>
+              <p:ext uri="{386F3935-93C4-4BCD-93E2-E3B085C9AB24}">
+                <p16:designElem xmlns:p16="http://schemas.microsoft.com/office/powerpoint/2015/main" val="1"/>
+              </p:ext>
+            </p:extLst>
+          </p:nvPr>
+        </p:nvSpPr>
+        <p:spPr>
+          <a:xfrm>
+            <a:off x="0" y="0"/>
+            <a:ext cx="12192000" cy="6858000"/>
+          </a:xfrm>
+          <a:prstGeom prst="rect">
+            <a:avLst/>
+          </a:prstGeom>
+          <a:ln w="12700" cap="flat" cmpd="sng" algn="ctr">
+            <a:noFill/>
+            <a:prstDash val="solid"/>
+            <a:miter lim="800000"/>
+          </a:ln>
+          <a:effectLst/>
+          <a:extLst>
+            <a:ext uri="{91240B29-F687-4F45-9708-019B960494DF}">
+              <a14:hiddenLine xmlns:a14="http://schemas.microsoft.com/office/drawing/2010/main" w="12700" cap="flat" cmpd="sng" algn="ctr">
+                <a:solidFill>
+                  <a:schemeClr val="accent1">
+                    <a:shade val="50000"/>
+                  </a:schemeClr>
+                </a:solidFill>
+                <a:prstDash val="solid"/>
+                <a:miter lim="800000"/>
+              </a14:hiddenLine>
+            </a:ext>
+          </a:extLst>
+        </p:spPr>
+        <p:style>
+          <a:lnRef idx="2">
+            <a:schemeClr val="accent1">
+              <a:shade val="50000"/>
+            </a:schemeClr>
+          </a:lnRef>
+          <a:fillRef idx="1">
+            <a:schemeClr val="accent1"/>
+          </a:fillRef>
+          <a:effectRef idx="0">
+            <a:schemeClr val="accent1"/>
+          </a:effectRef>
+          <a:fontRef idx="minor">
+            <a:schemeClr val="lt1"/>
+          </a:fontRef>
+        </p:style>
+        <p:txBody>
+          <a:bodyPr rtlCol="0" anchor="ctr"/>
+          <a:lstStyle/>
+          <a:p>
+            <a:pPr algn="ctr"/>
+            <a:endParaRPr lang="en-US"/>
+          </a:p>
+        </p:txBody>
+      </p:sp>
+      <p:sp>
+        <p:nvSpPr>
+          <p:cNvPr id="2" name="Titel 1">
+            <a:extLst>
+              <a:ext uri="{FF2B5EF4-FFF2-40B4-BE49-F238E27FC236}">
+                <a16:creationId xmlns:a16="http://schemas.microsoft.com/office/drawing/2014/main" id="{EE50DBF5-9546-4E76-8032-E349B7C4EC4B}"/>
+              </a:ext>
+            </a:extLst>
+          </p:cNvPr>
+          <p:cNvSpPr>
+            <a:spLocks noGrp="1"/>
+          </p:cNvSpPr>
+          <p:nvPr>
+            <p:ph type="title"/>
+          </p:nvPr>
+        </p:nvSpPr>
+        <p:spPr>
+          <a:xfrm>
+            <a:off x="550864" y="549275"/>
+            <a:ext cx="3565524" cy="1997855"/>
+          </a:xfrm>
+        </p:spPr>
+        <p:txBody>
+          <a:bodyPr wrap="square" anchor="b">
+            <a:normAutofit/>
+          </a:bodyPr>
+          <a:lstStyle/>
+          <a:p>
+            <a:r>
+              <a:rPr lang="en-US">
+                <a:latin typeface="Adobe Clean" panose="020B0503020404020204" pitchFamily="34" charset="0"/>
+              </a:rPr>
+              <a:t>4. The Car</a:t>
+            </a:r>
+            <a:br>
+              <a:rPr lang="en-US">
+                <a:latin typeface="Adobe Clean" panose="020B0503020404020204" pitchFamily="34" charset="0"/>
+              </a:rPr>
+            </a:br>
+            <a:endParaRPr lang="en-US">
+              <a:latin typeface="Adobe Clean" panose="020B0503020404020204" pitchFamily="34" charset="0"/>
+            </a:endParaRPr>
+          </a:p>
+        </p:txBody>
+      </p:sp>
+      <p:grpSp>
+        <p:nvGrpSpPr>
+          <p:cNvPr id="61" name="Group 54">
+            <a:extLst>
+              <a:ext uri="{FF2B5EF4-FFF2-40B4-BE49-F238E27FC236}">
+                <a16:creationId xmlns:a16="http://schemas.microsoft.com/office/drawing/2014/main" id="{9F2D4ED5-DC78-4C88-97AA-483206C53E90}"/>
+              </a:ext>
+              <a:ext uri="{C183D7F6-B498-43B3-948B-1728B52AA6E4}">
+                <adec:decorative xmlns:adec="http://schemas.microsoft.com/office/drawing/2017/decorative" val="1"/>
+              </a:ext>
+            </a:extLst>
+          </p:cNvPr>
+          <p:cNvGrpSpPr>
+            <a:grpSpLocks noGrp="1" noUngrp="1" noRot="1" noChangeAspect="1" noMove="1" noResize="1"/>
+          </p:cNvGrpSpPr>
+          <p:nvPr>
+            <p:extLst>
+              <p:ext uri="{386F3935-93C4-4BCD-93E2-E3B085C9AB24}">
+                <p16:designElem xmlns:p16="http://schemas.microsoft.com/office/powerpoint/2015/main" val="1"/>
+              </p:ext>
+            </p:extLst>
+          </p:nvPr>
+        </p:nvGrpSpPr>
+        <p:grpSpPr>
+          <a:xfrm>
+            <a:off x="10570793" y="0"/>
+            <a:ext cx="1468514" cy="1521012"/>
+            <a:chOff x="5236793" y="2432482"/>
+            <a:chExt cx="1468514" cy="1521012"/>
+          </a:xfrm>
+        </p:grpSpPr>
+        <p:sp>
+          <p:nvSpPr>
+            <p:cNvPr id="56" name="Freeform 5">
+              <a:extLst>
+                <a:ext uri="{FF2B5EF4-FFF2-40B4-BE49-F238E27FC236}">
+                  <a16:creationId xmlns:a16="http://schemas.microsoft.com/office/drawing/2014/main" id="{0DE0B65A-4839-40B2-BA92-1464FEADBA4A}"/>
+                </a:ext>
+                <a:ext uri="{C183D7F6-B498-43B3-948B-1728B52AA6E4}">
+                  <adec:decorative xmlns:adec="http://schemas.microsoft.com/office/drawing/2017/decorative" val="1"/>
+                </a:ext>
+              </a:extLst>
+            </p:cNvPr>
+            <p:cNvSpPr>
+              <a:spLocks/>
+            </p:cNvSpPr>
+            <p:nvPr>
+              <p:extLst>
+                <p:ext uri="{386F3935-93C4-4BCD-93E2-E3B085C9AB24}">
+                  <p16:designElem xmlns:p16="http://schemas.microsoft.com/office/powerpoint/2015/main" val="1"/>
+                </p:ext>
+              </p:extLst>
+            </p:nvPr>
+          </p:nvSpPr>
+          <p:spPr bwMode="auto">
+            <a:xfrm rot="1800000">
+              <a:off x="5463135" y="2432482"/>
+              <a:ext cx="1242172" cy="729202"/>
+            </a:xfrm>
+            <a:custGeom>
+              <a:avLst/>
+              <a:gdLst>
+                <a:gd name="T0" fmla="*/ 266 w 540"/>
+                <a:gd name="T1" fmla="*/ 0 h 317"/>
+                <a:gd name="T2" fmla="*/ 0 w 540"/>
+                <a:gd name="T3" fmla="*/ 158 h 317"/>
+                <a:gd name="T4" fmla="*/ 266 w 540"/>
+                <a:gd name="T5" fmla="*/ 317 h 317"/>
+                <a:gd name="T6" fmla="*/ 540 w 540"/>
+                <a:gd name="T7" fmla="*/ 158 h 317"/>
+                <a:gd name="T8" fmla="*/ 266 w 540"/>
+                <a:gd name="T9" fmla="*/ 0 h 317"/>
+              </a:gdLst>
+              <a:ahLst/>
+              <a:cxnLst>
+                <a:cxn ang="0">
+                  <a:pos x="T0" y="T1"/>
+                </a:cxn>
+                <a:cxn ang="0">
+                  <a:pos x="T2" y="T3"/>
+                </a:cxn>
+                <a:cxn ang="0">
+                  <a:pos x="T4" y="T5"/>
+                </a:cxn>
+                <a:cxn ang="0">
+                  <a:pos x="T6" y="T7"/>
+                </a:cxn>
+                <a:cxn ang="0">
+                  <a:pos x="T8" y="T9"/>
+                </a:cxn>
+              </a:cxnLst>
+              <a:rect l="0" t="0" r="r" b="b"/>
+              <a:pathLst>
+                <a:path w="540" h="317">
+                  <a:moveTo>
+                    <a:pt x="266" y="0"/>
+                  </a:moveTo>
+                  <a:lnTo>
+                    <a:pt x="0" y="158"/>
+                  </a:lnTo>
+                  <a:lnTo>
+                    <a:pt x="266" y="317"/>
+                  </a:lnTo>
+                  <a:lnTo>
+                    <a:pt x="540" y="158"/>
+                  </a:lnTo>
+                  <a:lnTo>
+                    <a:pt x="266" y="0"/>
+                  </a:lnTo>
+                  <a:close/>
+                </a:path>
+              </a:pathLst>
+            </a:custGeom>
+            <a:gradFill flip="none" rotWithShape="1">
+              <a:gsLst>
+                <a:gs pos="20000">
+                  <a:schemeClr val="bg2">
+                    <a:lumMod val="90000"/>
+                    <a:lumOff val="10000"/>
+                    <a:alpha val="20000"/>
+                  </a:schemeClr>
+                </a:gs>
+                <a:gs pos="100000">
+                  <a:schemeClr val="accent1">
+                    <a:lumMod val="60000"/>
+                    <a:lumOff val="40000"/>
+                    <a:alpha val="40000"/>
+                  </a:schemeClr>
+                </a:gs>
+              </a:gsLst>
+              <a:lin ang="0" scaled="0"/>
+              <a:tileRect/>
+            </a:gradFill>
+            <a:ln>
+              <a:noFill/>
+            </a:ln>
+            <a:effectLst>
+              <a:innerShdw blurRad="254000">
+                <a:schemeClr val="bg2">
+                  <a:lumMod val="90000"/>
+                  <a:lumOff val="10000"/>
+                </a:schemeClr>
+              </a:innerShdw>
+            </a:effectLst>
+          </p:spPr>
+          <p:style>
+            <a:lnRef idx="2">
+              <a:schemeClr val="accent1">
+                <a:shade val="50000"/>
+              </a:schemeClr>
+            </a:lnRef>
+            <a:fillRef idx="1">
+              <a:schemeClr val="accent1"/>
+            </a:fillRef>
+            <a:effectRef idx="0">
+              <a:schemeClr val="accent1"/>
+            </a:effectRef>
+            <a:fontRef idx="minor">
+              <a:schemeClr val="lt1"/>
+            </a:fontRef>
+          </p:style>
+          <p:txBody>
+            <a:bodyPr rot="0" spcFirstLastPara="0" vertOverflow="overflow" horzOverflow="overflow" vert="horz" wrap="square" lIns="91440" tIns="45720" rIns="91440" bIns="45720" numCol="1" spcCol="0" rtlCol="0" fromWordArt="0" anchor="ctr" anchorCtr="0" forceAA="0" compatLnSpc="1">
+              <a:prstTxWarp prst="textNoShape">
+                <a:avLst/>
+              </a:prstTxWarp>
+              <a:noAutofit/>
+            </a:bodyPr>
+            <a:lstStyle/>
+            <a:p>
+              <a:pPr algn="ctr"/>
+              <a:endParaRPr lang="en-US"/>
+            </a:p>
+          </p:txBody>
+        </p:sp>
+        <p:sp>
+          <p:nvSpPr>
+            <p:cNvPr id="57" name="Freeform 6">
+              <a:extLst>
+                <a:ext uri="{FF2B5EF4-FFF2-40B4-BE49-F238E27FC236}">
+                  <a16:creationId xmlns:a16="http://schemas.microsoft.com/office/drawing/2014/main" id="{842A0A68-39DD-4DA7-BAD5-63B9C1398718}"/>
+                </a:ext>
+                <a:ext uri="{C183D7F6-B498-43B3-948B-1728B52AA6E4}">
+                  <adec:decorative xmlns:adec="http://schemas.microsoft.com/office/drawing/2017/decorative" val="1"/>
+                </a:ext>
+              </a:extLst>
+            </p:cNvPr>
+            <p:cNvSpPr>
+              <a:spLocks/>
+            </p:cNvSpPr>
+            <p:nvPr>
+              <p:extLst>
+                <p:ext uri="{386F3935-93C4-4BCD-93E2-E3B085C9AB24}">
+                  <p16:designElem xmlns:p16="http://schemas.microsoft.com/office/powerpoint/2015/main" val="1"/>
+                </p:ext>
+              </p:extLst>
+            </p:nvPr>
+          </p:nvSpPr>
+          <p:spPr bwMode="auto">
+            <a:xfrm rot="1800000">
+              <a:off x="5236793" y="2566400"/>
+              <a:ext cx="611884" cy="1076550"/>
+            </a:xfrm>
+            <a:custGeom>
+              <a:avLst/>
+              <a:gdLst>
+                <a:gd name="T0" fmla="*/ 266 w 266"/>
+                <a:gd name="T1" fmla="*/ 468 h 468"/>
+                <a:gd name="T2" fmla="*/ 0 w 266"/>
+                <a:gd name="T3" fmla="*/ 310 h 468"/>
+                <a:gd name="T4" fmla="*/ 0 w 266"/>
+                <a:gd name="T5" fmla="*/ 310 h 468"/>
+                <a:gd name="T6" fmla="*/ 0 w 266"/>
+                <a:gd name="T7" fmla="*/ 0 h 468"/>
+                <a:gd name="T8" fmla="*/ 0 w 266"/>
+                <a:gd name="T9" fmla="*/ 0 h 468"/>
+                <a:gd name="T10" fmla="*/ 266 w 266"/>
+                <a:gd name="T11" fmla="*/ 159 h 468"/>
+                <a:gd name="T12" fmla="*/ 266 w 266"/>
+                <a:gd name="T13" fmla="*/ 468 h 468"/>
+              </a:gdLst>
+              <a:ahLst/>
+              <a:cxnLst>
+                <a:cxn ang="0">
+                  <a:pos x="T0" y="T1"/>
+                </a:cxn>
+                <a:cxn ang="0">
+                  <a:pos x="T2" y="T3"/>
+                </a:cxn>
+                <a:cxn ang="0">
+                  <a:pos x="T4" y="T5"/>
+                </a:cxn>
+                <a:cxn ang="0">
+                  <a:pos x="T6" y="T7"/>
+                </a:cxn>
+                <a:cxn ang="0">
+                  <a:pos x="T8" y="T9"/>
+                </a:cxn>
+                <a:cxn ang="0">
+                  <a:pos x="T10" y="T11"/>
+                </a:cxn>
+                <a:cxn ang="0">
+                  <a:pos x="T12" y="T13"/>
+                </a:cxn>
+              </a:cxnLst>
+              <a:rect l="0" t="0" r="r" b="b"/>
+              <a:pathLst>
+                <a:path w="266" h="468">
+                  <a:moveTo>
+                    <a:pt x="266" y="468"/>
+                  </a:moveTo>
+                  <a:lnTo>
+                    <a:pt x="0" y="310"/>
+                  </a:lnTo>
+                  <a:lnTo>
+                    <a:pt x="0" y="310"/>
+                  </a:lnTo>
+                  <a:lnTo>
+                    <a:pt x="0" y="0"/>
+                  </a:lnTo>
+                  <a:lnTo>
+                    <a:pt x="0" y="0"/>
+                  </a:lnTo>
+                  <a:lnTo>
+                    <a:pt x="266" y="159"/>
+                  </a:lnTo>
+                  <a:lnTo>
+                    <a:pt x="266" y="468"/>
+                  </a:lnTo>
+                  <a:close/>
+                </a:path>
+              </a:pathLst>
+            </a:custGeom>
+            <a:gradFill flip="none" rotWithShape="1">
+              <a:gsLst>
+                <a:gs pos="20000">
+                  <a:schemeClr val="bg2">
+                    <a:lumMod val="90000"/>
+                    <a:lumOff val="10000"/>
+                    <a:alpha val="20000"/>
+                  </a:schemeClr>
+                </a:gs>
+                <a:gs pos="100000">
+                  <a:schemeClr val="accent1">
+                    <a:lumMod val="60000"/>
+                    <a:lumOff val="40000"/>
+                    <a:alpha val="40000"/>
+                  </a:schemeClr>
+                </a:gs>
+              </a:gsLst>
+              <a:lin ang="19800000" scaled="0"/>
+              <a:tileRect/>
+            </a:gradFill>
+            <a:ln>
+              <a:noFill/>
+            </a:ln>
+            <a:effectLst>
+              <a:innerShdw blurRad="254000">
+                <a:schemeClr val="bg2">
+                  <a:lumMod val="90000"/>
+                  <a:lumOff val="10000"/>
+                </a:schemeClr>
+              </a:innerShdw>
+            </a:effectLst>
+          </p:spPr>
+          <p:style>
+            <a:lnRef idx="2">
+              <a:schemeClr val="accent1">
+                <a:shade val="50000"/>
+              </a:schemeClr>
+            </a:lnRef>
+            <a:fillRef idx="1">
+              <a:schemeClr val="accent1"/>
+            </a:fillRef>
+            <a:effectRef idx="0">
+              <a:schemeClr val="accent1"/>
+            </a:effectRef>
+            <a:fontRef idx="minor">
+              <a:schemeClr val="lt1"/>
+            </a:fontRef>
+          </p:style>
+          <p:txBody>
+            <a:bodyPr rot="0" spcFirstLastPara="0" vertOverflow="overflow" horzOverflow="overflow" vert="horz" wrap="square" lIns="91440" tIns="45720" rIns="91440" bIns="45720" numCol="1" spcCol="0" rtlCol="0" fromWordArt="0" anchor="ctr" anchorCtr="0" forceAA="0" compatLnSpc="1">
+              <a:prstTxWarp prst="textNoShape">
+                <a:avLst/>
+              </a:prstTxWarp>
+              <a:noAutofit/>
+            </a:bodyPr>
+            <a:lstStyle/>
+            <a:p>
+              <a:pPr algn="ctr"/>
+              <a:endParaRPr lang="en-US"/>
+            </a:p>
+          </p:txBody>
+        </p:sp>
+        <p:sp>
+          <p:nvSpPr>
+            <p:cNvPr id="58" name="Freeform 8">
+              <a:extLst>
+                <a:ext uri="{FF2B5EF4-FFF2-40B4-BE49-F238E27FC236}">
+                  <a16:creationId xmlns:a16="http://schemas.microsoft.com/office/drawing/2014/main" id="{21A69E50-7E10-45C3-B4F2-19DBA7748498}"/>
+                </a:ext>
+                <a:ext uri="{C183D7F6-B498-43B3-948B-1728B52AA6E4}">
+                  <adec:decorative xmlns:adec="http://schemas.microsoft.com/office/drawing/2017/decorative" val="1"/>
+                </a:ext>
+              </a:extLst>
+            </p:cNvPr>
+            <p:cNvSpPr>
+              <a:spLocks/>
+            </p:cNvSpPr>
+            <p:nvPr>
+              <p:extLst>
+                <p:ext uri="{386F3935-93C4-4BCD-93E2-E3B085C9AB24}">
+                  <p16:designElem xmlns:p16="http://schemas.microsoft.com/office/powerpoint/2015/main" val="1"/>
+                </p:ext>
+              </p:extLst>
+            </p:nvPr>
+          </p:nvSpPr>
+          <p:spPr bwMode="auto">
+            <a:xfrm rot="1800000">
+              <a:off x="5765469" y="2876944"/>
+              <a:ext cx="630288" cy="1076550"/>
+            </a:xfrm>
+            <a:custGeom>
+              <a:avLst/>
+              <a:gdLst>
+                <a:gd name="T0" fmla="*/ 274 w 274"/>
+                <a:gd name="T1" fmla="*/ 0 h 468"/>
+                <a:gd name="T2" fmla="*/ 274 w 274"/>
+                <a:gd name="T3" fmla="*/ 310 h 468"/>
+                <a:gd name="T4" fmla="*/ 274 w 274"/>
+                <a:gd name="T5" fmla="*/ 310 h 468"/>
+                <a:gd name="T6" fmla="*/ 0 w 274"/>
+                <a:gd name="T7" fmla="*/ 468 h 468"/>
+                <a:gd name="T8" fmla="*/ 0 w 274"/>
+                <a:gd name="T9" fmla="*/ 159 h 468"/>
+                <a:gd name="T10" fmla="*/ 274 w 274"/>
+                <a:gd name="T11" fmla="*/ 0 h 468"/>
+                <a:gd name="T12" fmla="*/ 274 w 274"/>
+                <a:gd name="T13" fmla="*/ 0 h 468"/>
+              </a:gdLst>
+              <a:ahLst/>
+              <a:cxnLst>
+                <a:cxn ang="0">
+                  <a:pos x="T0" y="T1"/>
+                </a:cxn>
+                <a:cxn ang="0">
+                  <a:pos x="T2" y="T3"/>
+                </a:cxn>
+                <a:cxn ang="0">
+                  <a:pos x="T4" y="T5"/>
+                </a:cxn>
+                <a:cxn ang="0">
+                  <a:pos x="T6" y="T7"/>
+                </a:cxn>
+                <a:cxn ang="0">
+                  <a:pos x="T8" y="T9"/>
+                </a:cxn>
+                <a:cxn ang="0">
+                  <a:pos x="T10" y="T11"/>
+                </a:cxn>
+                <a:cxn ang="0">
+                  <a:pos x="T12" y="T13"/>
+                </a:cxn>
+              </a:cxnLst>
+              <a:rect l="0" t="0" r="r" b="b"/>
+              <a:pathLst>
+                <a:path w="274" h="468">
+                  <a:moveTo>
+                    <a:pt x="274" y="0"/>
+                  </a:moveTo>
+                  <a:lnTo>
+                    <a:pt x="274" y="310"/>
+                  </a:lnTo>
+                  <a:lnTo>
+                    <a:pt x="274" y="310"/>
+                  </a:lnTo>
+                  <a:lnTo>
+                    <a:pt x="0" y="468"/>
+                  </a:lnTo>
+                  <a:lnTo>
+                    <a:pt x="0" y="159"/>
+                  </a:lnTo>
+                  <a:lnTo>
+                    <a:pt x="274" y="0"/>
+                  </a:lnTo>
+                  <a:lnTo>
+                    <a:pt x="274" y="0"/>
+                  </a:lnTo>
+                  <a:close/>
+                </a:path>
+              </a:pathLst>
+            </a:custGeom>
+            <a:gradFill flip="none" rotWithShape="1">
+              <a:gsLst>
+                <a:gs pos="20000">
+                  <a:schemeClr val="bg2">
+                    <a:lumMod val="90000"/>
+                    <a:lumOff val="10000"/>
+                    <a:alpha val="20000"/>
+                  </a:schemeClr>
+                </a:gs>
+                <a:gs pos="100000">
+                  <a:schemeClr val="accent1">
+                    <a:lumMod val="40000"/>
+                    <a:lumOff val="60000"/>
+                    <a:alpha val="60000"/>
+                  </a:schemeClr>
+                </a:gs>
+              </a:gsLst>
+              <a:lin ang="18000000" scaled="0"/>
+              <a:tileRect/>
+            </a:gradFill>
+            <a:ln>
+              <a:noFill/>
+            </a:ln>
+            <a:effectLst>
+              <a:innerShdw blurRad="508000">
+                <a:schemeClr val="accent1">
+                  <a:lumMod val="60000"/>
+                  <a:lumOff val="40000"/>
+                  <a:alpha val="40000"/>
+                </a:schemeClr>
+              </a:innerShdw>
+            </a:effectLst>
+          </p:spPr>
+          <p:style>
+            <a:lnRef idx="2">
+              <a:schemeClr val="accent1">
+                <a:shade val="50000"/>
+              </a:schemeClr>
+            </a:lnRef>
+            <a:fillRef idx="1">
+              <a:schemeClr val="accent1"/>
+            </a:fillRef>
+            <a:effectRef idx="0">
+              <a:schemeClr val="accent1"/>
+            </a:effectRef>
+            <a:fontRef idx="minor">
+              <a:schemeClr val="lt1"/>
+            </a:fontRef>
+          </p:style>
+          <p:txBody>
+            <a:bodyPr rot="0" spcFirstLastPara="0" vertOverflow="overflow" horzOverflow="overflow" vert="horz" wrap="square" lIns="91440" tIns="45720" rIns="91440" bIns="45720" numCol="1" spcCol="0" rtlCol="0" fromWordArt="0" anchor="ctr" anchorCtr="0" forceAA="0" compatLnSpc="1">
+              <a:prstTxWarp prst="textNoShape">
+                <a:avLst/>
+              </a:prstTxWarp>
+              <a:noAutofit/>
+            </a:bodyPr>
+            <a:lstStyle/>
+            <a:p>
+              <a:pPr algn="ctr"/>
+              <a:endParaRPr lang="en-US"/>
+            </a:p>
+          </p:txBody>
+        </p:sp>
+      </p:grpSp>
+      <p:sp>
+        <p:nvSpPr>
+          <p:cNvPr id="60" name="Oval 59">
+            <a:extLst>
+              <a:ext uri="{FF2B5EF4-FFF2-40B4-BE49-F238E27FC236}">
+                <a16:creationId xmlns:a16="http://schemas.microsoft.com/office/drawing/2014/main" id="{D166A8AB-8924-421C-BCED-B54DBC4054E0}"/>
+              </a:ext>
+              <a:ext uri="{C183D7F6-B498-43B3-948B-1728B52AA6E4}">
+                <adec:decorative xmlns:adec="http://schemas.microsoft.com/office/drawing/2017/decorative" val="1"/>
+              </a:ext>
+            </a:extLst>
+          </p:cNvPr>
+          <p:cNvSpPr>
+            <a:spLocks noGrp="1" noRot="1" noChangeAspect="1" noMove="1" noResize="1" noEditPoints="1" noAdjustHandles="1" noChangeArrowheads="1" noChangeShapeType="1" noTextEdit="1"/>
+          </p:cNvSpPr>
+          <p:nvPr>
+            <p:extLst>
+              <p:ext uri="{386F3935-93C4-4BCD-93E2-E3B085C9AB24}">
+                <p16:designElem xmlns:p16="http://schemas.microsoft.com/office/powerpoint/2015/main" val="1"/>
+              </p:ext>
+            </p:extLst>
+          </p:nvPr>
+        </p:nvSpPr>
+        <p:spPr>
+          <a:xfrm>
+            <a:off x="2677897" y="5497189"/>
+            <a:ext cx="360000" cy="360000"/>
+          </a:xfrm>
+          <a:prstGeom prst="ellipse">
+            <a:avLst/>
+          </a:prstGeom>
+          <a:gradFill flip="none" rotWithShape="1">
+            <a:gsLst>
+              <a:gs pos="100000">
+                <a:schemeClr val="bg2">
+                  <a:lumMod val="50000"/>
+                  <a:lumOff val="50000"/>
+                </a:schemeClr>
+              </a:gs>
+              <a:gs pos="60000">
+                <a:schemeClr val="bg2"/>
+              </a:gs>
+            </a:gsLst>
+            <a:path path="circle">
+              <a:fillToRect l="100000" b="100000"/>
+            </a:path>
+            <a:tileRect t="-100000" r="-100000"/>
+          </a:gradFill>
+          <a:ln>
+            <a:noFill/>
+          </a:ln>
+          <a:effectLst>
+            <a:innerShdw blurRad="127000" dist="63500" dir="2700000">
+              <a:schemeClr val="accent1">
+                <a:lumMod val="60000"/>
+                <a:lumOff val="40000"/>
+                <a:alpha val="20000"/>
+              </a:schemeClr>
+            </a:innerShdw>
+            <a:softEdge rad="0"/>
+          </a:effectLst>
+        </p:spPr>
+        <p:style>
+          <a:lnRef idx="2">
+            <a:schemeClr val="accent1">
+              <a:shade val="50000"/>
+            </a:schemeClr>
+          </a:lnRef>
+          <a:fillRef idx="1">
+            <a:schemeClr val="accent1"/>
+          </a:fillRef>
+          <a:effectRef idx="0">
+            <a:schemeClr val="accent1"/>
+          </a:effectRef>
+          <a:fontRef idx="minor">
+            <a:schemeClr val="lt1"/>
+          </a:fontRef>
+        </p:style>
+        <p:txBody>
+          <a:bodyPr rot="0" spcFirstLastPara="0" vertOverflow="overflow" horzOverflow="overflow" vert="horz" wrap="square" lIns="91440" tIns="45720" rIns="91440" bIns="45720" numCol="1" spcCol="0" rtlCol="0" fromWordArt="0" anchor="ctr" anchorCtr="0" forceAA="0" compatLnSpc="1">
+            <a:prstTxWarp prst="textNoShape">
+              <a:avLst/>
+            </a:prstTxWarp>
+            <a:noAutofit/>
+          </a:bodyPr>
+          <a:lstStyle/>
+          <a:p>
+            <a:pPr algn="ctr"/>
+            <a:endParaRPr lang="en-US"/>
+          </a:p>
+        </p:txBody>
+      </p:sp>
+      <p:sp>
+        <p:nvSpPr>
+          <p:cNvPr id="3" name="Tijdelijke aanduiding voor inhoud 2">
+            <a:extLst>
+              <a:ext uri="{FF2B5EF4-FFF2-40B4-BE49-F238E27FC236}">
+                <a16:creationId xmlns:a16="http://schemas.microsoft.com/office/drawing/2014/main" id="{98550410-D171-4686-BEC3-A9FCC787AE7D}"/>
+              </a:ext>
+            </a:extLst>
+          </p:cNvPr>
+          <p:cNvSpPr>
+            <a:spLocks noGrp="1"/>
+          </p:cNvSpPr>
+          <p:nvPr>
+            <p:ph idx="1"/>
+          </p:nvPr>
+        </p:nvSpPr>
+        <p:spPr>
+          <a:xfrm>
+            <a:off x="550863" y="2677306"/>
+            <a:ext cx="3565525" cy="3415519"/>
+          </a:xfrm>
+        </p:spPr>
+        <p:txBody>
+          <a:bodyPr anchor="t">
+            <a:normAutofit/>
+          </a:bodyPr>
+          <a:lstStyle/>
+          <a:p>
+            <a:r>
+              <a:rPr lang="en-US" sz="1600" dirty="0">
+                <a:latin typeface="Adobe Clean" panose="020B0503020404020204" pitchFamily="34" charset="0"/>
+              </a:rPr>
+              <a:t>Input</a:t>
+            </a:r>
+          </a:p>
+          <a:p>
+            <a:r>
+              <a:rPr lang="en-US" sz="1600">
+                <a:latin typeface="Adobe Clean" panose="020B0503020404020204" pitchFamily="34" charset="0"/>
+              </a:rPr>
+              <a:t>Speed</a:t>
+            </a:r>
+            <a:endParaRPr lang="en-US" sz="1600" dirty="0">
+              <a:latin typeface="Adobe Clean" panose="020B0503020404020204" pitchFamily="34" charset="0"/>
+            </a:endParaRPr>
+          </a:p>
+          <a:p>
+            <a:r>
+              <a:rPr lang="en-US" sz="1600" dirty="0">
+                <a:latin typeface="Adobe Clean" panose="020B0503020404020204" pitchFamily="34" charset="0"/>
+              </a:rPr>
+              <a:t>Steering system</a:t>
+            </a:r>
+          </a:p>
+          <a:p>
+            <a:r>
+              <a:rPr lang="en-US" sz="1600" dirty="0">
+                <a:latin typeface="Adobe Clean" panose="020B0503020404020204" pitchFamily="34" charset="0"/>
+              </a:rPr>
+              <a:t>Understeer</a:t>
+            </a:r>
+          </a:p>
+          <a:p>
+            <a:r>
+              <a:rPr lang="en-US" sz="1600" dirty="0">
+                <a:latin typeface="Adobe Clean" panose="020B0503020404020204" pitchFamily="34" charset="0"/>
+              </a:rPr>
+              <a:t>Braking</a:t>
+            </a:r>
+          </a:p>
+          <a:p>
+            <a:r>
+              <a:rPr lang="en-US" sz="1600" dirty="0">
+                <a:latin typeface="Adobe Clean" panose="020B0503020404020204" pitchFamily="34" charset="0"/>
+              </a:rPr>
+              <a:t>Rumble</a:t>
+            </a:r>
+          </a:p>
+        </p:txBody>
+      </p:sp>
+      <p:pic>
+        <p:nvPicPr>
+          <p:cNvPr id="48" name="Afbeelding 47">
+            <a:extLst>
+              <a:ext uri="{FF2B5EF4-FFF2-40B4-BE49-F238E27FC236}">
+                <a16:creationId xmlns:a16="http://schemas.microsoft.com/office/drawing/2014/main" id="{F1EAECA5-795E-4CC8-9B6A-AF462F3CEB9A}"/>
+              </a:ext>
+            </a:extLst>
+          </p:cNvPr>
+          <p:cNvPicPr>
+            <a:picLocks noChangeAspect="1"/>
+          </p:cNvPicPr>
+          <p:nvPr/>
+        </p:nvPicPr>
+        <p:blipFill>
+          <a:blip r:embed="rId2"/>
+          <a:stretch>
+            <a:fillRect/>
+          </a:stretch>
+        </p:blipFill>
+        <p:spPr>
+          <a:xfrm>
+            <a:off x="5193438" y="549275"/>
+            <a:ext cx="5805160" cy="5759451"/>
+          </a:xfrm>
+          <a:custGeom>
+            <a:avLst/>
+            <a:gdLst/>
+            <a:ahLst/>
+            <a:cxnLst/>
+            <a:rect l="l" t="t" r="r" b="b"/>
+            <a:pathLst>
+              <a:path w="7090237" h="5759451">
+                <a:moveTo>
+                  <a:pt x="0" y="0"/>
+                </a:moveTo>
+                <a:lnTo>
+                  <a:pt x="7090237" y="0"/>
+                </a:lnTo>
+                <a:lnTo>
+                  <a:pt x="7090237" y="5759451"/>
+                </a:lnTo>
+                <a:lnTo>
+                  <a:pt x="0" y="5759451"/>
+                </a:lnTo>
+                <a:close/>
+              </a:path>
+            </a:pathLst>
+          </a:custGeom>
+        </p:spPr>
+      </p:pic>
+    </p:spTree>
+    <p:extLst>
+      <p:ext uri="{BB962C8B-B14F-4D97-AF65-F5344CB8AC3E}">
+        <p14:creationId xmlns:p14="http://schemas.microsoft.com/office/powerpoint/2010/main" val="1417393680"/>
+      </p:ext>
+    </p:extLst>
+  </p:cSld>
+  <p:clrMapOvr>
+    <a:masterClrMapping/>
+  </p:clrMapOvr>
+</p:sld>
+</file>
+
+<file path=ppt/slides/slide7.xml><?xml version="1.0" encoding="utf-8"?>
+<p:sld xmlns:a="http://schemas.openxmlformats.org/drawingml/2006/main" xmlns:r="http://schemas.openxmlformats.org/officeDocument/2006/relationships" xmlns:p="http://schemas.openxmlformats.org/presentationml/2006/main">
+  <p:cSld>
     <p:spTree>
       <p:nvGrpSpPr>
         <p:cNvPr id="1" name=""/>
@@ -10681,13 +11629,19 @@
           <a:lstStyle/>
           <a:p>
             <a:r>
-              <a:rPr lang="en-US" sz="4800" dirty="0"/>
-              <a:t>4. The game</a:t>
+              <a:rPr lang="en-US" sz="4800" dirty="0">
+                <a:latin typeface="Adobe Clean" panose="020B0503020404020204" pitchFamily="34" charset="0"/>
+              </a:rPr>
+              <a:t>5. The game</a:t>
             </a:r>
             <a:br>
-              <a:rPr lang="en-US" sz="4800" dirty="0"/>
+              <a:rPr lang="en-US" sz="4800" dirty="0">
+                <a:latin typeface="Adobe Clean" panose="020B0503020404020204" pitchFamily="34" charset="0"/>
+              </a:rPr>
             </a:br>
-            <a:endParaRPr lang="en-US" dirty="0"/>
+            <a:endParaRPr lang="en-US" dirty="0">
+              <a:latin typeface="Adobe Clean" panose="020B0503020404020204" pitchFamily="34" charset="0"/>
+            </a:endParaRPr>
           </a:p>
         </p:txBody>
       </p:sp>

</xml_diff>

<commit_message>
Updated prsentation and projectplan
</commit_message>
<xml_diff>
--- a/Presentatie GTRacingPro.pptx
+++ b/Presentatie GTRacingPro.pptx
@@ -9,9 +9,8 @@
     <p:sldId id="260" r:id="rId3"/>
     <p:sldId id="256" r:id="rId4"/>
     <p:sldId id="259" r:id="rId5"/>
-    <p:sldId id="261" r:id="rId6"/>
-    <p:sldId id="263" r:id="rId7"/>
-    <p:sldId id="262" r:id="rId8"/>
+    <p:sldId id="263" r:id="rId6"/>
+    <p:sldId id="261" r:id="rId7"/>
   </p:sldIdLst>
   <p:sldSz cx="12192000" cy="6858000"/>
   <p:notesSz cx="6858000" cy="9144000"/>
@@ -283,7 +282,7 @@
           <a:p>
             <a:fld id="{72EA7947-E287-4738-8C82-07CE4F01EF03}" type="datetime2">
               <a:rPr lang="en-US" smtClean="0"/>
-              <a:t>Wednesday, April 6, 2022</a:t>
+              <a:t>Thursday, April 7, 2022</a:t>
             </a:fld>
             <a:endParaRPr lang="en-US" dirty="0"/>
           </a:p>
@@ -1319,7 +1318,7 @@
           <a:p>
             <a:fld id="{EE2EBD84-71F4-4271-8C46-0D47C0A9B12E}" type="datetime2">
               <a:rPr lang="en-US" smtClean="0"/>
-              <a:t>Wednesday, April 6, 2022</a:t>
+              <a:t>Thursday, April 7, 2022</a:t>
             </a:fld>
             <a:endParaRPr lang="en-US"/>
           </a:p>
@@ -1530,7 +1529,7 @@
           <a:p>
             <a:fld id="{ABAE0CE1-F450-4107-B2CB-17B18F8A3F4A}" type="datetime2">
               <a:rPr lang="en-US" smtClean="0"/>
-              <a:t>Wednesday, April 6, 2022</a:t>
+              <a:t>Thursday, April 7, 2022</a:t>
             </a:fld>
             <a:endParaRPr lang="en-US"/>
           </a:p>
@@ -2195,7 +2194,7 @@
           <a:p>
             <a:fld id="{6FE8C025-CD7A-4966-867E-81CF82B15267}" type="datetime2">
               <a:rPr lang="en-US" smtClean="0"/>
-              <a:t>Wednesday, April 6, 2022</a:t>
+              <a:t>Thursday, April 7, 2022</a:t>
             </a:fld>
             <a:endParaRPr lang="en-US"/>
           </a:p>
@@ -2815,7 +2814,7 @@
           <a:p>
             <a:fld id="{FE809929-0719-4517-94D6-FDF7F99E70F6}" type="datetime2">
               <a:rPr lang="en-US" smtClean="0"/>
-              <a:t>Wednesday, April 6, 2022</a:t>
+              <a:t>Thursday, April 7, 2022</a:t>
             </a:fld>
             <a:endParaRPr lang="en-US"/>
           </a:p>
@@ -3933,7 +3932,7 @@
           <a:p>
             <a:fld id="{20E95673-5512-4AAA-9AEB-E00C61EC65D5}" type="datetime2">
               <a:rPr lang="en-US" smtClean="0"/>
-              <a:t>Wednesday, April 6, 2022</a:t>
+              <a:t>Thursday, April 7, 2022</a:t>
             </a:fld>
             <a:endParaRPr lang="en-US"/>
           </a:p>
@@ -4480,7 +4479,7 @@
           <a:p>
             <a:fld id="{C13138FA-2E87-4873-8BBA-13E447C9A99A}" type="datetime2">
               <a:rPr lang="en-US" smtClean="0"/>
-              <a:t>Wednesday, April 6, 2022</a:t>
+              <a:t>Thursday, April 7, 2022</a:t>
             </a:fld>
             <a:endParaRPr lang="en-US"/>
           </a:p>
@@ -4641,7 +4640,7 @@
           <a:p>
             <a:fld id="{D75BB40A-97BD-4BFB-B639-0BFF95FDE8B7}" type="datetime2">
               <a:rPr lang="en-US" smtClean="0"/>
-              <a:t>Wednesday, April 6, 2022</a:t>
+              <a:t>Thursday, April 7, 2022</a:t>
             </a:fld>
             <a:endParaRPr lang="en-US"/>
           </a:p>
@@ -5676,7 +5675,7 @@
           <a:p>
             <a:fld id="{9EE9E0E3-ECF6-4CFE-8698-AEFEBCECC3C0}" type="datetime2">
               <a:rPr lang="en-US" smtClean="0"/>
-              <a:t>Wednesday, April 6, 2022</a:t>
+              <a:t>Thursday, April 7, 2022</a:t>
             </a:fld>
             <a:endParaRPr lang="en-US"/>
           </a:p>
@@ -6322,7 +6321,7 @@
           <a:p>
             <a:fld id="{251462FC-960E-4740-921F-B36862979F21}" type="datetime2">
               <a:rPr lang="en-US" smtClean="0"/>
-              <a:t>Wednesday, April 6, 2022</a:t>
+              <a:t>Thursday, April 7, 2022</a:t>
             </a:fld>
             <a:endParaRPr lang="en-US"/>
           </a:p>
@@ -7086,7 +7085,7 @@
           <a:p>
             <a:fld id="{E50BC9E2-CB44-4C05-9BB5-496C18A241E0}" type="datetime2">
               <a:rPr lang="en-US" smtClean="0"/>
-              <a:t>Wednesday, April 6, 2022</a:t>
+              <a:t>Thursday, April 7, 2022</a:t>
             </a:fld>
             <a:endParaRPr lang="en-US"/>
           </a:p>
@@ -7339,7 +7338,7 @@
           <a:p>
             <a:fld id="{246CB39B-5F4C-4A7E-9BE3-AAFD45576D16}" type="datetime2">
               <a:rPr lang="en-US" smtClean="0"/>
-              <a:t>Wednesday, April 6, 2022</a:t>
+              <a:t>Thursday, April 7, 2022</a:t>
             </a:fld>
             <a:endParaRPr lang="en-US" dirty="0"/>
           </a:p>
@@ -7887,7 +7886,7 @@
       </p:grpSpPr>
       <p:sp useBgFill="1">
         <p:nvSpPr>
-          <p:cNvPr id="16" name="Rectangle 15">
+          <p:cNvPr id="23" name="Rectangle 22">
             <a:extLst>
               <a:ext uri="{FF2B5EF4-FFF2-40B4-BE49-F238E27FC236}">
                 <a16:creationId xmlns:a16="http://schemas.microsoft.com/office/drawing/2014/main" id="{A5931BE0-4B93-4D6C-878E-ACC59D6B4587}"/>
@@ -7980,7 +7979,7 @@
         <p:spPr>
           <a:xfrm>
             <a:off x="550863" y="549275"/>
-            <a:ext cx="3891827" cy="1997855"/>
+            <a:ext cx="3744045" cy="1997855"/>
           </a:xfrm>
         </p:spPr>
         <p:txBody>
@@ -7990,14 +7989,11 @@
           <a:lstStyle/>
           <a:p>
             <a:r>
-              <a:rPr lang="en-US" sz="4400" dirty="0" err="1">
+              <a:rPr lang="en-US" sz="4100" dirty="0">
                 <a:latin typeface="Adobe Clean" panose="020B0503020404020204" pitchFamily="34" charset="0"/>
               </a:rPr>
-              <a:t>Inhoudsopagave</a:t>
+              <a:t>Contents</a:t>
             </a:r>
-            <a:endParaRPr lang="en-US" sz="4400" dirty="0">
-              <a:latin typeface="Adobe Clean" panose="020B0503020404020204" pitchFamily="34" charset="0"/>
-            </a:endParaRPr>
           </a:p>
         </p:txBody>
       </p:sp>
@@ -8030,26 +8026,26 @@
           <a:lstStyle/>
           <a:p>
             <a:r>
-              <a:rPr lang="en-US" sz="2400" dirty="0">
+              <a:rPr lang="en-US" sz="1600" dirty="0">
                 <a:latin typeface="Adobe Clean" panose="020B0503020404020204" pitchFamily="34" charset="0"/>
               </a:rPr>
               <a:t>1. </a:t>
             </a:r>
             <a:r>
-              <a:rPr lang="en-US" sz="2400" dirty="0">
+              <a:rPr lang="en-US" sz="1600" dirty="0">
                 <a:effectLst/>
                 <a:latin typeface="Adobe Clean" panose="020B0503020404020204" pitchFamily="34" charset="0"/>
                 <a:ea typeface="Calibri" panose="020F0502020204030204" pitchFamily="34" charset="0"/>
               </a:rPr>
               <a:t>Project description</a:t>
             </a:r>
-            <a:endParaRPr lang="en-US" sz="2400" dirty="0">
+            <a:endParaRPr lang="en-US" sz="1600" dirty="0">
               <a:latin typeface="Adobe Clean" panose="020B0503020404020204" pitchFamily="34" charset="0"/>
             </a:endParaRPr>
           </a:p>
           <a:p>
             <a:r>
-              <a:rPr lang="en-US" sz="2400" dirty="0">
+              <a:rPr lang="en-US" sz="1600" dirty="0">
                 <a:latin typeface="Adobe Clean" panose="020B0503020404020204" pitchFamily="34" charset="0"/>
               </a:rPr>
               <a:t>2. Game design </a:t>
@@ -8057,41 +8053,28 @@
           </a:p>
           <a:p>
             <a:r>
-              <a:rPr lang="en-US" sz="2400" dirty="0">
+              <a:rPr lang="en-US" sz="1600" dirty="0">
                 <a:latin typeface="Adobe Clean" panose="020B0503020404020204" pitchFamily="34" charset="0"/>
               </a:rPr>
-              <a:t>3. Obstacles</a:t>
+              <a:t>3. The Car</a:t>
             </a:r>
           </a:p>
           <a:p>
             <a:r>
-              <a:rPr lang="en-US" sz="2400" dirty="0">
+              <a:rPr lang="en-US" sz="1600" dirty="0">
                 <a:latin typeface="Adobe Clean" panose="020B0503020404020204" pitchFamily="34" charset="0"/>
               </a:rPr>
-              <a:t>4. The Car</a:t>
+              <a:t>4. Obstacles</a:t>
             </a:r>
-          </a:p>
-          <a:p>
-            <a:r>
-              <a:rPr lang="en-US" sz="2400" dirty="0">
-                <a:latin typeface="Adobe Clean" panose="020B0503020404020204" pitchFamily="34" charset="0"/>
-              </a:rPr>
-              <a:t>5. The game</a:t>
-            </a:r>
-          </a:p>
-          <a:p>
-            <a:endParaRPr lang="en-US" sz="1600" dirty="0">
-              <a:latin typeface="Adobe Clean" panose="020B0503020404020204" pitchFamily="34" charset="0"/>
-            </a:endParaRPr>
           </a:p>
         </p:txBody>
       </p:sp>
       <p:pic>
         <p:nvPicPr>
-          <p:cNvPr id="4" name="Afbeelding 3" descr="Afbeelding met kleurrijk&#10;&#10;Automatisch gegenereerde beschrijving">
+          <p:cNvPr id="8" name="Afbeelding 7">
             <a:extLst>
               <a:ext uri="{FF2B5EF4-FFF2-40B4-BE49-F238E27FC236}">
-                <a16:creationId xmlns:a16="http://schemas.microsoft.com/office/drawing/2014/main" id="{240B031B-1A4C-47B1-9934-0268CD6D4A02}"/>
+                <a16:creationId xmlns:a16="http://schemas.microsoft.com/office/drawing/2014/main" id="{7E23439B-3F94-4D54-8979-0497EAB7C196}"/>
               </a:ext>
             </a:extLst>
           </p:cNvPr>
@@ -8102,12 +8085,12 @@
         </p:nvPicPr>
         <p:blipFill rotWithShape="1">
           <a:blip r:embed="rId2"/>
-          <a:srcRect l="20482" r="16845"/>
+          <a:srcRect l="18636" r="5041" b="-1"/>
           <a:stretch/>
         </p:blipFill>
         <p:spPr>
           <a:xfrm>
-            <a:off x="4550899" y="10"/>
+            <a:off x="4667251" y="0"/>
             <a:ext cx="7641102" cy="6857990"/>
           </a:xfrm>
           <a:custGeom>
@@ -8138,7 +8121,7 @@
       </p:pic>
       <p:sp>
         <p:nvSpPr>
-          <p:cNvPr id="18" name="Rectangle 17">
+          <p:cNvPr id="25" name="Rectangle 24">
             <a:extLst>
               <a:ext uri="{FF2B5EF4-FFF2-40B4-BE49-F238E27FC236}">
                 <a16:creationId xmlns:a16="http://schemas.microsoft.com/office/drawing/2014/main" id="{6FF3A87B-2255-45E0-A551-C11FAF93290C}"/>
@@ -9498,63 +9481,1212 @@
           </a:p>
         </p:txBody>
       </p:sp>
-      <p:pic>
-        <p:nvPicPr>
-          <p:cNvPr id="7" name="Tijdelijke aanduiding voor inhoud 6">
+      <p:sp>
+        <p:nvSpPr>
+          <p:cNvPr id="3" name="Tekstvak 9">
             <a:extLst>
               <a:ext uri="{FF2B5EF4-FFF2-40B4-BE49-F238E27FC236}">
-                <a16:creationId xmlns:a16="http://schemas.microsoft.com/office/drawing/2014/main" id="{419C1471-867D-43AB-8D5F-F886D9CC363D}"/>
+                <a16:creationId xmlns:a16="http://schemas.microsoft.com/office/drawing/2014/main" id="{B61C6792-9D8A-4436-B0BF-3FA3B44300CB}"/>
               </a:ext>
             </a:extLst>
           </p:cNvPr>
-          <p:cNvPicPr>
-            <a:picLocks noChangeAspect="1"/>
-          </p:cNvPicPr>
+          <p:cNvSpPr txBox="1">
+            <a:spLocks noChangeArrowheads="1"/>
+          </p:cNvSpPr>
           <p:nvPr/>
-        </p:nvPicPr>
-        <p:blipFill>
-          <a:blip r:embed="rId2">
+        </p:nvSpPr>
+        <p:spPr bwMode="auto">
+          <a:xfrm>
+            <a:off x="4434445" y="1119486"/>
+            <a:ext cx="1036638" cy="892175"/>
+          </a:xfrm>
+          <a:prstGeom prst="rect">
+            <a:avLst/>
+          </a:prstGeom>
+          <a:solidFill>
+            <a:srgbClr val="4472C4"/>
+          </a:solidFill>
+          <a:ln>
+            <a:noFill/>
+          </a:ln>
+          <a:extLst>
+            <a:ext uri="{91240B29-F687-4F45-9708-019B960494DF}">
+              <a14:hiddenLine xmlns:a14="http://schemas.microsoft.com/office/drawing/2010/main" w="9525">
+                <a:solidFill>
+                  <a:srgbClr val="000000"/>
+                </a:solidFill>
+                <a:miter lim="800000"/>
+                <a:headEnd/>
+                <a:tailEnd/>
+              </a14:hiddenLine>
+            </a:ext>
+          </a:extLst>
+        </p:spPr>
+        <p:txBody>
+          <a:bodyPr vert="horz" wrap="square" lIns="91440" tIns="45720" rIns="91440" bIns="45720" numCol="1" anchor="t" anchorCtr="0" compatLnSpc="1">
+            <a:prstTxWarp prst="textNoShape">
+              <a:avLst/>
+            </a:prstTxWarp>
+          </a:bodyPr>
+          <a:lstStyle/>
+          <a:p>
+            <a:pPr marL="0" marR="0" lvl="0" indent="0" algn="ctr" defTabSz="914400" rtl="0" eaLnBrk="0" fontAlgn="base" latinLnBrk="0" hangingPunct="0">
+              <a:lnSpc>
+                <a:spcPct val="100000"/>
+              </a:lnSpc>
+              <a:spcBef>
+                <a:spcPct val="0"/>
+              </a:spcBef>
+              <a:spcAft>
+                <a:spcPct val="0"/>
+              </a:spcAft>
+              <a:buClrTx/>
+              <a:buSzTx/>
+              <a:buFontTx/>
+              <a:buNone/>
+              <a:tabLst/>
+            </a:pPr>
+            <a:r>
+              <a:rPr kumimoji="0" lang="nl-NL" altLang="nl-NL" sz="4800" b="0" i="0" u="none" strike="noStrike" cap="none" normalizeH="0" baseline="0">
+                <a:ln>
+                  <a:noFill/>
+                </a:ln>
+                <a:solidFill>
+                  <a:schemeClr val="tx1"/>
+                </a:solidFill>
+                <a:effectLst/>
+                <a:latin typeface="Calibri" panose="020F0502020204030204" pitchFamily="34" charset="0"/>
+                <a:ea typeface="Calibri" panose="020F0502020204030204" pitchFamily="34" charset="0"/>
+                <a:cs typeface="Times New Roman" panose="02020603050405020304" pitchFamily="18" charset="0"/>
+              </a:rPr>
+              <a:t>M</a:t>
+            </a:r>
+            <a:endParaRPr kumimoji="0" lang="nl-NL" altLang="nl-NL" sz="1800" b="0" i="0" u="none" strike="noStrike" cap="none" normalizeH="0" baseline="0">
+              <a:ln>
+                <a:noFill/>
+              </a:ln>
+              <a:solidFill>
+                <a:schemeClr val="tx1"/>
+              </a:solidFill>
+              <a:effectLst/>
+              <a:latin typeface="Arial" panose="020B0604020202020204" pitchFamily="34" charset="0"/>
+            </a:endParaRPr>
+          </a:p>
+        </p:txBody>
+      </p:sp>
+      <p:sp>
+        <p:nvSpPr>
+          <p:cNvPr id="4" name="Tekstvak 10">
             <a:extLst>
-              <a:ext uri="{28A0092B-C50C-407E-A947-70E740481C1C}">
-                <a14:useLocalDpi xmlns:a14="http://schemas.microsoft.com/office/drawing/2010/main" val="0"/>
+              <a:ext uri="{FF2B5EF4-FFF2-40B4-BE49-F238E27FC236}">
+                <a16:creationId xmlns:a16="http://schemas.microsoft.com/office/drawing/2014/main" id="{E843FA82-A062-4264-8D14-53CD96A02C39}"/>
               </a:ext>
             </a:extLst>
-          </a:blip>
-          <a:stretch>
-            <a:fillRect/>
-          </a:stretch>
-        </p:blipFill>
-        <p:spPr>
+          </p:cNvPr>
+          <p:cNvSpPr txBox="1">
+            <a:spLocks noChangeArrowheads="1"/>
+          </p:cNvSpPr>
+          <p:nvPr/>
+        </p:nvSpPr>
+        <p:spPr bwMode="auto">
           <a:xfrm>
-            <a:off x="4669772" y="1656441"/>
-            <a:ext cx="7090237" cy="3545118"/>
+            <a:off x="4436032" y="2079924"/>
+            <a:ext cx="1036638" cy="892175"/>
           </a:xfrm>
-          <a:custGeom>
+          <a:prstGeom prst="rect">
             <a:avLst/>
-            <a:gdLst/>
-            <a:ahLst/>
-            <a:cxnLst/>
-            <a:rect l="l" t="t" r="r" b="b"/>
-            <a:pathLst>
-              <a:path w="7090237" h="5759451">
-                <a:moveTo>
-                  <a:pt x="0" y="0"/>
-                </a:moveTo>
-                <a:lnTo>
-                  <a:pt x="7090237" y="0"/>
-                </a:lnTo>
-                <a:lnTo>
-                  <a:pt x="7090237" y="5759451"/>
-                </a:lnTo>
-                <a:lnTo>
-                  <a:pt x="0" y="5759451"/>
-                </a:lnTo>
-                <a:close/>
-              </a:path>
-            </a:pathLst>
-          </a:custGeom>
+          </a:prstGeom>
+          <a:solidFill>
+            <a:srgbClr val="4472C4"/>
+          </a:solidFill>
+          <a:ln>
+            <a:noFill/>
+          </a:ln>
+          <a:extLst>
+            <a:ext uri="{91240B29-F687-4F45-9708-019B960494DF}">
+              <a14:hiddenLine xmlns:a14="http://schemas.microsoft.com/office/drawing/2010/main" w="9525">
+                <a:solidFill>
+                  <a:srgbClr val="000000"/>
+                </a:solidFill>
+                <a:miter lim="800000"/>
+                <a:headEnd/>
+                <a:tailEnd/>
+              </a14:hiddenLine>
+            </a:ext>
+          </a:extLst>
         </p:spPr>
-      </p:pic>
+        <p:txBody>
+          <a:bodyPr vert="horz" wrap="square" lIns="91440" tIns="45720" rIns="91440" bIns="45720" numCol="1" anchor="t" anchorCtr="0" compatLnSpc="1">
+            <a:prstTxWarp prst="textNoShape">
+              <a:avLst/>
+            </a:prstTxWarp>
+          </a:bodyPr>
+          <a:lstStyle/>
+          <a:p>
+            <a:pPr marL="0" marR="0" lvl="0" indent="0" algn="ctr" defTabSz="914400" rtl="0" eaLnBrk="0" fontAlgn="base" latinLnBrk="0" hangingPunct="0">
+              <a:lnSpc>
+                <a:spcPct val="100000"/>
+              </a:lnSpc>
+              <a:spcBef>
+                <a:spcPct val="0"/>
+              </a:spcBef>
+              <a:spcAft>
+                <a:spcPct val="0"/>
+              </a:spcAft>
+              <a:buClrTx/>
+              <a:buSzTx/>
+              <a:buFontTx/>
+              <a:buNone/>
+              <a:tabLst/>
+            </a:pPr>
+            <a:r>
+              <a:rPr kumimoji="0" lang="nl-NL" altLang="nl-NL" sz="4800" b="0" i="0" u="none" strike="noStrike" cap="none" normalizeH="0" baseline="0">
+                <a:ln>
+                  <a:noFill/>
+                </a:ln>
+                <a:solidFill>
+                  <a:schemeClr val="tx1"/>
+                </a:solidFill>
+                <a:effectLst/>
+                <a:latin typeface="Calibri" panose="020F0502020204030204" pitchFamily="34" charset="0"/>
+                <a:ea typeface="Calibri" panose="020F0502020204030204" pitchFamily="34" charset="0"/>
+                <a:cs typeface="Times New Roman" panose="02020603050405020304" pitchFamily="18" charset="0"/>
+              </a:rPr>
+              <a:t>S</a:t>
+            </a:r>
+            <a:endParaRPr kumimoji="0" lang="nl-NL" altLang="nl-NL" sz="1800" b="0" i="0" u="none" strike="noStrike" cap="none" normalizeH="0" baseline="0">
+              <a:ln>
+                <a:noFill/>
+              </a:ln>
+              <a:solidFill>
+                <a:schemeClr val="tx1"/>
+              </a:solidFill>
+              <a:effectLst/>
+              <a:latin typeface="Arial" panose="020B0604020202020204" pitchFamily="34" charset="0"/>
+            </a:endParaRPr>
+          </a:p>
+        </p:txBody>
+      </p:sp>
+      <p:sp>
+        <p:nvSpPr>
+          <p:cNvPr id="5" name="Tekstvak 11">
+            <a:extLst>
+              <a:ext uri="{FF2B5EF4-FFF2-40B4-BE49-F238E27FC236}">
+                <a16:creationId xmlns:a16="http://schemas.microsoft.com/office/drawing/2014/main" id="{E7BD1677-AC15-4EFD-827C-A6386BF37BC6}"/>
+              </a:ext>
+            </a:extLst>
+          </p:cNvPr>
+          <p:cNvSpPr txBox="1">
+            <a:spLocks noChangeArrowheads="1"/>
+          </p:cNvSpPr>
+          <p:nvPr/>
+        </p:nvSpPr>
+        <p:spPr bwMode="auto">
+          <a:xfrm>
+            <a:off x="4437620" y="3024486"/>
+            <a:ext cx="1036638" cy="892175"/>
+          </a:xfrm>
+          <a:prstGeom prst="rect">
+            <a:avLst/>
+          </a:prstGeom>
+          <a:solidFill>
+            <a:srgbClr val="4472C4"/>
+          </a:solidFill>
+          <a:ln>
+            <a:noFill/>
+          </a:ln>
+          <a:extLst>
+            <a:ext uri="{91240B29-F687-4F45-9708-019B960494DF}">
+              <a14:hiddenLine xmlns:a14="http://schemas.microsoft.com/office/drawing/2010/main" w="9525">
+                <a:solidFill>
+                  <a:srgbClr val="000000"/>
+                </a:solidFill>
+                <a:miter lim="800000"/>
+                <a:headEnd/>
+                <a:tailEnd/>
+              </a14:hiddenLine>
+            </a:ext>
+          </a:extLst>
+        </p:spPr>
+        <p:txBody>
+          <a:bodyPr vert="horz" wrap="square" lIns="91440" tIns="45720" rIns="91440" bIns="45720" numCol="1" anchor="t" anchorCtr="0" compatLnSpc="1">
+            <a:prstTxWarp prst="textNoShape">
+              <a:avLst/>
+            </a:prstTxWarp>
+          </a:bodyPr>
+          <a:lstStyle/>
+          <a:p>
+            <a:pPr marL="0" marR="0" lvl="0" indent="0" algn="ctr" defTabSz="914400" rtl="0" eaLnBrk="0" fontAlgn="base" latinLnBrk="0" hangingPunct="0">
+              <a:lnSpc>
+                <a:spcPct val="100000"/>
+              </a:lnSpc>
+              <a:spcBef>
+                <a:spcPct val="0"/>
+              </a:spcBef>
+              <a:spcAft>
+                <a:spcPct val="0"/>
+              </a:spcAft>
+              <a:buClrTx/>
+              <a:buSzTx/>
+              <a:buFontTx/>
+              <a:buNone/>
+              <a:tabLst/>
+            </a:pPr>
+            <a:r>
+              <a:rPr kumimoji="0" lang="nl-NL" altLang="nl-NL" sz="4800" b="0" i="0" u="none" strike="noStrike" cap="none" normalizeH="0" baseline="0">
+                <a:ln>
+                  <a:noFill/>
+                </a:ln>
+                <a:solidFill>
+                  <a:schemeClr val="tx1"/>
+                </a:solidFill>
+                <a:effectLst/>
+                <a:latin typeface="Calibri" panose="020F0502020204030204" pitchFamily="34" charset="0"/>
+                <a:ea typeface="Calibri" panose="020F0502020204030204" pitchFamily="34" charset="0"/>
+                <a:cs typeface="Times New Roman" panose="02020603050405020304" pitchFamily="18" charset="0"/>
+              </a:rPr>
+              <a:t>C</a:t>
+            </a:r>
+            <a:endParaRPr kumimoji="0" lang="nl-NL" altLang="nl-NL" sz="1800" b="0" i="0" u="none" strike="noStrike" cap="none" normalizeH="0" baseline="0">
+              <a:ln>
+                <a:noFill/>
+              </a:ln>
+              <a:solidFill>
+                <a:schemeClr val="tx1"/>
+              </a:solidFill>
+              <a:effectLst/>
+              <a:latin typeface="Arial" panose="020B0604020202020204" pitchFamily="34" charset="0"/>
+            </a:endParaRPr>
+          </a:p>
+        </p:txBody>
+      </p:sp>
+      <p:sp>
+        <p:nvSpPr>
+          <p:cNvPr id="6" name="Tekstvak 12">
+            <a:extLst>
+              <a:ext uri="{FF2B5EF4-FFF2-40B4-BE49-F238E27FC236}">
+                <a16:creationId xmlns:a16="http://schemas.microsoft.com/office/drawing/2014/main" id="{E26F2335-B953-4465-83AD-2D270BA34A33}"/>
+              </a:ext>
+            </a:extLst>
+          </p:cNvPr>
+          <p:cNvSpPr txBox="1">
+            <a:spLocks noChangeArrowheads="1"/>
+          </p:cNvSpPr>
+          <p:nvPr/>
+        </p:nvSpPr>
+        <p:spPr bwMode="auto">
+          <a:xfrm>
+            <a:off x="4440795" y="3975277"/>
+            <a:ext cx="1036638" cy="892175"/>
+          </a:xfrm>
+          <a:prstGeom prst="rect">
+            <a:avLst/>
+          </a:prstGeom>
+          <a:solidFill>
+            <a:srgbClr val="4472C4"/>
+          </a:solidFill>
+          <a:ln>
+            <a:noFill/>
+          </a:ln>
+          <a:extLst>
+            <a:ext uri="{91240B29-F687-4F45-9708-019B960494DF}">
+              <a14:hiddenLine xmlns:a14="http://schemas.microsoft.com/office/drawing/2010/main" w="9525">
+                <a:solidFill>
+                  <a:srgbClr val="000000"/>
+                </a:solidFill>
+                <a:miter lim="800000"/>
+                <a:headEnd/>
+                <a:tailEnd/>
+              </a14:hiddenLine>
+            </a:ext>
+          </a:extLst>
+        </p:spPr>
+        <p:txBody>
+          <a:bodyPr vert="horz" wrap="square" lIns="91440" tIns="45720" rIns="91440" bIns="45720" numCol="1" anchor="t" anchorCtr="0" compatLnSpc="1">
+            <a:prstTxWarp prst="textNoShape">
+              <a:avLst/>
+            </a:prstTxWarp>
+          </a:bodyPr>
+          <a:lstStyle/>
+          <a:p>
+            <a:pPr marL="0" marR="0" lvl="0" indent="0" algn="ctr" defTabSz="914400" rtl="0" eaLnBrk="0" fontAlgn="base" latinLnBrk="0" hangingPunct="0">
+              <a:lnSpc>
+                <a:spcPct val="100000"/>
+              </a:lnSpc>
+              <a:spcBef>
+                <a:spcPct val="0"/>
+              </a:spcBef>
+              <a:spcAft>
+                <a:spcPct val="0"/>
+              </a:spcAft>
+              <a:buClrTx/>
+              <a:buSzTx/>
+              <a:buFontTx/>
+              <a:buNone/>
+              <a:tabLst/>
+            </a:pPr>
+            <a:r>
+              <a:rPr kumimoji="0" lang="nl-NL" altLang="nl-NL" sz="4800" b="0" i="0" u="none" strike="noStrike" cap="none" normalizeH="0" baseline="0" dirty="0">
+                <a:ln>
+                  <a:noFill/>
+                </a:ln>
+                <a:solidFill>
+                  <a:schemeClr val="tx1"/>
+                </a:solidFill>
+                <a:effectLst/>
+                <a:latin typeface="Calibri" panose="020F0502020204030204" pitchFamily="34" charset="0"/>
+                <a:ea typeface="Calibri" panose="020F0502020204030204" pitchFamily="34" charset="0"/>
+                <a:cs typeface="Times New Roman" panose="02020603050405020304" pitchFamily="18" charset="0"/>
+              </a:rPr>
+              <a:t>W</a:t>
+            </a:r>
+            <a:endParaRPr kumimoji="0" lang="nl-NL" altLang="nl-NL" sz="1800" b="0" i="0" u="none" strike="noStrike" cap="none" normalizeH="0" baseline="0" dirty="0">
+              <a:ln>
+                <a:noFill/>
+              </a:ln>
+              <a:solidFill>
+                <a:schemeClr val="tx1"/>
+              </a:solidFill>
+              <a:effectLst/>
+              <a:latin typeface="Arial" panose="020B0604020202020204" pitchFamily="34" charset="0"/>
+            </a:endParaRPr>
+          </a:p>
+        </p:txBody>
+      </p:sp>
+      <p:sp>
+        <p:nvSpPr>
+          <p:cNvPr id="7" name="Tekstvak 14">
+            <a:extLst>
+              <a:ext uri="{FF2B5EF4-FFF2-40B4-BE49-F238E27FC236}">
+                <a16:creationId xmlns:a16="http://schemas.microsoft.com/office/drawing/2014/main" id="{6496F993-4E84-4F1D-B5D1-21AF2E2AACDB}"/>
+              </a:ext>
+            </a:extLst>
+          </p:cNvPr>
+          <p:cNvSpPr txBox="1">
+            <a:spLocks noChangeArrowheads="1"/>
+          </p:cNvSpPr>
+          <p:nvPr/>
+        </p:nvSpPr>
+        <p:spPr bwMode="auto">
+          <a:xfrm>
+            <a:off x="5521883" y="1121074"/>
+            <a:ext cx="5897562" cy="889000"/>
+          </a:xfrm>
+          <a:prstGeom prst="rect">
+            <a:avLst/>
+          </a:prstGeom>
+          <a:solidFill>
+            <a:srgbClr val="4472C4"/>
+          </a:solidFill>
+          <a:ln>
+            <a:noFill/>
+          </a:ln>
+          <a:extLst>
+            <a:ext uri="{91240B29-F687-4F45-9708-019B960494DF}">
+              <a14:hiddenLine xmlns:a14="http://schemas.microsoft.com/office/drawing/2010/main" w="9525">
+                <a:solidFill>
+                  <a:srgbClr val="000000"/>
+                </a:solidFill>
+                <a:miter lim="800000"/>
+                <a:headEnd/>
+                <a:tailEnd/>
+              </a14:hiddenLine>
+            </a:ext>
+          </a:extLst>
+        </p:spPr>
+        <p:txBody>
+          <a:bodyPr vert="horz" wrap="square" lIns="91440" tIns="45720" rIns="91440" bIns="45720" numCol="1" anchor="t" anchorCtr="0" compatLnSpc="1">
+            <a:prstTxWarp prst="textNoShape">
+              <a:avLst/>
+            </a:prstTxWarp>
+          </a:bodyPr>
+          <a:lstStyle/>
+          <a:p>
+            <a:pPr marL="0" marR="0" lvl="0" indent="0" algn="l" defTabSz="914400" rtl="0" eaLnBrk="0" fontAlgn="base" latinLnBrk="0" hangingPunct="0">
+              <a:lnSpc>
+                <a:spcPct val="100000"/>
+              </a:lnSpc>
+              <a:spcBef>
+                <a:spcPct val="0"/>
+              </a:spcBef>
+              <a:spcAft>
+                <a:spcPct val="0"/>
+              </a:spcAft>
+              <a:buClrTx/>
+              <a:buSzTx/>
+              <a:buFontTx/>
+              <a:buNone/>
+              <a:tabLst/>
+            </a:pPr>
+            <a:r>
+              <a:rPr kumimoji="0" lang="en-US" altLang="nl-NL" sz="1100" b="0" i="0" u="none" strike="noStrike" cap="none" normalizeH="0" baseline="0">
+                <a:ln>
+                  <a:noFill/>
+                </a:ln>
+                <a:solidFill>
+                  <a:schemeClr val="tx1"/>
+                </a:solidFill>
+                <a:effectLst/>
+                <a:latin typeface="Calibri" panose="020F0502020204030204" pitchFamily="34" charset="0"/>
+                <a:ea typeface="Calibri" panose="020F0502020204030204" pitchFamily="34" charset="0"/>
+                <a:cs typeface="Times New Roman" panose="02020603050405020304" pitchFamily="18" charset="0"/>
+              </a:rPr>
+              <a:t>Car controller;</a:t>
+            </a:r>
+            <a:endParaRPr kumimoji="0" lang="en-US" altLang="nl-NL" sz="800" b="0" i="0" u="none" strike="noStrike" cap="none" normalizeH="0" baseline="0">
+              <a:ln>
+                <a:noFill/>
+              </a:ln>
+              <a:solidFill>
+                <a:schemeClr val="tx1"/>
+              </a:solidFill>
+              <a:effectLst/>
+            </a:endParaRPr>
+          </a:p>
+          <a:p>
+            <a:pPr marL="0" marR="0" lvl="0" indent="0" algn="l" defTabSz="914400" rtl="0" eaLnBrk="0" fontAlgn="base" latinLnBrk="0" hangingPunct="0">
+              <a:lnSpc>
+                <a:spcPct val="100000"/>
+              </a:lnSpc>
+              <a:spcBef>
+                <a:spcPct val="0"/>
+              </a:spcBef>
+              <a:spcAft>
+                <a:spcPct val="0"/>
+              </a:spcAft>
+              <a:buClrTx/>
+              <a:buSzTx/>
+              <a:buFontTx/>
+              <a:buNone/>
+              <a:tabLst/>
+            </a:pPr>
+            <a:r>
+              <a:rPr kumimoji="0" lang="en-US" altLang="nl-NL" sz="1100" b="0" i="0" u="none" strike="noStrike" cap="none" normalizeH="0" baseline="0">
+                <a:ln>
+                  <a:noFill/>
+                </a:ln>
+                <a:solidFill>
+                  <a:schemeClr val="tx1"/>
+                </a:solidFill>
+                <a:effectLst/>
+                <a:latin typeface="Calibri" panose="020F0502020204030204" pitchFamily="34" charset="0"/>
+                <a:ea typeface="Calibri" panose="020F0502020204030204" pitchFamily="34" charset="0"/>
+                <a:cs typeface="Times New Roman" panose="02020603050405020304" pitchFamily="18" charset="0"/>
+              </a:rPr>
+              <a:t>Timer; </a:t>
+            </a:r>
+            <a:endParaRPr kumimoji="0" lang="en-US" altLang="nl-NL" sz="800" b="0" i="0" u="none" strike="noStrike" cap="none" normalizeH="0" baseline="0">
+              <a:ln>
+                <a:noFill/>
+              </a:ln>
+              <a:solidFill>
+                <a:schemeClr val="tx1"/>
+              </a:solidFill>
+              <a:effectLst/>
+            </a:endParaRPr>
+          </a:p>
+          <a:p>
+            <a:pPr marL="0" marR="0" lvl="0" indent="0" algn="l" defTabSz="914400" rtl="0" eaLnBrk="0" fontAlgn="base" latinLnBrk="0" hangingPunct="0">
+              <a:lnSpc>
+                <a:spcPct val="100000"/>
+              </a:lnSpc>
+              <a:spcBef>
+                <a:spcPct val="0"/>
+              </a:spcBef>
+              <a:spcAft>
+                <a:spcPct val="0"/>
+              </a:spcAft>
+              <a:buClrTx/>
+              <a:buSzTx/>
+              <a:buFontTx/>
+              <a:buNone/>
+              <a:tabLst/>
+            </a:pPr>
+            <a:endParaRPr kumimoji="0" lang="en-US" altLang="nl-NL" sz="1800" b="0" i="0" u="none" strike="noStrike" cap="none" normalizeH="0" baseline="0">
+              <a:ln>
+                <a:noFill/>
+              </a:ln>
+              <a:solidFill>
+                <a:schemeClr val="tx1"/>
+              </a:solidFill>
+              <a:effectLst/>
+              <a:latin typeface="Arial" panose="020B0604020202020204" pitchFamily="34" charset="0"/>
+            </a:endParaRPr>
+          </a:p>
+        </p:txBody>
+      </p:sp>
+      <p:sp>
+        <p:nvSpPr>
+          <p:cNvPr id="8" name="Tekstvak 15">
+            <a:extLst>
+              <a:ext uri="{FF2B5EF4-FFF2-40B4-BE49-F238E27FC236}">
+                <a16:creationId xmlns:a16="http://schemas.microsoft.com/office/drawing/2014/main" id="{5AFA98E4-6190-4C33-A210-F3EE47292A72}"/>
+              </a:ext>
+            </a:extLst>
+          </p:cNvPr>
+          <p:cNvSpPr txBox="1">
+            <a:spLocks noChangeArrowheads="1"/>
+          </p:cNvSpPr>
+          <p:nvPr/>
+        </p:nvSpPr>
+        <p:spPr bwMode="auto">
+          <a:xfrm>
+            <a:off x="5526645" y="2084686"/>
+            <a:ext cx="5897563" cy="885825"/>
+          </a:xfrm>
+          <a:prstGeom prst="rect">
+            <a:avLst/>
+          </a:prstGeom>
+          <a:solidFill>
+            <a:srgbClr val="4472C4"/>
+          </a:solidFill>
+          <a:ln>
+            <a:noFill/>
+          </a:ln>
+          <a:extLst>
+            <a:ext uri="{91240B29-F687-4F45-9708-019B960494DF}">
+              <a14:hiddenLine xmlns:a14="http://schemas.microsoft.com/office/drawing/2010/main" w="9525">
+                <a:solidFill>
+                  <a:srgbClr val="000000"/>
+                </a:solidFill>
+                <a:miter lim="800000"/>
+                <a:headEnd/>
+                <a:tailEnd/>
+              </a14:hiddenLine>
+            </a:ext>
+          </a:extLst>
+        </p:spPr>
+        <p:txBody>
+          <a:bodyPr vert="horz" wrap="square" lIns="91440" tIns="45720" rIns="91440" bIns="45720" numCol="1" anchor="t" anchorCtr="0" compatLnSpc="1">
+            <a:prstTxWarp prst="textNoShape">
+              <a:avLst/>
+            </a:prstTxWarp>
+          </a:bodyPr>
+          <a:lstStyle/>
+          <a:p>
+            <a:pPr marL="0" marR="0" lvl="0" indent="0" algn="l" defTabSz="914400" rtl="0" eaLnBrk="0" fontAlgn="base" latinLnBrk="0" hangingPunct="0">
+              <a:lnSpc>
+                <a:spcPct val="100000"/>
+              </a:lnSpc>
+              <a:spcBef>
+                <a:spcPct val="0"/>
+              </a:spcBef>
+              <a:spcAft>
+                <a:spcPct val="0"/>
+              </a:spcAft>
+              <a:buClrTx/>
+              <a:buSzTx/>
+              <a:buFontTx/>
+              <a:buNone/>
+              <a:tabLst/>
+            </a:pPr>
+            <a:r>
+              <a:rPr kumimoji="0" lang="en-US" altLang="nl-NL" sz="1100" b="0" i="0" u="none" strike="noStrike" cap="none" normalizeH="0" baseline="0">
+                <a:ln>
+                  <a:noFill/>
+                </a:ln>
+                <a:solidFill>
+                  <a:schemeClr val="tx1"/>
+                </a:solidFill>
+                <a:effectLst/>
+                <a:latin typeface="Calibri" panose="020F0502020204030204" pitchFamily="34" charset="0"/>
+                <a:ea typeface="Calibri" panose="020F0502020204030204" pitchFamily="34" charset="0"/>
+                <a:cs typeface="Times New Roman" panose="02020603050405020304" pitchFamily="18" charset="0"/>
+              </a:rPr>
+              <a:t>Pause menu;</a:t>
+            </a:r>
+            <a:endParaRPr kumimoji="0" lang="en-US" altLang="nl-NL" sz="800" b="0" i="0" u="none" strike="noStrike" cap="none" normalizeH="0" baseline="0">
+              <a:ln>
+                <a:noFill/>
+              </a:ln>
+              <a:solidFill>
+                <a:schemeClr val="tx1"/>
+              </a:solidFill>
+              <a:effectLst/>
+            </a:endParaRPr>
+          </a:p>
+          <a:p>
+            <a:pPr marL="0" marR="0" lvl="0" indent="0" algn="l" defTabSz="914400" rtl="0" eaLnBrk="0" fontAlgn="base" latinLnBrk="0" hangingPunct="0">
+              <a:lnSpc>
+                <a:spcPct val="100000"/>
+              </a:lnSpc>
+              <a:spcBef>
+                <a:spcPct val="0"/>
+              </a:spcBef>
+              <a:spcAft>
+                <a:spcPct val="0"/>
+              </a:spcAft>
+              <a:buClrTx/>
+              <a:buSzTx/>
+              <a:buFontTx/>
+              <a:buNone/>
+              <a:tabLst/>
+            </a:pPr>
+            <a:r>
+              <a:rPr kumimoji="0" lang="en-US" altLang="nl-NL" sz="1100" b="0" i="0" u="none" strike="noStrike" cap="none" normalizeH="0" baseline="0">
+                <a:ln>
+                  <a:noFill/>
+                </a:ln>
+                <a:solidFill>
+                  <a:schemeClr val="tx1"/>
+                </a:solidFill>
+                <a:effectLst/>
+                <a:latin typeface="Calibri" panose="020F0502020204030204" pitchFamily="34" charset="0"/>
+                <a:ea typeface="Calibri" panose="020F0502020204030204" pitchFamily="34" charset="0"/>
+                <a:cs typeface="Times New Roman" panose="02020603050405020304" pitchFamily="18" charset="0"/>
+              </a:rPr>
+              <a:t>Main menu;</a:t>
+            </a:r>
+            <a:endParaRPr kumimoji="0" lang="en-US" altLang="nl-NL" sz="800" b="0" i="0" u="none" strike="noStrike" cap="none" normalizeH="0" baseline="0">
+              <a:ln>
+                <a:noFill/>
+              </a:ln>
+              <a:solidFill>
+                <a:schemeClr val="tx1"/>
+              </a:solidFill>
+              <a:effectLst/>
+            </a:endParaRPr>
+          </a:p>
+          <a:p>
+            <a:pPr marL="0" marR="0" lvl="0" indent="0" algn="l" defTabSz="914400" rtl="0" eaLnBrk="0" fontAlgn="base" latinLnBrk="0" hangingPunct="0">
+              <a:lnSpc>
+                <a:spcPct val="100000"/>
+              </a:lnSpc>
+              <a:spcBef>
+                <a:spcPct val="0"/>
+              </a:spcBef>
+              <a:spcAft>
+                <a:spcPct val="0"/>
+              </a:spcAft>
+              <a:buClrTx/>
+              <a:buSzTx/>
+              <a:buFontTx/>
+              <a:buNone/>
+              <a:tabLst/>
+            </a:pPr>
+            <a:r>
+              <a:rPr kumimoji="0" lang="en-US" altLang="nl-NL" sz="1100" b="0" i="0" u="none" strike="noStrike" cap="none" normalizeH="0" baseline="0">
+                <a:ln>
+                  <a:noFill/>
+                </a:ln>
+                <a:solidFill>
+                  <a:schemeClr val="tx1"/>
+                </a:solidFill>
+                <a:effectLst/>
+                <a:latin typeface="Calibri" panose="020F0502020204030204" pitchFamily="34" charset="0"/>
+                <a:ea typeface="Calibri" panose="020F0502020204030204" pitchFamily="34" charset="0"/>
+                <a:cs typeface="Times New Roman" panose="02020603050405020304" pitchFamily="18" charset="0"/>
+              </a:rPr>
+              <a:t>Car choosing/multiple cars;</a:t>
+            </a:r>
+            <a:endParaRPr kumimoji="0" lang="en-US" altLang="nl-NL" sz="800" b="0" i="0" u="none" strike="noStrike" cap="none" normalizeH="0" baseline="0">
+              <a:ln>
+                <a:noFill/>
+              </a:ln>
+              <a:solidFill>
+                <a:schemeClr val="tx1"/>
+              </a:solidFill>
+              <a:effectLst/>
+            </a:endParaRPr>
+          </a:p>
+          <a:p>
+            <a:pPr marL="0" marR="0" lvl="0" indent="0" algn="l" defTabSz="914400" rtl="0" eaLnBrk="0" fontAlgn="base" latinLnBrk="0" hangingPunct="0">
+              <a:lnSpc>
+                <a:spcPct val="100000"/>
+              </a:lnSpc>
+              <a:spcBef>
+                <a:spcPct val="0"/>
+              </a:spcBef>
+              <a:spcAft>
+                <a:spcPct val="0"/>
+              </a:spcAft>
+              <a:buClrTx/>
+              <a:buSzTx/>
+              <a:buFontTx/>
+              <a:buNone/>
+              <a:tabLst/>
+            </a:pPr>
+            <a:r>
+              <a:rPr kumimoji="0" lang="en-US" altLang="nl-NL" sz="1100" b="0" i="0" u="none" strike="noStrike" cap="none" normalizeH="0" baseline="0">
+                <a:ln>
+                  <a:noFill/>
+                </a:ln>
+                <a:solidFill>
+                  <a:schemeClr val="tx1"/>
+                </a:solidFill>
+                <a:effectLst/>
+                <a:latin typeface="Calibri" panose="020F0502020204030204" pitchFamily="34" charset="0"/>
+                <a:ea typeface="Calibri" panose="020F0502020204030204" pitchFamily="34" charset="0"/>
+                <a:cs typeface="Times New Roman" panose="02020603050405020304" pitchFamily="18" charset="0"/>
+              </a:rPr>
+              <a:t>High-score/Lap times</a:t>
+            </a:r>
+            <a:endParaRPr kumimoji="0" lang="en-US" altLang="nl-NL" sz="1800" b="0" i="0" u="none" strike="noStrike" cap="none" normalizeH="0" baseline="0">
+              <a:ln>
+                <a:noFill/>
+              </a:ln>
+              <a:solidFill>
+                <a:schemeClr val="tx1"/>
+              </a:solidFill>
+              <a:effectLst/>
+              <a:latin typeface="Arial" panose="020B0604020202020204" pitchFamily="34" charset="0"/>
+            </a:endParaRPr>
+          </a:p>
+        </p:txBody>
+      </p:sp>
+      <p:sp>
+        <p:nvSpPr>
+          <p:cNvPr id="9" name="Tekstvak 16">
+            <a:extLst>
+              <a:ext uri="{FF2B5EF4-FFF2-40B4-BE49-F238E27FC236}">
+                <a16:creationId xmlns:a16="http://schemas.microsoft.com/office/drawing/2014/main" id="{123A805F-3E4C-4616-8F96-83DE8BFDA75C}"/>
+              </a:ext>
+            </a:extLst>
+          </p:cNvPr>
+          <p:cNvSpPr txBox="1">
+            <a:spLocks noChangeArrowheads="1"/>
+          </p:cNvSpPr>
+          <p:nvPr/>
+        </p:nvSpPr>
+        <p:spPr bwMode="auto">
+          <a:xfrm>
+            <a:off x="5529820" y="3027661"/>
+            <a:ext cx="5897563" cy="889000"/>
+          </a:xfrm>
+          <a:prstGeom prst="rect">
+            <a:avLst/>
+          </a:prstGeom>
+          <a:solidFill>
+            <a:srgbClr val="4472C4"/>
+          </a:solidFill>
+          <a:ln>
+            <a:noFill/>
+          </a:ln>
+          <a:extLst>
+            <a:ext uri="{91240B29-F687-4F45-9708-019B960494DF}">
+              <a14:hiddenLine xmlns:a14="http://schemas.microsoft.com/office/drawing/2010/main" w="9525">
+                <a:solidFill>
+                  <a:srgbClr val="000000"/>
+                </a:solidFill>
+                <a:miter lim="800000"/>
+                <a:headEnd/>
+                <a:tailEnd/>
+              </a14:hiddenLine>
+            </a:ext>
+          </a:extLst>
+        </p:spPr>
+        <p:txBody>
+          <a:bodyPr vert="horz" wrap="square" lIns="91440" tIns="45720" rIns="91440" bIns="45720" numCol="1" anchor="t" anchorCtr="0" compatLnSpc="1">
+            <a:prstTxWarp prst="textNoShape">
+              <a:avLst/>
+            </a:prstTxWarp>
+          </a:bodyPr>
+          <a:lstStyle/>
+          <a:p>
+            <a:pPr marL="0" marR="0" lvl="0" indent="0" algn="l" defTabSz="914400" rtl="0" eaLnBrk="0" fontAlgn="base" latinLnBrk="0" hangingPunct="0">
+              <a:lnSpc>
+                <a:spcPct val="100000"/>
+              </a:lnSpc>
+              <a:spcBef>
+                <a:spcPct val="0"/>
+              </a:spcBef>
+              <a:spcAft>
+                <a:spcPct val="0"/>
+              </a:spcAft>
+              <a:buClrTx/>
+              <a:buSzTx/>
+              <a:buFontTx/>
+              <a:buNone/>
+              <a:tabLst/>
+            </a:pPr>
+            <a:r>
+              <a:rPr kumimoji="0" lang="en-US" altLang="nl-NL" sz="1100" b="0" i="0" u="none" strike="sngStrike" cap="none" normalizeH="0" baseline="0" dirty="0">
+                <a:ln>
+                  <a:noFill/>
+                </a:ln>
+                <a:solidFill>
+                  <a:schemeClr val="tx1"/>
+                </a:solidFill>
+                <a:effectLst/>
+                <a:latin typeface="Calibri" panose="020F0502020204030204" pitchFamily="34" charset="0"/>
+                <a:ea typeface="Calibri" panose="020F0502020204030204" pitchFamily="34" charset="0"/>
+                <a:cs typeface="Times New Roman" panose="02020603050405020304" pitchFamily="18" charset="0"/>
+              </a:rPr>
+              <a:t>Crashing;</a:t>
+            </a:r>
+            <a:endParaRPr kumimoji="0" lang="en-US" altLang="nl-NL" sz="800" b="0" i="0" u="none" strike="sngStrike" cap="none" normalizeH="0" baseline="0" dirty="0">
+              <a:ln>
+                <a:noFill/>
+              </a:ln>
+              <a:solidFill>
+                <a:schemeClr val="tx1"/>
+              </a:solidFill>
+              <a:effectLst/>
+            </a:endParaRPr>
+          </a:p>
+          <a:p>
+            <a:pPr marL="0" marR="0" lvl="0" indent="0" algn="l" defTabSz="914400" rtl="0" eaLnBrk="0" fontAlgn="base" latinLnBrk="0" hangingPunct="0">
+              <a:lnSpc>
+                <a:spcPct val="100000"/>
+              </a:lnSpc>
+              <a:spcBef>
+                <a:spcPct val="0"/>
+              </a:spcBef>
+              <a:spcAft>
+                <a:spcPct val="0"/>
+              </a:spcAft>
+              <a:buClrTx/>
+              <a:buSzTx/>
+              <a:buFontTx/>
+              <a:buNone/>
+              <a:tabLst/>
+            </a:pPr>
+            <a:r>
+              <a:rPr kumimoji="0" lang="en-US" altLang="nl-NL" sz="1100" b="0" i="0" u="none" strike="sngStrike" cap="none" normalizeH="0" baseline="0" dirty="0">
+                <a:ln>
+                  <a:noFill/>
+                </a:ln>
+                <a:solidFill>
+                  <a:schemeClr val="tx1"/>
+                </a:solidFill>
+                <a:effectLst/>
+                <a:latin typeface="Calibri" panose="020F0502020204030204" pitchFamily="34" charset="0"/>
+                <a:ea typeface="Calibri" panose="020F0502020204030204" pitchFamily="34" charset="0"/>
+                <a:cs typeface="Times New Roman" panose="02020603050405020304" pitchFamily="18" charset="0"/>
+              </a:rPr>
+              <a:t>Car stats screen;</a:t>
+            </a:r>
+            <a:endParaRPr kumimoji="0" lang="en-US" altLang="nl-NL" sz="800" b="0" i="0" u="none" strike="sngStrike" cap="none" normalizeH="0" baseline="0" dirty="0">
+              <a:ln>
+                <a:noFill/>
+              </a:ln>
+              <a:solidFill>
+                <a:schemeClr val="tx1"/>
+              </a:solidFill>
+              <a:effectLst/>
+            </a:endParaRPr>
+          </a:p>
+          <a:p>
+            <a:pPr marL="0" marR="0" lvl="0" indent="0" algn="l" defTabSz="914400" rtl="0" eaLnBrk="0" fontAlgn="base" latinLnBrk="0" hangingPunct="0">
+              <a:lnSpc>
+                <a:spcPct val="100000"/>
+              </a:lnSpc>
+              <a:spcBef>
+                <a:spcPct val="0"/>
+              </a:spcBef>
+              <a:spcAft>
+                <a:spcPct val="0"/>
+              </a:spcAft>
+              <a:buClrTx/>
+              <a:buSzTx/>
+              <a:buFontTx/>
+              <a:buNone/>
+              <a:tabLst/>
+            </a:pPr>
+            <a:r>
+              <a:rPr kumimoji="0" lang="en-US" altLang="nl-NL" sz="1100" b="0" i="0" u="none" strike="sngStrike" cap="none" normalizeH="0" baseline="0" dirty="0">
+                <a:ln>
+                  <a:noFill/>
+                </a:ln>
+                <a:solidFill>
+                  <a:schemeClr val="tx1"/>
+                </a:solidFill>
+                <a:effectLst/>
+                <a:latin typeface="Calibri" panose="020F0502020204030204" pitchFamily="34" charset="0"/>
+                <a:ea typeface="Calibri" panose="020F0502020204030204" pitchFamily="34" charset="0"/>
+                <a:cs typeface="Times New Roman" panose="02020603050405020304" pitchFamily="18" charset="0"/>
+              </a:rPr>
+              <a:t>Switching from 3</a:t>
+            </a:r>
+            <a:r>
+              <a:rPr kumimoji="0" lang="en-US" altLang="nl-NL" sz="1100" b="0" i="0" u="none" strike="sngStrike" cap="none" normalizeH="0" baseline="30000" dirty="0">
+                <a:ln>
+                  <a:noFill/>
+                </a:ln>
+                <a:solidFill>
+                  <a:schemeClr val="tx1"/>
+                </a:solidFill>
+                <a:effectLst/>
+                <a:latin typeface="Calibri" panose="020F0502020204030204" pitchFamily="34" charset="0"/>
+                <a:ea typeface="Calibri" panose="020F0502020204030204" pitchFamily="34" charset="0"/>
+                <a:cs typeface="Times New Roman" panose="02020603050405020304" pitchFamily="18" charset="0"/>
+              </a:rPr>
+              <a:t>rd</a:t>
+            </a:r>
+            <a:r>
+              <a:rPr kumimoji="0" lang="en-US" altLang="nl-NL" sz="1100" b="0" i="0" u="none" strike="sngStrike" cap="none" normalizeH="0" baseline="0" dirty="0">
+                <a:ln>
+                  <a:noFill/>
+                </a:ln>
+                <a:solidFill>
+                  <a:schemeClr val="tx1"/>
+                </a:solidFill>
+                <a:effectLst/>
+                <a:latin typeface="Calibri" panose="020F0502020204030204" pitchFamily="34" charset="0"/>
+                <a:ea typeface="Calibri" panose="020F0502020204030204" pitchFamily="34" charset="0"/>
+                <a:cs typeface="Times New Roman" panose="02020603050405020304" pitchFamily="18" charset="0"/>
+              </a:rPr>
+              <a:t> to 1</a:t>
+            </a:r>
+            <a:r>
+              <a:rPr kumimoji="0" lang="en-US" altLang="nl-NL" sz="1100" b="0" i="0" u="none" strike="sngStrike" cap="none" normalizeH="0" baseline="30000" dirty="0">
+                <a:ln>
+                  <a:noFill/>
+                </a:ln>
+                <a:solidFill>
+                  <a:schemeClr val="tx1"/>
+                </a:solidFill>
+                <a:effectLst/>
+                <a:latin typeface="Calibri" panose="020F0502020204030204" pitchFamily="34" charset="0"/>
+                <a:ea typeface="Calibri" panose="020F0502020204030204" pitchFamily="34" charset="0"/>
+                <a:cs typeface="Times New Roman" panose="02020603050405020304" pitchFamily="18" charset="0"/>
+              </a:rPr>
+              <a:t>ste</a:t>
+            </a:r>
+            <a:r>
+              <a:rPr kumimoji="0" lang="en-US" altLang="nl-NL" sz="1100" b="0" i="0" u="none" strike="sngStrike" cap="none" normalizeH="0" baseline="0" dirty="0">
+                <a:ln>
+                  <a:noFill/>
+                </a:ln>
+                <a:solidFill>
+                  <a:schemeClr val="tx1"/>
+                </a:solidFill>
+                <a:effectLst/>
+                <a:latin typeface="Calibri" panose="020F0502020204030204" pitchFamily="34" charset="0"/>
+                <a:ea typeface="Calibri" panose="020F0502020204030204" pitchFamily="34" charset="0"/>
+                <a:cs typeface="Times New Roman" panose="02020603050405020304" pitchFamily="18" charset="0"/>
+              </a:rPr>
+              <a:t> person;</a:t>
+            </a:r>
+            <a:endParaRPr kumimoji="0" lang="en-US" altLang="nl-NL" sz="800" b="0" i="0" u="none" strike="sngStrike" cap="none" normalizeH="0" baseline="0" dirty="0">
+              <a:ln>
+                <a:noFill/>
+              </a:ln>
+              <a:solidFill>
+                <a:schemeClr val="tx1"/>
+              </a:solidFill>
+              <a:effectLst/>
+            </a:endParaRPr>
+          </a:p>
+          <a:p>
+            <a:pPr marL="0" marR="0" lvl="0" indent="0" algn="l" defTabSz="914400" rtl="0" eaLnBrk="0" fontAlgn="base" latinLnBrk="0" hangingPunct="0">
+              <a:lnSpc>
+                <a:spcPct val="100000"/>
+              </a:lnSpc>
+              <a:spcBef>
+                <a:spcPct val="0"/>
+              </a:spcBef>
+              <a:spcAft>
+                <a:spcPct val="0"/>
+              </a:spcAft>
+              <a:buClrTx/>
+              <a:buSzTx/>
+              <a:buFontTx/>
+              <a:buNone/>
+              <a:tabLst/>
+            </a:pPr>
+            <a:r>
+              <a:rPr kumimoji="0" lang="en-US" altLang="nl-NL" sz="1100" b="0" i="0" u="none" strike="sngStrike" cap="none" normalizeH="0" baseline="0" dirty="0">
+                <a:ln>
+                  <a:noFill/>
+                </a:ln>
+                <a:solidFill>
+                  <a:schemeClr val="tx1"/>
+                </a:solidFill>
+                <a:effectLst/>
+                <a:latin typeface="Calibri" panose="020F0502020204030204" pitchFamily="34" charset="0"/>
+                <a:ea typeface="Calibri" panose="020F0502020204030204" pitchFamily="34" charset="0"/>
+                <a:cs typeface="Times New Roman" panose="02020603050405020304" pitchFamily="18" charset="0"/>
+              </a:rPr>
+              <a:t>Car gear changing;</a:t>
+            </a:r>
+            <a:endParaRPr kumimoji="0" lang="en-US" altLang="nl-NL" sz="800" b="0" i="0" u="none" strike="sngStrike" cap="none" normalizeH="0" baseline="0" dirty="0">
+              <a:ln>
+                <a:noFill/>
+              </a:ln>
+              <a:solidFill>
+                <a:schemeClr val="tx1"/>
+              </a:solidFill>
+              <a:effectLst/>
+            </a:endParaRPr>
+          </a:p>
+          <a:p>
+            <a:pPr marL="0" marR="0" lvl="0" indent="0" algn="l" defTabSz="914400" rtl="0" eaLnBrk="0" fontAlgn="base" latinLnBrk="0" hangingPunct="0">
+              <a:lnSpc>
+                <a:spcPct val="100000"/>
+              </a:lnSpc>
+              <a:spcBef>
+                <a:spcPct val="0"/>
+              </a:spcBef>
+              <a:spcAft>
+                <a:spcPct val="0"/>
+              </a:spcAft>
+              <a:buClrTx/>
+              <a:buSzTx/>
+              <a:buFontTx/>
+              <a:buNone/>
+              <a:tabLst/>
+            </a:pPr>
+            <a:endParaRPr kumimoji="0" lang="en-US" altLang="nl-NL" sz="1800" b="0" i="0" u="none" strike="noStrike" cap="none" normalizeH="0" baseline="0" dirty="0">
+              <a:ln>
+                <a:noFill/>
+              </a:ln>
+              <a:solidFill>
+                <a:schemeClr val="tx1"/>
+              </a:solidFill>
+              <a:effectLst/>
+              <a:latin typeface="Arial" panose="020B0604020202020204" pitchFamily="34" charset="0"/>
+            </a:endParaRPr>
+          </a:p>
+        </p:txBody>
+      </p:sp>
+      <p:sp>
+        <p:nvSpPr>
+          <p:cNvPr id="11" name="Rectangle 10">
+            <a:extLst>
+              <a:ext uri="{FF2B5EF4-FFF2-40B4-BE49-F238E27FC236}">
+                <a16:creationId xmlns:a16="http://schemas.microsoft.com/office/drawing/2014/main" id="{AE1D3ED8-821C-4ABE-BB5B-F314EDFCD631}"/>
+              </a:ext>
+            </a:extLst>
+          </p:cNvPr>
+          <p:cNvSpPr>
+            <a:spLocks noChangeArrowheads="1"/>
+          </p:cNvSpPr>
+          <p:nvPr/>
+        </p:nvSpPr>
+        <p:spPr bwMode="auto">
+          <a:xfrm>
+            <a:off x="5034520" y="274936"/>
+            <a:ext cx="12192000" cy="457200"/>
+          </a:xfrm>
+          <a:prstGeom prst="rect">
+            <a:avLst/>
+          </a:prstGeom>
+          <a:noFill/>
+          <a:ln>
+            <a:noFill/>
+          </a:ln>
+          <a:effectLst/>
+          <a:extLst>
+            <a:ext uri="{909E8E84-426E-40DD-AFC4-6F175D3DCCD1}">
+              <a14:hiddenFill xmlns:a14="http://schemas.microsoft.com/office/drawing/2010/main">
+                <a:solidFill>
+                  <a:schemeClr val="accent1"/>
+                </a:solidFill>
+              </a14:hiddenFill>
+            </a:ext>
+            <a:ext uri="{91240B29-F687-4F45-9708-019B960494DF}">
+              <a14:hiddenLine xmlns:a14="http://schemas.microsoft.com/office/drawing/2010/main" w="9525">
+                <a:solidFill>
+                  <a:schemeClr val="tx1"/>
+                </a:solidFill>
+                <a:miter lim="800000"/>
+                <a:headEnd/>
+                <a:tailEnd/>
+              </a14:hiddenLine>
+            </a:ext>
+            <a:ext uri="{AF507438-7753-43E0-B8FC-AC1667EBCBE1}">
+              <a14:hiddenEffects xmlns:a14="http://schemas.microsoft.com/office/drawing/2010/main">
+                <a:effectLst>
+                  <a:outerShdw dist="35921" dir="2700000" algn="ctr" rotWithShape="0">
+                    <a:schemeClr val="bg2"/>
+                  </a:outerShdw>
+                </a:effectLst>
+              </a14:hiddenEffects>
+            </a:ext>
+          </a:extLst>
+        </p:spPr>
+        <p:txBody>
+          <a:bodyPr vert="horz" wrap="none" lIns="91440" tIns="45720" rIns="91440" bIns="45720" numCol="1" anchor="ctr" anchorCtr="0" compatLnSpc="1">
+            <a:prstTxWarp prst="textNoShape">
+              <a:avLst/>
+            </a:prstTxWarp>
+            <a:spAutoFit/>
+          </a:bodyPr>
+          <a:lstStyle/>
+          <a:p>
+            <a:endParaRPr lang="nl-NL"/>
+          </a:p>
+        </p:txBody>
+      </p:sp>
+      <p:sp>
+        <p:nvSpPr>
+          <p:cNvPr id="43" name="Tekstvak 16">
+            <a:extLst>
+              <a:ext uri="{FF2B5EF4-FFF2-40B4-BE49-F238E27FC236}">
+                <a16:creationId xmlns:a16="http://schemas.microsoft.com/office/drawing/2014/main" id="{488197A4-1A65-4B18-8536-DBB68FE3DF1A}"/>
+              </a:ext>
+            </a:extLst>
+          </p:cNvPr>
+          <p:cNvSpPr txBox="1">
+            <a:spLocks noChangeArrowheads="1"/>
+          </p:cNvSpPr>
+          <p:nvPr/>
+        </p:nvSpPr>
+        <p:spPr bwMode="auto">
+          <a:xfrm>
+            <a:off x="5529820" y="3982603"/>
+            <a:ext cx="5897563" cy="889000"/>
+          </a:xfrm>
+          <a:prstGeom prst="rect">
+            <a:avLst/>
+          </a:prstGeom>
+          <a:solidFill>
+            <a:srgbClr val="4472C4"/>
+          </a:solidFill>
+          <a:ln>
+            <a:noFill/>
+          </a:ln>
+          <a:extLst>
+            <a:ext uri="{91240B29-F687-4F45-9708-019B960494DF}">
+              <a14:hiddenLine xmlns:a14="http://schemas.microsoft.com/office/drawing/2010/main" w="9525">
+                <a:solidFill>
+                  <a:srgbClr val="000000"/>
+                </a:solidFill>
+                <a:miter lim="800000"/>
+                <a:headEnd/>
+                <a:tailEnd/>
+              </a14:hiddenLine>
+            </a:ext>
+          </a:extLst>
+        </p:spPr>
+        <p:txBody>
+          <a:bodyPr vert="horz" wrap="square" lIns="91440" tIns="45720" rIns="91440" bIns="45720" numCol="1" anchor="t" anchorCtr="0" compatLnSpc="1">
+            <a:prstTxWarp prst="textNoShape">
+              <a:avLst/>
+            </a:prstTxWarp>
+          </a:bodyPr>
+          <a:lstStyle/>
+          <a:p>
+            <a:pPr marL="0" marR="0" lvl="0" indent="0" algn="l" defTabSz="914400" rtl="0" eaLnBrk="0" fontAlgn="base" latinLnBrk="0" hangingPunct="0">
+              <a:lnSpc>
+                <a:spcPct val="100000"/>
+              </a:lnSpc>
+              <a:spcBef>
+                <a:spcPct val="0"/>
+              </a:spcBef>
+              <a:spcAft>
+                <a:spcPct val="0"/>
+              </a:spcAft>
+              <a:buClrTx/>
+              <a:buSzTx/>
+              <a:buFontTx/>
+              <a:buNone/>
+              <a:tabLst/>
+            </a:pPr>
+            <a:endParaRPr kumimoji="0" lang="en-US" altLang="nl-NL" sz="1800" b="0" i="0" u="none" strike="noStrike" cap="none" normalizeH="0" baseline="0" dirty="0">
+              <a:ln>
+                <a:noFill/>
+              </a:ln>
+              <a:solidFill>
+                <a:schemeClr val="tx1"/>
+              </a:solidFill>
+              <a:effectLst/>
+              <a:latin typeface="Arial" panose="020B0604020202020204" pitchFamily="34" charset="0"/>
+            </a:endParaRPr>
+          </a:p>
+        </p:txBody>
+      </p:sp>
     </p:spTree>
     <p:extLst>
       <p:ext uri="{BB962C8B-B14F-4D97-AF65-F5344CB8AC3E}">
@@ -9595,7 +10727,7 @@
       </p:grpSpPr>
       <p:sp useBgFill="1">
         <p:nvSpPr>
-          <p:cNvPr id="8" name="Rectangle 7">
+          <p:cNvPr id="59" name="Rectangle 52">
             <a:extLst>
               <a:ext uri="{FF2B5EF4-FFF2-40B4-BE49-F238E27FC236}">
                 <a16:creationId xmlns:a16="http://schemas.microsoft.com/office/drawing/2014/main" id="{A5931BE0-4B93-4D6C-878E-ACC59D6B4587}"/>
@@ -9687,6 +10819,877 @@
         </p:nvSpPr>
         <p:spPr>
           <a:xfrm>
+            <a:off x="550864" y="549275"/>
+            <a:ext cx="3565524" cy="1997855"/>
+          </a:xfrm>
+        </p:spPr>
+        <p:txBody>
+          <a:bodyPr wrap="square" anchor="b">
+            <a:normAutofit/>
+          </a:bodyPr>
+          <a:lstStyle/>
+          <a:p>
+            <a:r>
+              <a:rPr lang="en-US" dirty="0">
+                <a:latin typeface="Adobe Clean" panose="020B0503020404020204" pitchFamily="34" charset="0"/>
+              </a:rPr>
+              <a:t>3. The Car</a:t>
+            </a:r>
+            <a:br>
+              <a:rPr lang="en-US" dirty="0">
+                <a:latin typeface="Adobe Clean" panose="020B0503020404020204" pitchFamily="34" charset="0"/>
+              </a:rPr>
+            </a:br>
+            <a:endParaRPr lang="en-US" dirty="0">
+              <a:latin typeface="Adobe Clean" panose="020B0503020404020204" pitchFamily="34" charset="0"/>
+            </a:endParaRPr>
+          </a:p>
+        </p:txBody>
+      </p:sp>
+      <p:grpSp>
+        <p:nvGrpSpPr>
+          <p:cNvPr id="61" name="Group 54">
+            <a:extLst>
+              <a:ext uri="{FF2B5EF4-FFF2-40B4-BE49-F238E27FC236}">
+                <a16:creationId xmlns:a16="http://schemas.microsoft.com/office/drawing/2014/main" id="{9F2D4ED5-DC78-4C88-97AA-483206C53E90}"/>
+              </a:ext>
+              <a:ext uri="{C183D7F6-B498-43B3-948B-1728B52AA6E4}">
+                <adec:decorative xmlns:adec="http://schemas.microsoft.com/office/drawing/2017/decorative" val="1"/>
+              </a:ext>
+            </a:extLst>
+          </p:cNvPr>
+          <p:cNvGrpSpPr>
+            <a:grpSpLocks noGrp="1" noUngrp="1" noRot="1" noChangeAspect="1" noMove="1" noResize="1"/>
+          </p:cNvGrpSpPr>
+          <p:nvPr>
+            <p:extLst>
+              <p:ext uri="{386F3935-93C4-4BCD-93E2-E3B085C9AB24}">
+                <p16:designElem xmlns:p16="http://schemas.microsoft.com/office/powerpoint/2015/main" val="1"/>
+              </p:ext>
+            </p:extLst>
+          </p:nvPr>
+        </p:nvGrpSpPr>
+        <p:grpSpPr>
+          <a:xfrm>
+            <a:off x="10570793" y="0"/>
+            <a:ext cx="1468514" cy="1521012"/>
+            <a:chOff x="5236793" y="2432482"/>
+            <a:chExt cx="1468514" cy="1521012"/>
+          </a:xfrm>
+        </p:grpSpPr>
+        <p:sp>
+          <p:nvSpPr>
+            <p:cNvPr id="56" name="Freeform 5">
+              <a:extLst>
+                <a:ext uri="{FF2B5EF4-FFF2-40B4-BE49-F238E27FC236}">
+                  <a16:creationId xmlns:a16="http://schemas.microsoft.com/office/drawing/2014/main" id="{0DE0B65A-4839-40B2-BA92-1464FEADBA4A}"/>
+                </a:ext>
+                <a:ext uri="{C183D7F6-B498-43B3-948B-1728B52AA6E4}">
+                  <adec:decorative xmlns:adec="http://schemas.microsoft.com/office/drawing/2017/decorative" val="1"/>
+                </a:ext>
+              </a:extLst>
+            </p:cNvPr>
+            <p:cNvSpPr>
+              <a:spLocks/>
+            </p:cNvSpPr>
+            <p:nvPr>
+              <p:extLst>
+                <p:ext uri="{386F3935-93C4-4BCD-93E2-E3B085C9AB24}">
+                  <p16:designElem xmlns:p16="http://schemas.microsoft.com/office/powerpoint/2015/main" val="1"/>
+                </p:ext>
+              </p:extLst>
+            </p:nvPr>
+          </p:nvSpPr>
+          <p:spPr bwMode="auto">
+            <a:xfrm rot="1800000">
+              <a:off x="5463135" y="2432482"/>
+              <a:ext cx="1242172" cy="729202"/>
+            </a:xfrm>
+            <a:custGeom>
+              <a:avLst/>
+              <a:gdLst>
+                <a:gd name="T0" fmla="*/ 266 w 540"/>
+                <a:gd name="T1" fmla="*/ 0 h 317"/>
+                <a:gd name="T2" fmla="*/ 0 w 540"/>
+                <a:gd name="T3" fmla="*/ 158 h 317"/>
+                <a:gd name="T4" fmla="*/ 266 w 540"/>
+                <a:gd name="T5" fmla="*/ 317 h 317"/>
+                <a:gd name="T6" fmla="*/ 540 w 540"/>
+                <a:gd name="T7" fmla="*/ 158 h 317"/>
+                <a:gd name="T8" fmla="*/ 266 w 540"/>
+                <a:gd name="T9" fmla="*/ 0 h 317"/>
+              </a:gdLst>
+              <a:ahLst/>
+              <a:cxnLst>
+                <a:cxn ang="0">
+                  <a:pos x="T0" y="T1"/>
+                </a:cxn>
+                <a:cxn ang="0">
+                  <a:pos x="T2" y="T3"/>
+                </a:cxn>
+                <a:cxn ang="0">
+                  <a:pos x="T4" y="T5"/>
+                </a:cxn>
+                <a:cxn ang="0">
+                  <a:pos x="T6" y="T7"/>
+                </a:cxn>
+                <a:cxn ang="0">
+                  <a:pos x="T8" y="T9"/>
+                </a:cxn>
+              </a:cxnLst>
+              <a:rect l="0" t="0" r="r" b="b"/>
+              <a:pathLst>
+                <a:path w="540" h="317">
+                  <a:moveTo>
+                    <a:pt x="266" y="0"/>
+                  </a:moveTo>
+                  <a:lnTo>
+                    <a:pt x="0" y="158"/>
+                  </a:lnTo>
+                  <a:lnTo>
+                    <a:pt x="266" y="317"/>
+                  </a:lnTo>
+                  <a:lnTo>
+                    <a:pt x="540" y="158"/>
+                  </a:lnTo>
+                  <a:lnTo>
+                    <a:pt x="266" y="0"/>
+                  </a:lnTo>
+                  <a:close/>
+                </a:path>
+              </a:pathLst>
+            </a:custGeom>
+            <a:gradFill flip="none" rotWithShape="1">
+              <a:gsLst>
+                <a:gs pos="20000">
+                  <a:schemeClr val="bg2">
+                    <a:lumMod val="90000"/>
+                    <a:lumOff val="10000"/>
+                    <a:alpha val="20000"/>
+                  </a:schemeClr>
+                </a:gs>
+                <a:gs pos="100000">
+                  <a:schemeClr val="accent1">
+                    <a:lumMod val="60000"/>
+                    <a:lumOff val="40000"/>
+                    <a:alpha val="40000"/>
+                  </a:schemeClr>
+                </a:gs>
+              </a:gsLst>
+              <a:lin ang="0" scaled="0"/>
+              <a:tileRect/>
+            </a:gradFill>
+            <a:ln>
+              <a:noFill/>
+            </a:ln>
+            <a:effectLst>
+              <a:innerShdw blurRad="254000">
+                <a:schemeClr val="bg2">
+                  <a:lumMod val="90000"/>
+                  <a:lumOff val="10000"/>
+                </a:schemeClr>
+              </a:innerShdw>
+            </a:effectLst>
+          </p:spPr>
+          <p:style>
+            <a:lnRef idx="2">
+              <a:schemeClr val="accent1">
+                <a:shade val="50000"/>
+              </a:schemeClr>
+            </a:lnRef>
+            <a:fillRef idx="1">
+              <a:schemeClr val="accent1"/>
+            </a:fillRef>
+            <a:effectRef idx="0">
+              <a:schemeClr val="accent1"/>
+            </a:effectRef>
+            <a:fontRef idx="minor">
+              <a:schemeClr val="lt1"/>
+            </a:fontRef>
+          </p:style>
+          <p:txBody>
+            <a:bodyPr rot="0" spcFirstLastPara="0" vertOverflow="overflow" horzOverflow="overflow" vert="horz" wrap="square" lIns="91440" tIns="45720" rIns="91440" bIns="45720" numCol="1" spcCol="0" rtlCol="0" fromWordArt="0" anchor="ctr" anchorCtr="0" forceAA="0" compatLnSpc="1">
+              <a:prstTxWarp prst="textNoShape">
+                <a:avLst/>
+              </a:prstTxWarp>
+              <a:noAutofit/>
+            </a:bodyPr>
+            <a:lstStyle/>
+            <a:p>
+              <a:pPr algn="ctr"/>
+              <a:endParaRPr lang="en-US"/>
+            </a:p>
+          </p:txBody>
+        </p:sp>
+        <p:sp>
+          <p:nvSpPr>
+            <p:cNvPr id="57" name="Freeform 6">
+              <a:extLst>
+                <a:ext uri="{FF2B5EF4-FFF2-40B4-BE49-F238E27FC236}">
+                  <a16:creationId xmlns:a16="http://schemas.microsoft.com/office/drawing/2014/main" id="{842A0A68-39DD-4DA7-BAD5-63B9C1398718}"/>
+                </a:ext>
+                <a:ext uri="{C183D7F6-B498-43B3-948B-1728B52AA6E4}">
+                  <adec:decorative xmlns:adec="http://schemas.microsoft.com/office/drawing/2017/decorative" val="1"/>
+                </a:ext>
+              </a:extLst>
+            </p:cNvPr>
+            <p:cNvSpPr>
+              <a:spLocks/>
+            </p:cNvSpPr>
+            <p:nvPr>
+              <p:extLst>
+                <p:ext uri="{386F3935-93C4-4BCD-93E2-E3B085C9AB24}">
+                  <p16:designElem xmlns:p16="http://schemas.microsoft.com/office/powerpoint/2015/main" val="1"/>
+                </p:ext>
+              </p:extLst>
+            </p:nvPr>
+          </p:nvSpPr>
+          <p:spPr bwMode="auto">
+            <a:xfrm rot="1800000">
+              <a:off x="5236793" y="2566400"/>
+              <a:ext cx="611884" cy="1076550"/>
+            </a:xfrm>
+            <a:custGeom>
+              <a:avLst/>
+              <a:gdLst>
+                <a:gd name="T0" fmla="*/ 266 w 266"/>
+                <a:gd name="T1" fmla="*/ 468 h 468"/>
+                <a:gd name="T2" fmla="*/ 0 w 266"/>
+                <a:gd name="T3" fmla="*/ 310 h 468"/>
+                <a:gd name="T4" fmla="*/ 0 w 266"/>
+                <a:gd name="T5" fmla="*/ 310 h 468"/>
+                <a:gd name="T6" fmla="*/ 0 w 266"/>
+                <a:gd name="T7" fmla="*/ 0 h 468"/>
+                <a:gd name="T8" fmla="*/ 0 w 266"/>
+                <a:gd name="T9" fmla="*/ 0 h 468"/>
+                <a:gd name="T10" fmla="*/ 266 w 266"/>
+                <a:gd name="T11" fmla="*/ 159 h 468"/>
+                <a:gd name="T12" fmla="*/ 266 w 266"/>
+                <a:gd name="T13" fmla="*/ 468 h 468"/>
+              </a:gdLst>
+              <a:ahLst/>
+              <a:cxnLst>
+                <a:cxn ang="0">
+                  <a:pos x="T0" y="T1"/>
+                </a:cxn>
+                <a:cxn ang="0">
+                  <a:pos x="T2" y="T3"/>
+                </a:cxn>
+                <a:cxn ang="0">
+                  <a:pos x="T4" y="T5"/>
+                </a:cxn>
+                <a:cxn ang="0">
+                  <a:pos x="T6" y="T7"/>
+                </a:cxn>
+                <a:cxn ang="0">
+                  <a:pos x="T8" y="T9"/>
+                </a:cxn>
+                <a:cxn ang="0">
+                  <a:pos x="T10" y="T11"/>
+                </a:cxn>
+                <a:cxn ang="0">
+                  <a:pos x="T12" y="T13"/>
+                </a:cxn>
+              </a:cxnLst>
+              <a:rect l="0" t="0" r="r" b="b"/>
+              <a:pathLst>
+                <a:path w="266" h="468">
+                  <a:moveTo>
+                    <a:pt x="266" y="468"/>
+                  </a:moveTo>
+                  <a:lnTo>
+                    <a:pt x="0" y="310"/>
+                  </a:lnTo>
+                  <a:lnTo>
+                    <a:pt x="0" y="310"/>
+                  </a:lnTo>
+                  <a:lnTo>
+                    <a:pt x="0" y="0"/>
+                  </a:lnTo>
+                  <a:lnTo>
+                    <a:pt x="0" y="0"/>
+                  </a:lnTo>
+                  <a:lnTo>
+                    <a:pt x="266" y="159"/>
+                  </a:lnTo>
+                  <a:lnTo>
+                    <a:pt x="266" y="468"/>
+                  </a:lnTo>
+                  <a:close/>
+                </a:path>
+              </a:pathLst>
+            </a:custGeom>
+            <a:gradFill flip="none" rotWithShape="1">
+              <a:gsLst>
+                <a:gs pos="20000">
+                  <a:schemeClr val="bg2">
+                    <a:lumMod val="90000"/>
+                    <a:lumOff val="10000"/>
+                    <a:alpha val="20000"/>
+                  </a:schemeClr>
+                </a:gs>
+                <a:gs pos="100000">
+                  <a:schemeClr val="accent1">
+                    <a:lumMod val="60000"/>
+                    <a:lumOff val="40000"/>
+                    <a:alpha val="40000"/>
+                  </a:schemeClr>
+                </a:gs>
+              </a:gsLst>
+              <a:lin ang="19800000" scaled="0"/>
+              <a:tileRect/>
+            </a:gradFill>
+            <a:ln>
+              <a:noFill/>
+            </a:ln>
+            <a:effectLst>
+              <a:innerShdw blurRad="254000">
+                <a:schemeClr val="bg2">
+                  <a:lumMod val="90000"/>
+                  <a:lumOff val="10000"/>
+                </a:schemeClr>
+              </a:innerShdw>
+            </a:effectLst>
+          </p:spPr>
+          <p:style>
+            <a:lnRef idx="2">
+              <a:schemeClr val="accent1">
+                <a:shade val="50000"/>
+              </a:schemeClr>
+            </a:lnRef>
+            <a:fillRef idx="1">
+              <a:schemeClr val="accent1"/>
+            </a:fillRef>
+            <a:effectRef idx="0">
+              <a:schemeClr val="accent1"/>
+            </a:effectRef>
+            <a:fontRef idx="minor">
+              <a:schemeClr val="lt1"/>
+            </a:fontRef>
+          </p:style>
+          <p:txBody>
+            <a:bodyPr rot="0" spcFirstLastPara="0" vertOverflow="overflow" horzOverflow="overflow" vert="horz" wrap="square" lIns="91440" tIns="45720" rIns="91440" bIns="45720" numCol="1" spcCol="0" rtlCol="0" fromWordArt="0" anchor="ctr" anchorCtr="0" forceAA="0" compatLnSpc="1">
+              <a:prstTxWarp prst="textNoShape">
+                <a:avLst/>
+              </a:prstTxWarp>
+              <a:noAutofit/>
+            </a:bodyPr>
+            <a:lstStyle/>
+            <a:p>
+              <a:pPr algn="ctr"/>
+              <a:endParaRPr lang="en-US"/>
+            </a:p>
+          </p:txBody>
+        </p:sp>
+        <p:sp>
+          <p:nvSpPr>
+            <p:cNvPr id="58" name="Freeform 8">
+              <a:extLst>
+                <a:ext uri="{FF2B5EF4-FFF2-40B4-BE49-F238E27FC236}">
+                  <a16:creationId xmlns:a16="http://schemas.microsoft.com/office/drawing/2014/main" id="{21A69E50-7E10-45C3-B4F2-19DBA7748498}"/>
+                </a:ext>
+                <a:ext uri="{C183D7F6-B498-43B3-948B-1728B52AA6E4}">
+                  <adec:decorative xmlns:adec="http://schemas.microsoft.com/office/drawing/2017/decorative" val="1"/>
+                </a:ext>
+              </a:extLst>
+            </p:cNvPr>
+            <p:cNvSpPr>
+              <a:spLocks/>
+            </p:cNvSpPr>
+            <p:nvPr>
+              <p:extLst>
+                <p:ext uri="{386F3935-93C4-4BCD-93E2-E3B085C9AB24}">
+                  <p16:designElem xmlns:p16="http://schemas.microsoft.com/office/powerpoint/2015/main" val="1"/>
+                </p:ext>
+              </p:extLst>
+            </p:nvPr>
+          </p:nvSpPr>
+          <p:spPr bwMode="auto">
+            <a:xfrm rot="1800000">
+              <a:off x="5765469" y="2876944"/>
+              <a:ext cx="630288" cy="1076550"/>
+            </a:xfrm>
+            <a:custGeom>
+              <a:avLst/>
+              <a:gdLst>
+                <a:gd name="T0" fmla="*/ 274 w 274"/>
+                <a:gd name="T1" fmla="*/ 0 h 468"/>
+                <a:gd name="T2" fmla="*/ 274 w 274"/>
+                <a:gd name="T3" fmla="*/ 310 h 468"/>
+                <a:gd name="T4" fmla="*/ 274 w 274"/>
+                <a:gd name="T5" fmla="*/ 310 h 468"/>
+                <a:gd name="T6" fmla="*/ 0 w 274"/>
+                <a:gd name="T7" fmla="*/ 468 h 468"/>
+                <a:gd name="T8" fmla="*/ 0 w 274"/>
+                <a:gd name="T9" fmla="*/ 159 h 468"/>
+                <a:gd name="T10" fmla="*/ 274 w 274"/>
+                <a:gd name="T11" fmla="*/ 0 h 468"/>
+                <a:gd name="T12" fmla="*/ 274 w 274"/>
+                <a:gd name="T13" fmla="*/ 0 h 468"/>
+              </a:gdLst>
+              <a:ahLst/>
+              <a:cxnLst>
+                <a:cxn ang="0">
+                  <a:pos x="T0" y="T1"/>
+                </a:cxn>
+                <a:cxn ang="0">
+                  <a:pos x="T2" y="T3"/>
+                </a:cxn>
+                <a:cxn ang="0">
+                  <a:pos x="T4" y="T5"/>
+                </a:cxn>
+                <a:cxn ang="0">
+                  <a:pos x="T6" y="T7"/>
+                </a:cxn>
+                <a:cxn ang="0">
+                  <a:pos x="T8" y="T9"/>
+                </a:cxn>
+                <a:cxn ang="0">
+                  <a:pos x="T10" y="T11"/>
+                </a:cxn>
+                <a:cxn ang="0">
+                  <a:pos x="T12" y="T13"/>
+                </a:cxn>
+              </a:cxnLst>
+              <a:rect l="0" t="0" r="r" b="b"/>
+              <a:pathLst>
+                <a:path w="274" h="468">
+                  <a:moveTo>
+                    <a:pt x="274" y="0"/>
+                  </a:moveTo>
+                  <a:lnTo>
+                    <a:pt x="274" y="310"/>
+                  </a:lnTo>
+                  <a:lnTo>
+                    <a:pt x="274" y="310"/>
+                  </a:lnTo>
+                  <a:lnTo>
+                    <a:pt x="0" y="468"/>
+                  </a:lnTo>
+                  <a:lnTo>
+                    <a:pt x="0" y="159"/>
+                  </a:lnTo>
+                  <a:lnTo>
+                    <a:pt x="274" y="0"/>
+                  </a:lnTo>
+                  <a:lnTo>
+                    <a:pt x="274" y="0"/>
+                  </a:lnTo>
+                  <a:close/>
+                </a:path>
+              </a:pathLst>
+            </a:custGeom>
+            <a:gradFill flip="none" rotWithShape="1">
+              <a:gsLst>
+                <a:gs pos="20000">
+                  <a:schemeClr val="bg2">
+                    <a:lumMod val="90000"/>
+                    <a:lumOff val="10000"/>
+                    <a:alpha val="20000"/>
+                  </a:schemeClr>
+                </a:gs>
+                <a:gs pos="100000">
+                  <a:schemeClr val="accent1">
+                    <a:lumMod val="40000"/>
+                    <a:lumOff val="60000"/>
+                    <a:alpha val="60000"/>
+                  </a:schemeClr>
+                </a:gs>
+              </a:gsLst>
+              <a:lin ang="18000000" scaled="0"/>
+              <a:tileRect/>
+            </a:gradFill>
+            <a:ln>
+              <a:noFill/>
+            </a:ln>
+            <a:effectLst>
+              <a:innerShdw blurRad="508000">
+                <a:schemeClr val="accent1">
+                  <a:lumMod val="60000"/>
+                  <a:lumOff val="40000"/>
+                  <a:alpha val="40000"/>
+                </a:schemeClr>
+              </a:innerShdw>
+            </a:effectLst>
+          </p:spPr>
+          <p:style>
+            <a:lnRef idx="2">
+              <a:schemeClr val="accent1">
+                <a:shade val="50000"/>
+              </a:schemeClr>
+            </a:lnRef>
+            <a:fillRef idx="1">
+              <a:schemeClr val="accent1"/>
+            </a:fillRef>
+            <a:effectRef idx="0">
+              <a:schemeClr val="accent1"/>
+            </a:effectRef>
+            <a:fontRef idx="minor">
+              <a:schemeClr val="lt1"/>
+            </a:fontRef>
+          </p:style>
+          <p:txBody>
+            <a:bodyPr rot="0" spcFirstLastPara="0" vertOverflow="overflow" horzOverflow="overflow" vert="horz" wrap="square" lIns="91440" tIns="45720" rIns="91440" bIns="45720" numCol="1" spcCol="0" rtlCol="0" fromWordArt="0" anchor="ctr" anchorCtr="0" forceAA="0" compatLnSpc="1">
+              <a:prstTxWarp prst="textNoShape">
+                <a:avLst/>
+              </a:prstTxWarp>
+              <a:noAutofit/>
+            </a:bodyPr>
+            <a:lstStyle/>
+            <a:p>
+              <a:pPr algn="ctr"/>
+              <a:endParaRPr lang="en-US"/>
+            </a:p>
+          </p:txBody>
+        </p:sp>
+      </p:grpSp>
+      <p:sp>
+        <p:nvSpPr>
+          <p:cNvPr id="60" name="Oval 59">
+            <a:extLst>
+              <a:ext uri="{FF2B5EF4-FFF2-40B4-BE49-F238E27FC236}">
+                <a16:creationId xmlns:a16="http://schemas.microsoft.com/office/drawing/2014/main" id="{D166A8AB-8924-421C-BCED-B54DBC4054E0}"/>
+              </a:ext>
+              <a:ext uri="{C183D7F6-B498-43B3-948B-1728B52AA6E4}">
+                <adec:decorative xmlns:adec="http://schemas.microsoft.com/office/drawing/2017/decorative" val="1"/>
+              </a:ext>
+            </a:extLst>
+          </p:cNvPr>
+          <p:cNvSpPr>
+            <a:spLocks noGrp="1" noRot="1" noChangeAspect="1" noMove="1" noResize="1" noEditPoints="1" noAdjustHandles="1" noChangeArrowheads="1" noChangeShapeType="1" noTextEdit="1"/>
+          </p:cNvSpPr>
+          <p:nvPr>
+            <p:extLst>
+              <p:ext uri="{386F3935-93C4-4BCD-93E2-E3B085C9AB24}">
+                <p16:designElem xmlns:p16="http://schemas.microsoft.com/office/powerpoint/2015/main" val="1"/>
+              </p:ext>
+            </p:extLst>
+          </p:nvPr>
+        </p:nvSpPr>
+        <p:spPr>
+          <a:xfrm>
+            <a:off x="2677897" y="5497189"/>
+            <a:ext cx="360000" cy="360000"/>
+          </a:xfrm>
+          <a:prstGeom prst="ellipse">
+            <a:avLst/>
+          </a:prstGeom>
+          <a:gradFill flip="none" rotWithShape="1">
+            <a:gsLst>
+              <a:gs pos="100000">
+                <a:schemeClr val="bg2">
+                  <a:lumMod val="50000"/>
+                  <a:lumOff val="50000"/>
+                </a:schemeClr>
+              </a:gs>
+              <a:gs pos="60000">
+                <a:schemeClr val="bg2"/>
+              </a:gs>
+            </a:gsLst>
+            <a:path path="circle">
+              <a:fillToRect l="100000" b="100000"/>
+            </a:path>
+            <a:tileRect t="-100000" r="-100000"/>
+          </a:gradFill>
+          <a:ln>
+            <a:noFill/>
+          </a:ln>
+          <a:effectLst>
+            <a:innerShdw blurRad="127000" dist="63500" dir="2700000">
+              <a:schemeClr val="accent1">
+                <a:lumMod val="60000"/>
+                <a:lumOff val="40000"/>
+                <a:alpha val="20000"/>
+              </a:schemeClr>
+            </a:innerShdw>
+            <a:softEdge rad="0"/>
+          </a:effectLst>
+        </p:spPr>
+        <p:style>
+          <a:lnRef idx="2">
+            <a:schemeClr val="accent1">
+              <a:shade val="50000"/>
+            </a:schemeClr>
+          </a:lnRef>
+          <a:fillRef idx="1">
+            <a:schemeClr val="accent1"/>
+          </a:fillRef>
+          <a:effectRef idx="0">
+            <a:schemeClr val="accent1"/>
+          </a:effectRef>
+          <a:fontRef idx="minor">
+            <a:schemeClr val="lt1"/>
+          </a:fontRef>
+        </p:style>
+        <p:txBody>
+          <a:bodyPr rot="0" spcFirstLastPara="0" vertOverflow="overflow" horzOverflow="overflow" vert="horz" wrap="square" lIns="91440" tIns="45720" rIns="91440" bIns="45720" numCol="1" spcCol="0" rtlCol="0" fromWordArt="0" anchor="ctr" anchorCtr="0" forceAA="0" compatLnSpc="1">
+            <a:prstTxWarp prst="textNoShape">
+              <a:avLst/>
+            </a:prstTxWarp>
+            <a:noAutofit/>
+          </a:bodyPr>
+          <a:lstStyle/>
+          <a:p>
+            <a:pPr algn="ctr"/>
+            <a:endParaRPr lang="en-US"/>
+          </a:p>
+        </p:txBody>
+      </p:sp>
+      <p:sp>
+        <p:nvSpPr>
+          <p:cNvPr id="3" name="Tijdelijke aanduiding voor inhoud 2">
+            <a:extLst>
+              <a:ext uri="{FF2B5EF4-FFF2-40B4-BE49-F238E27FC236}">
+                <a16:creationId xmlns:a16="http://schemas.microsoft.com/office/drawing/2014/main" id="{98550410-D171-4686-BEC3-A9FCC787AE7D}"/>
+              </a:ext>
+            </a:extLst>
+          </p:cNvPr>
+          <p:cNvSpPr>
+            <a:spLocks noGrp="1"/>
+          </p:cNvSpPr>
+          <p:nvPr>
+            <p:ph idx="1"/>
+          </p:nvPr>
+        </p:nvSpPr>
+        <p:spPr>
+          <a:xfrm>
+            <a:off x="550863" y="2677306"/>
+            <a:ext cx="3565525" cy="3415519"/>
+          </a:xfrm>
+        </p:spPr>
+        <p:txBody>
+          <a:bodyPr anchor="t">
+            <a:normAutofit/>
+          </a:bodyPr>
+          <a:lstStyle/>
+          <a:p>
+            <a:r>
+              <a:rPr lang="en-US" sz="1600" dirty="0">
+                <a:latin typeface="Adobe Clean" panose="020B0503020404020204" pitchFamily="34" charset="0"/>
+              </a:rPr>
+              <a:t>Input</a:t>
+            </a:r>
+          </a:p>
+          <a:p>
+            <a:r>
+              <a:rPr lang="en-US" sz="1600" dirty="0" err="1">
+                <a:latin typeface="Adobe Clean" panose="020B0503020404020204" pitchFamily="34" charset="0"/>
+              </a:rPr>
+              <a:t>Griplevel</a:t>
+            </a:r>
+            <a:endParaRPr lang="en-US" sz="1600" dirty="0">
+              <a:latin typeface="Adobe Clean" panose="020B0503020404020204" pitchFamily="34" charset="0"/>
+            </a:endParaRPr>
+          </a:p>
+          <a:p>
+            <a:r>
+              <a:rPr lang="en-US" sz="1600" dirty="0">
+                <a:latin typeface="Adobe Clean" panose="020B0503020404020204" pitchFamily="34" charset="0"/>
+              </a:rPr>
+              <a:t>Understeer</a:t>
+            </a:r>
+          </a:p>
+          <a:p>
+            <a:r>
+              <a:rPr lang="en-US" sz="1600" dirty="0">
+                <a:latin typeface="Adobe Clean" panose="020B0503020404020204" pitchFamily="34" charset="0"/>
+              </a:rPr>
+              <a:t>Braking</a:t>
+            </a:r>
+          </a:p>
+          <a:p>
+            <a:r>
+              <a:rPr lang="en-US" sz="1600" dirty="0">
+                <a:latin typeface="Adobe Clean" panose="020B0503020404020204" pitchFamily="34" charset="0"/>
+              </a:rPr>
+              <a:t>Rumble</a:t>
+            </a:r>
+          </a:p>
+        </p:txBody>
+      </p:sp>
+      <p:pic>
+        <p:nvPicPr>
+          <p:cNvPr id="48" name="Afbeelding 47">
+            <a:extLst>
+              <a:ext uri="{FF2B5EF4-FFF2-40B4-BE49-F238E27FC236}">
+                <a16:creationId xmlns:a16="http://schemas.microsoft.com/office/drawing/2014/main" id="{F1EAECA5-795E-4CC8-9B6A-AF462F3CEB9A}"/>
+              </a:ext>
+            </a:extLst>
+          </p:cNvPr>
+          <p:cNvPicPr>
+            <a:picLocks noChangeAspect="1"/>
+          </p:cNvPicPr>
+          <p:nvPr/>
+        </p:nvPicPr>
+        <p:blipFill>
+          <a:blip r:embed="rId2"/>
+          <a:stretch>
+            <a:fillRect/>
+          </a:stretch>
+        </p:blipFill>
+        <p:spPr>
+          <a:xfrm>
+            <a:off x="5193438" y="549275"/>
+            <a:ext cx="5805160" cy="5759451"/>
+          </a:xfrm>
+          <a:custGeom>
+            <a:avLst/>
+            <a:gdLst/>
+            <a:ahLst/>
+            <a:cxnLst/>
+            <a:rect l="l" t="t" r="r" b="b"/>
+            <a:pathLst>
+              <a:path w="7090237" h="5759451">
+                <a:moveTo>
+                  <a:pt x="0" y="0"/>
+                </a:moveTo>
+                <a:lnTo>
+                  <a:pt x="7090237" y="0"/>
+                </a:lnTo>
+                <a:lnTo>
+                  <a:pt x="7090237" y="5759451"/>
+                </a:lnTo>
+                <a:lnTo>
+                  <a:pt x="0" y="5759451"/>
+                </a:lnTo>
+                <a:close/>
+              </a:path>
+            </a:pathLst>
+          </a:custGeom>
+        </p:spPr>
+      </p:pic>
+    </p:spTree>
+    <p:extLst>
+      <p:ext uri="{BB962C8B-B14F-4D97-AF65-F5344CB8AC3E}">
+        <p14:creationId xmlns:p14="http://schemas.microsoft.com/office/powerpoint/2010/main" val="1417393680"/>
+      </p:ext>
+    </p:extLst>
+  </p:cSld>
+  <p:clrMapOvr>
+    <a:masterClrMapping/>
+  </p:clrMapOvr>
+</p:sld>
+</file>
+
+<file path=ppt/slides/slide6.xml><?xml version="1.0" encoding="utf-8"?>
+<p:sld xmlns:a="http://schemas.openxmlformats.org/drawingml/2006/main" xmlns:r="http://schemas.openxmlformats.org/officeDocument/2006/relationships" xmlns:p="http://schemas.openxmlformats.org/presentationml/2006/main">
+  <p:cSld>
+    <p:bg>
+      <p:bgPr>
+        <a:solidFill>
+          <a:schemeClr val="bg2"/>
+        </a:solidFill>
+        <a:effectLst/>
+      </p:bgPr>
+    </p:bg>
+    <p:spTree>
+      <p:nvGrpSpPr>
+        <p:cNvPr id="1" name=""/>
+        <p:cNvGrpSpPr/>
+        <p:nvPr/>
+      </p:nvGrpSpPr>
+      <p:grpSpPr>
+        <a:xfrm>
+          <a:off x="0" y="0"/>
+          <a:ext cx="0" cy="0"/>
+          <a:chOff x="0" y="0"/>
+          <a:chExt cx="0" cy="0"/>
+        </a:xfrm>
+      </p:grpSpPr>
+      <p:sp useBgFill="1">
+        <p:nvSpPr>
+          <p:cNvPr id="8" name="Rectangle 7">
+            <a:extLst>
+              <a:ext uri="{FF2B5EF4-FFF2-40B4-BE49-F238E27FC236}">
+                <a16:creationId xmlns:a16="http://schemas.microsoft.com/office/drawing/2014/main" id="{A5931BE0-4B93-4D6C-878E-ACC59D6B4587}"/>
+              </a:ext>
+              <a:ext uri="{C183D7F6-B498-43B3-948B-1728B52AA6E4}">
+                <adec:decorative xmlns:adec="http://schemas.microsoft.com/office/drawing/2017/decorative" val="1"/>
+              </a:ext>
+            </a:extLst>
+          </p:cNvPr>
+          <p:cNvSpPr>
+            <a:spLocks noGrp="1" noRot="1" noChangeAspect="1" noMove="1" noResize="1" noEditPoints="1" noAdjustHandles="1" noChangeArrowheads="1" noChangeShapeType="1" noTextEdit="1"/>
+          </p:cNvSpPr>
+          <p:nvPr>
+            <p:extLst>
+              <p:ext uri="{386F3935-93C4-4BCD-93E2-E3B085C9AB24}">
+                <p16:designElem xmlns:p16="http://schemas.microsoft.com/office/powerpoint/2015/main" val="1"/>
+              </p:ext>
+            </p:extLst>
+          </p:nvPr>
+        </p:nvSpPr>
+        <p:spPr>
+          <a:xfrm>
+            <a:off x="0" y="0"/>
+            <a:ext cx="12192000" cy="6858000"/>
+          </a:xfrm>
+          <a:prstGeom prst="rect">
+            <a:avLst/>
+          </a:prstGeom>
+          <a:ln w="12700" cap="flat" cmpd="sng" algn="ctr">
+            <a:noFill/>
+            <a:prstDash val="solid"/>
+            <a:miter lim="800000"/>
+          </a:ln>
+          <a:effectLst/>
+          <a:extLst>
+            <a:ext uri="{91240B29-F687-4F45-9708-019B960494DF}">
+              <a14:hiddenLine xmlns:a14="http://schemas.microsoft.com/office/drawing/2010/main" w="12700" cap="flat" cmpd="sng" algn="ctr">
+                <a:solidFill>
+                  <a:schemeClr val="accent1">
+                    <a:shade val="50000"/>
+                  </a:schemeClr>
+                </a:solidFill>
+                <a:prstDash val="solid"/>
+                <a:miter lim="800000"/>
+              </a14:hiddenLine>
+            </a:ext>
+          </a:extLst>
+        </p:spPr>
+        <p:style>
+          <a:lnRef idx="2">
+            <a:schemeClr val="accent1">
+              <a:shade val="50000"/>
+            </a:schemeClr>
+          </a:lnRef>
+          <a:fillRef idx="1">
+            <a:schemeClr val="accent1"/>
+          </a:fillRef>
+          <a:effectRef idx="0">
+            <a:schemeClr val="accent1"/>
+          </a:effectRef>
+          <a:fontRef idx="minor">
+            <a:schemeClr val="lt1"/>
+          </a:fontRef>
+        </p:style>
+        <p:txBody>
+          <a:bodyPr rtlCol="0" anchor="ctr"/>
+          <a:lstStyle/>
+          <a:p>
+            <a:pPr algn="ctr"/>
+            <a:endParaRPr lang="en-US"/>
+          </a:p>
+        </p:txBody>
+      </p:sp>
+      <p:sp>
+        <p:nvSpPr>
+          <p:cNvPr id="2" name="Titel 1">
+            <a:extLst>
+              <a:ext uri="{FF2B5EF4-FFF2-40B4-BE49-F238E27FC236}">
+                <a16:creationId xmlns:a16="http://schemas.microsoft.com/office/drawing/2014/main" id="{EE50DBF5-9546-4E76-8032-E349B7C4EC4B}"/>
+              </a:ext>
+            </a:extLst>
+          </p:cNvPr>
+          <p:cNvSpPr>
+            <a:spLocks noGrp="1"/>
+          </p:cNvSpPr>
+          <p:nvPr>
+            <p:ph type="title"/>
+          </p:nvPr>
+        </p:nvSpPr>
+        <p:spPr>
+          <a:xfrm>
             <a:off x="2628901" y="1487308"/>
             <a:ext cx="6167438" cy="1333057"/>
           </a:xfrm>
@@ -9706,7 +11709,7 @@
               <a:rPr lang="en-US" dirty="0">
                 <a:latin typeface="Adobe Clean" panose="020B0503020404020204" pitchFamily="34" charset="0"/>
               </a:rPr>
-              <a:t>3. Obstacles</a:t>
+              <a:t>4. Obstacles</a:t>
             </a:r>
             <a:br>
               <a:rPr lang="en-US" dirty="0">
@@ -10700,983 +12703,6 @@
     <p:extLst>
       <p:ext uri="{BB962C8B-B14F-4D97-AF65-F5344CB8AC3E}">
         <p14:creationId xmlns:p14="http://schemas.microsoft.com/office/powerpoint/2010/main" val="1974362880"/>
-      </p:ext>
-    </p:extLst>
-  </p:cSld>
-  <p:clrMapOvr>
-    <a:masterClrMapping/>
-  </p:clrMapOvr>
-</p:sld>
-</file>
-
-<file path=ppt/slides/slide6.xml><?xml version="1.0" encoding="utf-8"?>
-<p:sld xmlns:a="http://schemas.openxmlformats.org/drawingml/2006/main" xmlns:r="http://schemas.openxmlformats.org/officeDocument/2006/relationships" xmlns:p="http://schemas.openxmlformats.org/presentationml/2006/main">
-  <p:cSld>
-    <p:bg>
-      <p:bgPr>
-        <a:solidFill>
-          <a:schemeClr val="bg2"/>
-        </a:solidFill>
-        <a:effectLst/>
-      </p:bgPr>
-    </p:bg>
-    <p:spTree>
-      <p:nvGrpSpPr>
-        <p:cNvPr id="1" name=""/>
-        <p:cNvGrpSpPr/>
-        <p:nvPr/>
-      </p:nvGrpSpPr>
-      <p:grpSpPr>
-        <a:xfrm>
-          <a:off x="0" y="0"/>
-          <a:ext cx="0" cy="0"/>
-          <a:chOff x="0" y="0"/>
-          <a:chExt cx="0" cy="0"/>
-        </a:xfrm>
-      </p:grpSpPr>
-      <p:sp useBgFill="1">
-        <p:nvSpPr>
-          <p:cNvPr id="59" name="Rectangle 52">
-            <a:extLst>
-              <a:ext uri="{FF2B5EF4-FFF2-40B4-BE49-F238E27FC236}">
-                <a16:creationId xmlns:a16="http://schemas.microsoft.com/office/drawing/2014/main" id="{A5931BE0-4B93-4D6C-878E-ACC59D6B4587}"/>
-              </a:ext>
-              <a:ext uri="{C183D7F6-B498-43B3-948B-1728B52AA6E4}">
-                <adec:decorative xmlns:adec="http://schemas.microsoft.com/office/drawing/2017/decorative" val="1"/>
-              </a:ext>
-            </a:extLst>
-          </p:cNvPr>
-          <p:cNvSpPr>
-            <a:spLocks noGrp="1" noRot="1" noChangeAspect="1" noMove="1" noResize="1" noEditPoints="1" noAdjustHandles="1" noChangeArrowheads="1" noChangeShapeType="1" noTextEdit="1"/>
-          </p:cNvSpPr>
-          <p:nvPr>
-            <p:extLst>
-              <p:ext uri="{386F3935-93C4-4BCD-93E2-E3B085C9AB24}">
-                <p16:designElem xmlns:p16="http://schemas.microsoft.com/office/powerpoint/2015/main" val="1"/>
-              </p:ext>
-            </p:extLst>
-          </p:nvPr>
-        </p:nvSpPr>
-        <p:spPr>
-          <a:xfrm>
-            <a:off x="0" y="0"/>
-            <a:ext cx="12192000" cy="6858000"/>
-          </a:xfrm>
-          <a:prstGeom prst="rect">
-            <a:avLst/>
-          </a:prstGeom>
-          <a:ln w="12700" cap="flat" cmpd="sng" algn="ctr">
-            <a:noFill/>
-            <a:prstDash val="solid"/>
-            <a:miter lim="800000"/>
-          </a:ln>
-          <a:effectLst/>
-          <a:extLst>
-            <a:ext uri="{91240B29-F687-4F45-9708-019B960494DF}">
-              <a14:hiddenLine xmlns:a14="http://schemas.microsoft.com/office/drawing/2010/main" w="12700" cap="flat" cmpd="sng" algn="ctr">
-                <a:solidFill>
-                  <a:schemeClr val="accent1">
-                    <a:shade val="50000"/>
-                  </a:schemeClr>
-                </a:solidFill>
-                <a:prstDash val="solid"/>
-                <a:miter lim="800000"/>
-              </a14:hiddenLine>
-            </a:ext>
-          </a:extLst>
-        </p:spPr>
-        <p:style>
-          <a:lnRef idx="2">
-            <a:schemeClr val="accent1">
-              <a:shade val="50000"/>
-            </a:schemeClr>
-          </a:lnRef>
-          <a:fillRef idx="1">
-            <a:schemeClr val="accent1"/>
-          </a:fillRef>
-          <a:effectRef idx="0">
-            <a:schemeClr val="accent1"/>
-          </a:effectRef>
-          <a:fontRef idx="minor">
-            <a:schemeClr val="lt1"/>
-          </a:fontRef>
-        </p:style>
-        <p:txBody>
-          <a:bodyPr rtlCol="0" anchor="ctr"/>
-          <a:lstStyle/>
-          <a:p>
-            <a:pPr algn="ctr"/>
-            <a:endParaRPr lang="en-US"/>
-          </a:p>
-        </p:txBody>
-      </p:sp>
-      <p:sp>
-        <p:nvSpPr>
-          <p:cNvPr id="2" name="Titel 1">
-            <a:extLst>
-              <a:ext uri="{FF2B5EF4-FFF2-40B4-BE49-F238E27FC236}">
-                <a16:creationId xmlns:a16="http://schemas.microsoft.com/office/drawing/2014/main" id="{EE50DBF5-9546-4E76-8032-E349B7C4EC4B}"/>
-              </a:ext>
-            </a:extLst>
-          </p:cNvPr>
-          <p:cNvSpPr>
-            <a:spLocks noGrp="1"/>
-          </p:cNvSpPr>
-          <p:nvPr>
-            <p:ph type="title"/>
-          </p:nvPr>
-        </p:nvSpPr>
-        <p:spPr>
-          <a:xfrm>
-            <a:off x="550864" y="549275"/>
-            <a:ext cx="3565524" cy="1997855"/>
-          </a:xfrm>
-        </p:spPr>
-        <p:txBody>
-          <a:bodyPr wrap="square" anchor="b">
-            <a:normAutofit/>
-          </a:bodyPr>
-          <a:lstStyle/>
-          <a:p>
-            <a:r>
-              <a:rPr lang="en-US">
-                <a:latin typeface="Adobe Clean" panose="020B0503020404020204" pitchFamily="34" charset="0"/>
-              </a:rPr>
-              <a:t>4. The Car</a:t>
-            </a:r>
-            <a:br>
-              <a:rPr lang="en-US">
-                <a:latin typeface="Adobe Clean" panose="020B0503020404020204" pitchFamily="34" charset="0"/>
-              </a:rPr>
-            </a:br>
-            <a:endParaRPr lang="en-US">
-              <a:latin typeface="Adobe Clean" panose="020B0503020404020204" pitchFamily="34" charset="0"/>
-            </a:endParaRPr>
-          </a:p>
-        </p:txBody>
-      </p:sp>
-      <p:grpSp>
-        <p:nvGrpSpPr>
-          <p:cNvPr id="61" name="Group 54">
-            <a:extLst>
-              <a:ext uri="{FF2B5EF4-FFF2-40B4-BE49-F238E27FC236}">
-                <a16:creationId xmlns:a16="http://schemas.microsoft.com/office/drawing/2014/main" id="{9F2D4ED5-DC78-4C88-97AA-483206C53E90}"/>
-              </a:ext>
-              <a:ext uri="{C183D7F6-B498-43B3-948B-1728B52AA6E4}">
-                <adec:decorative xmlns:adec="http://schemas.microsoft.com/office/drawing/2017/decorative" val="1"/>
-              </a:ext>
-            </a:extLst>
-          </p:cNvPr>
-          <p:cNvGrpSpPr>
-            <a:grpSpLocks noGrp="1" noUngrp="1" noRot="1" noChangeAspect="1" noMove="1" noResize="1"/>
-          </p:cNvGrpSpPr>
-          <p:nvPr>
-            <p:extLst>
-              <p:ext uri="{386F3935-93C4-4BCD-93E2-E3B085C9AB24}">
-                <p16:designElem xmlns:p16="http://schemas.microsoft.com/office/powerpoint/2015/main" val="1"/>
-              </p:ext>
-            </p:extLst>
-          </p:nvPr>
-        </p:nvGrpSpPr>
-        <p:grpSpPr>
-          <a:xfrm>
-            <a:off x="10570793" y="0"/>
-            <a:ext cx="1468514" cy="1521012"/>
-            <a:chOff x="5236793" y="2432482"/>
-            <a:chExt cx="1468514" cy="1521012"/>
-          </a:xfrm>
-        </p:grpSpPr>
-        <p:sp>
-          <p:nvSpPr>
-            <p:cNvPr id="56" name="Freeform 5">
-              <a:extLst>
-                <a:ext uri="{FF2B5EF4-FFF2-40B4-BE49-F238E27FC236}">
-                  <a16:creationId xmlns:a16="http://schemas.microsoft.com/office/drawing/2014/main" id="{0DE0B65A-4839-40B2-BA92-1464FEADBA4A}"/>
-                </a:ext>
-                <a:ext uri="{C183D7F6-B498-43B3-948B-1728B52AA6E4}">
-                  <adec:decorative xmlns:adec="http://schemas.microsoft.com/office/drawing/2017/decorative" val="1"/>
-                </a:ext>
-              </a:extLst>
-            </p:cNvPr>
-            <p:cNvSpPr>
-              <a:spLocks/>
-            </p:cNvSpPr>
-            <p:nvPr>
-              <p:extLst>
-                <p:ext uri="{386F3935-93C4-4BCD-93E2-E3B085C9AB24}">
-                  <p16:designElem xmlns:p16="http://schemas.microsoft.com/office/powerpoint/2015/main" val="1"/>
-                </p:ext>
-              </p:extLst>
-            </p:nvPr>
-          </p:nvSpPr>
-          <p:spPr bwMode="auto">
-            <a:xfrm rot="1800000">
-              <a:off x="5463135" y="2432482"/>
-              <a:ext cx="1242172" cy="729202"/>
-            </a:xfrm>
-            <a:custGeom>
-              <a:avLst/>
-              <a:gdLst>
-                <a:gd name="T0" fmla="*/ 266 w 540"/>
-                <a:gd name="T1" fmla="*/ 0 h 317"/>
-                <a:gd name="T2" fmla="*/ 0 w 540"/>
-                <a:gd name="T3" fmla="*/ 158 h 317"/>
-                <a:gd name="T4" fmla="*/ 266 w 540"/>
-                <a:gd name="T5" fmla="*/ 317 h 317"/>
-                <a:gd name="T6" fmla="*/ 540 w 540"/>
-                <a:gd name="T7" fmla="*/ 158 h 317"/>
-                <a:gd name="T8" fmla="*/ 266 w 540"/>
-                <a:gd name="T9" fmla="*/ 0 h 317"/>
-              </a:gdLst>
-              <a:ahLst/>
-              <a:cxnLst>
-                <a:cxn ang="0">
-                  <a:pos x="T0" y="T1"/>
-                </a:cxn>
-                <a:cxn ang="0">
-                  <a:pos x="T2" y="T3"/>
-                </a:cxn>
-                <a:cxn ang="0">
-                  <a:pos x="T4" y="T5"/>
-                </a:cxn>
-                <a:cxn ang="0">
-                  <a:pos x="T6" y="T7"/>
-                </a:cxn>
-                <a:cxn ang="0">
-                  <a:pos x="T8" y="T9"/>
-                </a:cxn>
-              </a:cxnLst>
-              <a:rect l="0" t="0" r="r" b="b"/>
-              <a:pathLst>
-                <a:path w="540" h="317">
-                  <a:moveTo>
-                    <a:pt x="266" y="0"/>
-                  </a:moveTo>
-                  <a:lnTo>
-                    <a:pt x="0" y="158"/>
-                  </a:lnTo>
-                  <a:lnTo>
-                    <a:pt x="266" y="317"/>
-                  </a:lnTo>
-                  <a:lnTo>
-                    <a:pt x="540" y="158"/>
-                  </a:lnTo>
-                  <a:lnTo>
-                    <a:pt x="266" y="0"/>
-                  </a:lnTo>
-                  <a:close/>
-                </a:path>
-              </a:pathLst>
-            </a:custGeom>
-            <a:gradFill flip="none" rotWithShape="1">
-              <a:gsLst>
-                <a:gs pos="20000">
-                  <a:schemeClr val="bg2">
-                    <a:lumMod val="90000"/>
-                    <a:lumOff val="10000"/>
-                    <a:alpha val="20000"/>
-                  </a:schemeClr>
-                </a:gs>
-                <a:gs pos="100000">
-                  <a:schemeClr val="accent1">
-                    <a:lumMod val="60000"/>
-                    <a:lumOff val="40000"/>
-                    <a:alpha val="40000"/>
-                  </a:schemeClr>
-                </a:gs>
-              </a:gsLst>
-              <a:lin ang="0" scaled="0"/>
-              <a:tileRect/>
-            </a:gradFill>
-            <a:ln>
-              <a:noFill/>
-            </a:ln>
-            <a:effectLst>
-              <a:innerShdw blurRad="254000">
-                <a:schemeClr val="bg2">
-                  <a:lumMod val="90000"/>
-                  <a:lumOff val="10000"/>
-                </a:schemeClr>
-              </a:innerShdw>
-            </a:effectLst>
-          </p:spPr>
-          <p:style>
-            <a:lnRef idx="2">
-              <a:schemeClr val="accent1">
-                <a:shade val="50000"/>
-              </a:schemeClr>
-            </a:lnRef>
-            <a:fillRef idx="1">
-              <a:schemeClr val="accent1"/>
-            </a:fillRef>
-            <a:effectRef idx="0">
-              <a:schemeClr val="accent1"/>
-            </a:effectRef>
-            <a:fontRef idx="minor">
-              <a:schemeClr val="lt1"/>
-            </a:fontRef>
-          </p:style>
-          <p:txBody>
-            <a:bodyPr rot="0" spcFirstLastPara="0" vertOverflow="overflow" horzOverflow="overflow" vert="horz" wrap="square" lIns="91440" tIns="45720" rIns="91440" bIns="45720" numCol="1" spcCol="0" rtlCol="0" fromWordArt="0" anchor="ctr" anchorCtr="0" forceAA="0" compatLnSpc="1">
-              <a:prstTxWarp prst="textNoShape">
-                <a:avLst/>
-              </a:prstTxWarp>
-              <a:noAutofit/>
-            </a:bodyPr>
-            <a:lstStyle/>
-            <a:p>
-              <a:pPr algn="ctr"/>
-              <a:endParaRPr lang="en-US"/>
-            </a:p>
-          </p:txBody>
-        </p:sp>
-        <p:sp>
-          <p:nvSpPr>
-            <p:cNvPr id="57" name="Freeform 6">
-              <a:extLst>
-                <a:ext uri="{FF2B5EF4-FFF2-40B4-BE49-F238E27FC236}">
-                  <a16:creationId xmlns:a16="http://schemas.microsoft.com/office/drawing/2014/main" id="{842A0A68-39DD-4DA7-BAD5-63B9C1398718}"/>
-                </a:ext>
-                <a:ext uri="{C183D7F6-B498-43B3-948B-1728B52AA6E4}">
-                  <adec:decorative xmlns:adec="http://schemas.microsoft.com/office/drawing/2017/decorative" val="1"/>
-                </a:ext>
-              </a:extLst>
-            </p:cNvPr>
-            <p:cNvSpPr>
-              <a:spLocks/>
-            </p:cNvSpPr>
-            <p:nvPr>
-              <p:extLst>
-                <p:ext uri="{386F3935-93C4-4BCD-93E2-E3B085C9AB24}">
-                  <p16:designElem xmlns:p16="http://schemas.microsoft.com/office/powerpoint/2015/main" val="1"/>
-                </p:ext>
-              </p:extLst>
-            </p:nvPr>
-          </p:nvSpPr>
-          <p:spPr bwMode="auto">
-            <a:xfrm rot="1800000">
-              <a:off x="5236793" y="2566400"/>
-              <a:ext cx="611884" cy="1076550"/>
-            </a:xfrm>
-            <a:custGeom>
-              <a:avLst/>
-              <a:gdLst>
-                <a:gd name="T0" fmla="*/ 266 w 266"/>
-                <a:gd name="T1" fmla="*/ 468 h 468"/>
-                <a:gd name="T2" fmla="*/ 0 w 266"/>
-                <a:gd name="T3" fmla="*/ 310 h 468"/>
-                <a:gd name="T4" fmla="*/ 0 w 266"/>
-                <a:gd name="T5" fmla="*/ 310 h 468"/>
-                <a:gd name="T6" fmla="*/ 0 w 266"/>
-                <a:gd name="T7" fmla="*/ 0 h 468"/>
-                <a:gd name="T8" fmla="*/ 0 w 266"/>
-                <a:gd name="T9" fmla="*/ 0 h 468"/>
-                <a:gd name="T10" fmla="*/ 266 w 266"/>
-                <a:gd name="T11" fmla="*/ 159 h 468"/>
-                <a:gd name="T12" fmla="*/ 266 w 266"/>
-                <a:gd name="T13" fmla="*/ 468 h 468"/>
-              </a:gdLst>
-              <a:ahLst/>
-              <a:cxnLst>
-                <a:cxn ang="0">
-                  <a:pos x="T0" y="T1"/>
-                </a:cxn>
-                <a:cxn ang="0">
-                  <a:pos x="T2" y="T3"/>
-                </a:cxn>
-                <a:cxn ang="0">
-                  <a:pos x="T4" y="T5"/>
-                </a:cxn>
-                <a:cxn ang="0">
-                  <a:pos x="T6" y="T7"/>
-                </a:cxn>
-                <a:cxn ang="0">
-                  <a:pos x="T8" y="T9"/>
-                </a:cxn>
-                <a:cxn ang="0">
-                  <a:pos x="T10" y="T11"/>
-                </a:cxn>
-                <a:cxn ang="0">
-                  <a:pos x="T12" y="T13"/>
-                </a:cxn>
-              </a:cxnLst>
-              <a:rect l="0" t="0" r="r" b="b"/>
-              <a:pathLst>
-                <a:path w="266" h="468">
-                  <a:moveTo>
-                    <a:pt x="266" y="468"/>
-                  </a:moveTo>
-                  <a:lnTo>
-                    <a:pt x="0" y="310"/>
-                  </a:lnTo>
-                  <a:lnTo>
-                    <a:pt x="0" y="310"/>
-                  </a:lnTo>
-                  <a:lnTo>
-                    <a:pt x="0" y="0"/>
-                  </a:lnTo>
-                  <a:lnTo>
-                    <a:pt x="0" y="0"/>
-                  </a:lnTo>
-                  <a:lnTo>
-                    <a:pt x="266" y="159"/>
-                  </a:lnTo>
-                  <a:lnTo>
-                    <a:pt x="266" y="468"/>
-                  </a:lnTo>
-                  <a:close/>
-                </a:path>
-              </a:pathLst>
-            </a:custGeom>
-            <a:gradFill flip="none" rotWithShape="1">
-              <a:gsLst>
-                <a:gs pos="20000">
-                  <a:schemeClr val="bg2">
-                    <a:lumMod val="90000"/>
-                    <a:lumOff val="10000"/>
-                    <a:alpha val="20000"/>
-                  </a:schemeClr>
-                </a:gs>
-                <a:gs pos="100000">
-                  <a:schemeClr val="accent1">
-                    <a:lumMod val="60000"/>
-                    <a:lumOff val="40000"/>
-                    <a:alpha val="40000"/>
-                  </a:schemeClr>
-                </a:gs>
-              </a:gsLst>
-              <a:lin ang="19800000" scaled="0"/>
-              <a:tileRect/>
-            </a:gradFill>
-            <a:ln>
-              <a:noFill/>
-            </a:ln>
-            <a:effectLst>
-              <a:innerShdw blurRad="254000">
-                <a:schemeClr val="bg2">
-                  <a:lumMod val="90000"/>
-                  <a:lumOff val="10000"/>
-                </a:schemeClr>
-              </a:innerShdw>
-            </a:effectLst>
-          </p:spPr>
-          <p:style>
-            <a:lnRef idx="2">
-              <a:schemeClr val="accent1">
-                <a:shade val="50000"/>
-              </a:schemeClr>
-            </a:lnRef>
-            <a:fillRef idx="1">
-              <a:schemeClr val="accent1"/>
-            </a:fillRef>
-            <a:effectRef idx="0">
-              <a:schemeClr val="accent1"/>
-            </a:effectRef>
-            <a:fontRef idx="minor">
-              <a:schemeClr val="lt1"/>
-            </a:fontRef>
-          </p:style>
-          <p:txBody>
-            <a:bodyPr rot="0" spcFirstLastPara="0" vertOverflow="overflow" horzOverflow="overflow" vert="horz" wrap="square" lIns="91440" tIns="45720" rIns="91440" bIns="45720" numCol="1" spcCol="0" rtlCol="0" fromWordArt="0" anchor="ctr" anchorCtr="0" forceAA="0" compatLnSpc="1">
-              <a:prstTxWarp prst="textNoShape">
-                <a:avLst/>
-              </a:prstTxWarp>
-              <a:noAutofit/>
-            </a:bodyPr>
-            <a:lstStyle/>
-            <a:p>
-              <a:pPr algn="ctr"/>
-              <a:endParaRPr lang="en-US"/>
-            </a:p>
-          </p:txBody>
-        </p:sp>
-        <p:sp>
-          <p:nvSpPr>
-            <p:cNvPr id="58" name="Freeform 8">
-              <a:extLst>
-                <a:ext uri="{FF2B5EF4-FFF2-40B4-BE49-F238E27FC236}">
-                  <a16:creationId xmlns:a16="http://schemas.microsoft.com/office/drawing/2014/main" id="{21A69E50-7E10-45C3-B4F2-19DBA7748498}"/>
-                </a:ext>
-                <a:ext uri="{C183D7F6-B498-43B3-948B-1728B52AA6E4}">
-                  <adec:decorative xmlns:adec="http://schemas.microsoft.com/office/drawing/2017/decorative" val="1"/>
-                </a:ext>
-              </a:extLst>
-            </p:cNvPr>
-            <p:cNvSpPr>
-              <a:spLocks/>
-            </p:cNvSpPr>
-            <p:nvPr>
-              <p:extLst>
-                <p:ext uri="{386F3935-93C4-4BCD-93E2-E3B085C9AB24}">
-                  <p16:designElem xmlns:p16="http://schemas.microsoft.com/office/powerpoint/2015/main" val="1"/>
-                </p:ext>
-              </p:extLst>
-            </p:nvPr>
-          </p:nvSpPr>
-          <p:spPr bwMode="auto">
-            <a:xfrm rot="1800000">
-              <a:off x="5765469" y="2876944"/>
-              <a:ext cx="630288" cy="1076550"/>
-            </a:xfrm>
-            <a:custGeom>
-              <a:avLst/>
-              <a:gdLst>
-                <a:gd name="T0" fmla="*/ 274 w 274"/>
-                <a:gd name="T1" fmla="*/ 0 h 468"/>
-                <a:gd name="T2" fmla="*/ 274 w 274"/>
-                <a:gd name="T3" fmla="*/ 310 h 468"/>
-                <a:gd name="T4" fmla="*/ 274 w 274"/>
-                <a:gd name="T5" fmla="*/ 310 h 468"/>
-                <a:gd name="T6" fmla="*/ 0 w 274"/>
-                <a:gd name="T7" fmla="*/ 468 h 468"/>
-                <a:gd name="T8" fmla="*/ 0 w 274"/>
-                <a:gd name="T9" fmla="*/ 159 h 468"/>
-                <a:gd name="T10" fmla="*/ 274 w 274"/>
-                <a:gd name="T11" fmla="*/ 0 h 468"/>
-                <a:gd name="T12" fmla="*/ 274 w 274"/>
-                <a:gd name="T13" fmla="*/ 0 h 468"/>
-              </a:gdLst>
-              <a:ahLst/>
-              <a:cxnLst>
-                <a:cxn ang="0">
-                  <a:pos x="T0" y="T1"/>
-                </a:cxn>
-                <a:cxn ang="0">
-                  <a:pos x="T2" y="T3"/>
-                </a:cxn>
-                <a:cxn ang="0">
-                  <a:pos x="T4" y="T5"/>
-                </a:cxn>
-                <a:cxn ang="0">
-                  <a:pos x="T6" y="T7"/>
-                </a:cxn>
-                <a:cxn ang="0">
-                  <a:pos x="T8" y="T9"/>
-                </a:cxn>
-                <a:cxn ang="0">
-                  <a:pos x="T10" y="T11"/>
-                </a:cxn>
-                <a:cxn ang="0">
-                  <a:pos x="T12" y="T13"/>
-                </a:cxn>
-              </a:cxnLst>
-              <a:rect l="0" t="0" r="r" b="b"/>
-              <a:pathLst>
-                <a:path w="274" h="468">
-                  <a:moveTo>
-                    <a:pt x="274" y="0"/>
-                  </a:moveTo>
-                  <a:lnTo>
-                    <a:pt x="274" y="310"/>
-                  </a:lnTo>
-                  <a:lnTo>
-                    <a:pt x="274" y="310"/>
-                  </a:lnTo>
-                  <a:lnTo>
-                    <a:pt x="0" y="468"/>
-                  </a:lnTo>
-                  <a:lnTo>
-                    <a:pt x="0" y="159"/>
-                  </a:lnTo>
-                  <a:lnTo>
-                    <a:pt x="274" y="0"/>
-                  </a:lnTo>
-                  <a:lnTo>
-                    <a:pt x="274" y="0"/>
-                  </a:lnTo>
-                  <a:close/>
-                </a:path>
-              </a:pathLst>
-            </a:custGeom>
-            <a:gradFill flip="none" rotWithShape="1">
-              <a:gsLst>
-                <a:gs pos="20000">
-                  <a:schemeClr val="bg2">
-                    <a:lumMod val="90000"/>
-                    <a:lumOff val="10000"/>
-                    <a:alpha val="20000"/>
-                  </a:schemeClr>
-                </a:gs>
-                <a:gs pos="100000">
-                  <a:schemeClr val="accent1">
-                    <a:lumMod val="40000"/>
-                    <a:lumOff val="60000"/>
-                    <a:alpha val="60000"/>
-                  </a:schemeClr>
-                </a:gs>
-              </a:gsLst>
-              <a:lin ang="18000000" scaled="0"/>
-              <a:tileRect/>
-            </a:gradFill>
-            <a:ln>
-              <a:noFill/>
-            </a:ln>
-            <a:effectLst>
-              <a:innerShdw blurRad="508000">
-                <a:schemeClr val="accent1">
-                  <a:lumMod val="60000"/>
-                  <a:lumOff val="40000"/>
-                  <a:alpha val="40000"/>
-                </a:schemeClr>
-              </a:innerShdw>
-            </a:effectLst>
-          </p:spPr>
-          <p:style>
-            <a:lnRef idx="2">
-              <a:schemeClr val="accent1">
-                <a:shade val="50000"/>
-              </a:schemeClr>
-            </a:lnRef>
-            <a:fillRef idx="1">
-              <a:schemeClr val="accent1"/>
-            </a:fillRef>
-            <a:effectRef idx="0">
-              <a:schemeClr val="accent1"/>
-            </a:effectRef>
-            <a:fontRef idx="minor">
-              <a:schemeClr val="lt1"/>
-            </a:fontRef>
-          </p:style>
-          <p:txBody>
-            <a:bodyPr rot="0" spcFirstLastPara="0" vertOverflow="overflow" horzOverflow="overflow" vert="horz" wrap="square" lIns="91440" tIns="45720" rIns="91440" bIns="45720" numCol="1" spcCol="0" rtlCol="0" fromWordArt="0" anchor="ctr" anchorCtr="0" forceAA="0" compatLnSpc="1">
-              <a:prstTxWarp prst="textNoShape">
-                <a:avLst/>
-              </a:prstTxWarp>
-              <a:noAutofit/>
-            </a:bodyPr>
-            <a:lstStyle/>
-            <a:p>
-              <a:pPr algn="ctr"/>
-              <a:endParaRPr lang="en-US"/>
-            </a:p>
-          </p:txBody>
-        </p:sp>
-      </p:grpSp>
-      <p:sp>
-        <p:nvSpPr>
-          <p:cNvPr id="60" name="Oval 59">
-            <a:extLst>
-              <a:ext uri="{FF2B5EF4-FFF2-40B4-BE49-F238E27FC236}">
-                <a16:creationId xmlns:a16="http://schemas.microsoft.com/office/drawing/2014/main" id="{D166A8AB-8924-421C-BCED-B54DBC4054E0}"/>
-              </a:ext>
-              <a:ext uri="{C183D7F6-B498-43B3-948B-1728B52AA6E4}">
-                <adec:decorative xmlns:adec="http://schemas.microsoft.com/office/drawing/2017/decorative" val="1"/>
-              </a:ext>
-            </a:extLst>
-          </p:cNvPr>
-          <p:cNvSpPr>
-            <a:spLocks noGrp="1" noRot="1" noChangeAspect="1" noMove="1" noResize="1" noEditPoints="1" noAdjustHandles="1" noChangeArrowheads="1" noChangeShapeType="1" noTextEdit="1"/>
-          </p:cNvSpPr>
-          <p:nvPr>
-            <p:extLst>
-              <p:ext uri="{386F3935-93C4-4BCD-93E2-E3B085C9AB24}">
-                <p16:designElem xmlns:p16="http://schemas.microsoft.com/office/powerpoint/2015/main" val="1"/>
-              </p:ext>
-            </p:extLst>
-          </p:nvPr>
-        </p:nvSpPr>
-        <p:spPr>
-          <a:xfrm>
-            <a:off x="2677897" y="5497189"/>
-            <a:ext cx="360000" cy="360000"/>
-          </a:xfrm>
-          <a:prstGeom prst="ellipse">
-            <a:avLst/>
-          </a:prstGeom>
-          <a:gradFill flip="none" rotWithShape="1">
-            <a:gsLst>
-              <a:gs pos="100000">
-                <a:schemeClr val="bg2">
-                  <a:lumMod val="50000"/>
-                  <a:lumOff val="50000"/>
-                </a:schemeClr>
-              </a:gs>
-              <a:gs pos="60000">
-                <a:schemeClr val="bg2"/>
-              </a:gs>
-            </a:gsLst>
-            <a:path path="circle">
-              <a:fillToRect l="100000" b="100000"/>
-            </a:path>
-            <a:tileRect t="-100000" r="-100000"/>
-          </a:gradFill>
-          <a:ln>
-            <a:noFill/>
-          </a:ln>
-          <a:effectLst>
-            <a:innerShdw blurRad="127000" dist="63500" dir="2700000">
-              <a:schemeClr val="accent1">
-                <a:lumMod val="60000"/>
-                <a:lumOff val="40000"/>
-                <a:alpha val="20000"/>
-              </a:schemeClr>
-            </a:innerShdw>
-            <a:softEdge rad="0"/>
-          </a:effectLst>
-        </p:spPr>
-        <p:style>
-          <a:lnRef idx="2">
-            <a:schemeClr val="accent1">
-              <a:shade val="50000"/>
-            </a:schemeClr>
-          </a:lnRef>
-          <a:fillRef idx="1">
-            <a:schemeClr val="accent1"/>
-          </a:fillRef>
-          <a:effectRef idx="0">
-            <a:schemeClr val="accent1"/>
-          </a:effectRef>
-          <a:fontRef idx="minor">
-            <a:schemeClr val="lt1"/>
-          </a:fontRef>
-        </p:style>
-        <p:txBody>
-          <a:bodyPr rot="0" spcFirstLastPara="0" vertOverflow="overflow" horzOverflow="overflow" vert="horz" wrap="square" lIns="91440" tIns="45720" rIns="91440" bIns="45720" numCol="1" spcCol="0" rtlCol="0" fromWordArt="0" anchor="ctr" anchorCtr="0" forceAA="0" compatLnSpc="1">
-            <a:prstTxWarp prst="textNoShape">
-              <a:avLst/>
-            </a:prstTxWarp>
-            <a:noAutofit/>
-          </a:bodyPr>
-          <a:lstStyle/>
-          <a:p>
-            <a:pPr algn="ctr"/>
-            <a:endParaRPr lang="en-US"/>
-          </a:p>
-        </p:txBody>
-      </p:sp>
-      <p:sp>
-        <p:nvSpPr>
-          <p:cNvPr id="3" name="Tijdelijke aanduiding voor inhoud 2">
-            <a:extLst>
-              <a:ext uri="{FF2B5EF4-FFF2-40B4-BE49-F238E27FC236}">
-                <a16:creationId xmlns:a16="http://schemas.microsoft.com/office/drawing/2014/main" id="{98550410-D171-4686-BEC3-A9FCC787AE7D}"/>
-              </a:ext>
-            </a:extLst>
-          </p:cNvPr>
-          <p:cNvSpPr>
-            <a:spLocks noGrp="1"/>
-          </p:cNvSpPr>
-          <p:nvPr>
-            <p:ph idx="1"/>
-          </p:nvPr>
-        </p:nvSpPr>
-        <p:spPr>
-          <a:xfrm>
-            <a:off x="550863" y="2677306"/>
-            <a:ext cx="3565525" cy="3415519"/>
-          </a:xfrm>
-        </p:spPr>
-        <p:txBody>
-          <a:bodyPr anchor="t">
-            <a:normAutofit/>
-          </a:bodyPr>
-          <a:lstStyle/>
-          <a:p>
-            <a:r>
-              <a:rPr lang="en-US" sz="1600" dirty="0">
-                <a:latin typeface="Adobe Clean" panose="020B0503020404020204" pitchFamily="34" charset="0"/>
-              </a:rPr>
-              <a:t>Input</a:t>
-            </a:r>
-          </a:p>
-          <a:p>
-            <a:r>
-              <a:rPr lang="en-US" sz="1600">
-                <a:latin typeface="Adobe Clean" panose="020B0503020404020204" pitchFamily="34" charset="0"/>
-              </a:rPr>
-              <a:t>Speed</a:t>
-            </a:r>
-            <a:endParaRPr lang="en-US" sz="1600" dirty="0">
-              <a:latin typeface="Adobe Clean" panose="020B0503020404020204" pitchFamily="34" charset="0"/>
-            </a:endParaRPr>
-          </a:p>
-          <a:p>
-            <a:r>
-              <a:rPr lang="en-US" sz="1600" dirty="0">
-                <a:latin typeface="Adobe Clean" panose="020B0503020404020204" pitchFamily="34" charset="0"/>
-              </a:rPr>
-              <a:t>Steering system</a:t>
-            </a:r>
-          </a:p>
-          <a:p>
-            <a:r>
-              <a:rPr lang="en-US" sz="1600" dirty="0">
-                <a:latin typeface="Adobe Clean" panose="020B0503020404020204" pitchFamily="34" charset="0"/>
-              </a:rPr>
-              <a:t>Understeer</a:t>
-            </a:r>
-          </a:p>
-          <a:p>
-            <a:r>
-              <a:rPr lang="en-US" sz="1600" dirty="0">
-                <a:latin typeface="Adobe Clean" panose="020B0503020404020204" pitchFamily="34" charset="0"/>
-              </a:rPr>
-              <a:t>Braking</a:t>
-            </a:r>
-          </a:p>
-          <a:p>
-            <a:r>
-              <a:rPr lang="en-US" sz="1600" dirty="0">
-                <a:latin typeface="Adobe Clean" panose="020B0503020404020204" pitchFamily="34" charset="0"/>
-              </a:rPr>
-              <a:t>Rumble</a:t>
-            </a:r>
-          </a:p>
-        </p:txBody>
-      </p:sp>
-      <p:pic>
-        <p:nvPicPr>
-          <p:cNvPr id="48" name="Afbeelding 47">
-            <a:extLst>
-              <a:ext uri="{FF2B5EF4-FFF2-40B4-BE49-F238E27FC236}">
-                <a16:creationId xmlns:a16="http://schemas.microsoft.com/office/drawing/2014/main" id="{F1EAECA5-795E-4CC8-9B6A-AF462F3CEB9A}"/>
-              </a:ext>
-            </a:extLst>
-          </p:cNvPr>
-          <p:cNvPicPr>
-            <a:picLocks noChangeAspect="1"/>
-          </p:cNvPicPr>
-          <p:nvPr/>
-        </p:nvPicPr>
-        <p:blipFill>
-          <a:blip r:embed="rId2"/>
-          <a:stretch>
-            <a:fillRect/>
-          </a:stretch>
-        </p:blipFill>
-        <p:spPr>
-          <a:xfrm>
-            <a:off x="5193438" y="549275"/>
-            <a:ext cx="5805160" cy="5759451"/>
-          </a:xfrm>
-          <a:custGeom>
-            <a:avLst/>
-            <a:gdLst/>
-            <a:ahLst/>
-            <a:cxnLst/>
-            <a:rect l="l" t="t" r="r" b="b"/>
-            <a:pathLst>
-              <a:path w="7090237" h="5759451">
-                <a:moveTo>
-                  <a:pt x="0" y="0"/>
-                </a:moveTo>
-                <a:lnTo>
-                  <a:pt x="7090237" y="0"/>
-                </a:lnTo>
-                <a:lnTo>
-                  <a:pt x="7090237" y="5759451"/>
-                </a:lnTo>
-                <a:lnTo>
-                  <a:pt x="0" y="5759451"/>
-                </a:lnTo>
-                <a:close/>
-              </a:path>
-            </a:pathLst>
-          </a:custGeom>
-        </p:spPr>
-      </p:pic>
-    </p:spTree>
-    <p:extLst>
-      <p:ext uri="{BB962C8B-B14F-4D97-AF65-F5344CB8AC3E}">
-        <p14:creationId xmlns:p14="http://schemas.microsoft.com/office/powerpoint/2010/main" val="1417393680"/>
-      </p:ext>
-    </p:extLst>
-  </p:cSld>
-  <p:clrMapOvr>
-    <a:masterClrMapping/>
-  </p:clrMapOvr>
-</p:sld>
-</file>
-
-<file path=ppt/slides/slide7.xml><?xml version="1.0" encoding="utf-8"?>
-<p:sld xmlns:a="http://schemas.openxmlformats.org/drawingml/2006/main" xmlns:r="http://schemas.openxmlformats.org/officeDocument/2006/relationships" xmlns:p="http://schemas.openxmlformats.org/presentationml/2006/main">
-  <p:cSld>
-    <p:spTree>
-      <p:nvGrpSpPr>
-        <p:cNvPr id="1" name=""/>
-        <p:cNvGrpSpPr/>
-        <p:nvPr/>
-      </p:nvGrpSpPr>
-      <p:grpSpPr>
-        <a:xfrm>
-          <a:off x="0" y="0"/>
-          <a:ext cx="0" cy="0"/>
-          <a:chOff x="0" y="0"/>
-          <a:chExt cx="0" cy="0"/>
-        </a:xfrm>
-      </p:grpSpPr>
-      <p:sp>
-        <p:nvSpPr>
-          <p:cNvPr id="2" name="Titel 1">
-            <a:extLst>
-              <a:ext uri="{FF2B5EF4-FFF2-40B4-BE49-F238E27FC236}">
-                <a16:creationId xmlns:a16="http://schemas.microsoft.com/office/drawing/2014/main" id="{69BB44D3-E368-4364-8578-7F5586088AEA}"/>
-              </a:ext>
-            </a:extLst>
-          </p:cNvPr>
-          <p:cNvSpPr>
-            <a:spLocks noGrp="1"/>
-          </p:cNvSpPr>
-          <p:nvPr>
-            <p:ph type="title"/>
-          </p:nvPr>
-        </p:nvSpPr>
-        <p:spPr/>
-        <p:txBody>
-          <a:bodyPr>
-            <a:normAutofit fontScale="90000"/>
-          </a:bodyPr>
-          <a:lstStyle/>
-          <a:p>
-            <a:r>
-              <a:rPr lang="en-US" sz="4800" dirty="0">
-                <a:latin typeface="Adobe Clean" panose="020B0503020404020204" pitchFamily="34" charset="0"/>
-              </a:rPr>
-              <a:t>5. The game</a:t>
-            </a:r>
-            <a:br>
-              <a:rPr lang="en-US" sz="4800" dirty="0">
-                <a:latin typeface="Adobe Clean" panose="020B0503020404020204" pitchFamily="34" charset="0"/>
-              </a:rPr>
-            </a:br>
-            <a:endParaRPr lang="en-US" dirty="0">
-              <a:latin typeface="Adobe Clean" panose="020B0503020404020204" pitchFamily="34" charset="0"/>
-            </a:endParaRPr>
-          </a:p>
-        </p:txBody>
-      </p:sp>
-      <p:sp>
-        <p:nvSpPr>
-          <p:cNvPr id="3" name="Tijdelijke aanduiding voor inhoud 2">
-            <a:extLst>
-              <a:ext uri="{FF2B5EF4-FFF2-40B4-BE49-F238E27FC236}">
-                <a16:creationId xmlns:a16="http://schemas.microsoft.com/office/drawing/2014/main" id="{0F5941E6-30A0-4515-9C15-2E43D6C7BDCE}"/>
-              </a:ext>
-            </a:extLst>
-          </p:cNvPr>
-          <p:cNvSpPr>
-            <a:spLocks noGrp="1"/>
-          </p:cNvSpPr>
-          <p:nvPr>
-            <p:ph idx="1"/>
-          </p:nvPr>
-        </p:nvSpPr>
-        <p:spPr/>
-        <p:txBody>
-          <a:bodyPr/>
-          <a:lstStyle/>
-          <a:p>
-            <a:r>
-              <a:rPr lang="en-US" dirty="0"/>
-              <a:t>(Mp4)</a:t>
-            </a:r>
-          </a:p>
-        </p:txBody>
-      </p:sp>
-    </p:spTree>
-    <p:extLst>
-      <p:ext uri="{BB962C8B-B14F-4D97-AF65-F5344CB8AC3E}">
-        <p14:creationId xmlns:p14="http://schemas.microsoft.com/office/powerpoint/2010/main" val="1019623499"/>
       </p:ext>
     </p:extLst>
   </p:cSld>

</xml_diff>